<commit_message>
Added introductory slides, more details
</commit_message>
<xml_diff>
--- a/Microservices.pptx
+++ b/Microservices.pptx
@@ -7,20 +7,25 @@
   <p:sldIdLst>
     <p:sldId id="256" r:id="rId2"/>
     <p:sldId id="269" r:id="rId3"/>
-    <p:sldId id="271" r:id="rId4"/>
-    <p:sldId id="257" r:id="rId5"/>
-    <p:sldId id="258" r:id="rId6"/>
-    <p:sldId id="270" r:id="rId7"/>
-    <p:sldId id="266" r:id="rId8"/>
-    <p:sldId id="272" r:id="rId9"/>
-    <p:sldId id="260" r:id="rId10"/>
-    <p:sldId id="262" r:id="rId11"/>
-    <p:sldId id="263" r:id="rId12"/>
-    <p:sldId id="264" r:id="rId13"/>
-    <p:sldId id="259" r:id="rId14"/>
-    <p:sldId id="265" r:id="rId15"/>
-    <p:sldId id="267" r:id="rId16"/>
-    <p:sldId id="268" r:id="rId17"/>
+    <p:sldId id="277" r:id="rId4"/>
+    <p:sldId id="274" r:id="rId5"/>
+    <p:sldId id="275" r:id="rId6"/>
+    <p:sldId id="273" r:id="rId7"/>
+    <p:sldId id="271" r:id="rId8"/>
+    <p:sldId id="257" r:id="rId9"/>
+    <p:sldId id="276" r:id="rId10"/>
+    <p:sldId id="258" r:id="rId11"/>
+    <p:sldId id="270" r:id="rId12"/>
+    <p:sldId id="266" r:id="rId13"/>
+    <p:sldId id="272" r:id="rId14"/>
+    <p:sldId id="260" r:id="rId15"/>
+    <p:sldId id="262" r:id="rId16"/>
+    <p:sldId id="263" r:id="rId17"/>
+    <p:sldId id="264" r:id="rId18"/>
+    <p:sldId id="259" r:id="rId19"/>
+    <p:sldId id="265" r:id="rId20"/>
+    <p:sldId id="267" r:id="rId21"/>
+    <p:sldId id="268" r:id="rId22"/>
   </p:sldIdLst>
   <p:sldSz cx="9144000" cy="6858000" type="screen4x3"/>
   <p:notesSz cx="6858000" cy="9144000"/>
@@ -121,7 +126,7 @@
   </p:defaultTextStyle>
   <p:extLst>
     <p:ext uri="{EFAFB233-063F-42B5-8137-9DF3F51BA10A}">
-      <p15:sldGuideLst xmlns:p15="http://schemas.microsoft.com/office/powerpoint/2012/main" xmlns="">
+      <p15:sldGuideLst xmlns="" xmlns:p15="http://schemas.microsoft.com/office/powerpoint/2012/main">
         <p15:guide id="1" orient="horz" pos="2160">
           <p15:clr>
             <a:srgbClr val="A4A3A4"/>
@@ -136,6 +141,21 @@
     </p:ext>
   </p:extLst>
 </p:presentation>
+</file>
+
+<file path=ppt/commentAuthors.xml><?xml version="1.0" encoding="utf-8"?>
+<p:cmAuthorLst xmlns:a="http://schemas.openxmlformats.org/drawingml/2006/main" xmlns:r="http://schemas.openxmlformats.org/officeDocument/2006/relationships" xmlns:p="http://schemas.openxmlformats.org/presentationml/2006/main">
+  <p:cmAuthor id="0" name="kelt" initials="k" lastIdx="1" clrIdx="0"/>
+</p:cmAuthorLst>
+</file>
+
+<file path=ppt/comments/comment1.xml><?xml version="1.0" encoding="utf-8"?>
+<p:cmLst xmlns:a="http://schemas.openxmlformats.org/drawingml/2006/main" xmlns:r="http://schemas.openxmlformats.org/officeDocument/2006/relationships" xmlns:p="http://schemas.openxmlformats.org/presentationml/2006/main">
+  <p:cm authorId="0" dt="2015-10-07T22:19:58.442" idx="1">
+    <p:pos x="10" y="10"/>
+    <p:text>Пересмотреть плюсы и минусы</p:text>
+  </p:cm>
+</p:cmLst>
 </file>
 
 <file path=ppt/slideLayouts/slideLayout1.xml><?xml version="1.0" encoding="utf-8"?>
@@ -319,7 +339,7 @@
           <a:p>
             <a:fld id="{57E389D1-C2F8-40B4-B845-801280EA792C}" type="datetimeFigureOut">
               <a:rPr lang="ru-RU" smtClean="0"/>
-              <a:t>01.10.2015</a:t>
+              <a:t>07.10.2015</a:t>
             </a:fld>
             <a:endParaRPr lang="ru-RU"/>
           </a:p>
@@ -489,7 +509,7 @@
           <a:p>
             <a:fld id="{57E389D1-C2F8-40B4-B845-801280EA792C}" type="datetimeFigureOut">
               <a:rPr lang="ru-RU" smtClean="0"/>
-              <a:t>01.10.2015</a:t>
+              <a:t>07.10.2015</a:t>
             </a:fld>
             <a:endParaRPr lang="ru-RU"/>
           </a:p>
@@ -669,7 +689,7 @@
           <a:p>
             <a:fld id="{57E389D1-C2F8-40B4-B845-801280EA792C}" type="datetimeFigureOut">
               <a:rPr lang="ru-RU" smtClean="0"/>
-              <a:t>01.10.2015</a:t>
+              <a:t>07.10.2015</a:t>
             </a:fld>
             <a:endParaRPr lang="ru-RU"/>
           </a:p>
@@ -839,7 +859,7 @@
           <a:p>
             <a:fld id="{57E389D1-C2F8-40B4-B845-801280EA792C}" type="datetimeFigureOut">
               <a:rPr lang="ru-RU" smtClean="0"/>
-              <a:t>01.10.2015</a:t>
+              <a:t>07.10.2015</a:t>
             </a:fld>
             <a:endParaRPr lang="ru-RU"/>
           </a:p>
@@ -1085,7 +1105,7 @@
           <a:p>
             <a:fld id="{57E389D1-C2F8-40B4-B845-801280EA792C}" type="datetimeFigureOut">
               <a:rPr lang="ru-RU" smtClean="0"/>
-              <a:t>01.10.2015</a:t>
+              <a:t>07.10.2015</a:t>
             </a:fld>
             <a:endParaRPr lang="ru-RU"/>
           </a:p>
@@ -1373,7 +1393,7 @@
           <a:p>
             <a:fld id="{57E389D1-C2F8-40B4-B845-801280EA792C}" type="datetimeFigureOut">
               <a:rPr lang="ru-RU" smtClean="0"/>
-              <a:t>01.10.2015</a:t>
+              <a:t>07.10.2015</a:t>
             </a:fld>
             <a:endParaRPr lang="ru-RU"/>
           </a:p>
@@ -1795,7 +1815,7 @@
           <a:p>
             <a:fld id="{57E389D1-C2F8-40B4-B845-801280EA792C}" type="datetimeFigureOut">
               <a:rPr lang="ru-RU" smtClean="0"/>
-              <a:t>01.10.2015</a:t>
+              <a:t>07.10.2015</a:t>
             </a:fld>
             <a:endParaRPr lang="ru-RU"/>
           </a:p>
@@ -1913,7 +1933,7 @@
           <a:p>
             <a:fld id="{57E389D1-C2F8-40B4-B845-801280EA792C}" type="datetimeFigureOut">
               <a:rPr lang="ru-RU" smtClean="0"/>
-              <a:t>01.10.2015</a:t>
+              <a:t>07.10.2015</a:t>
             </a:fld>
             <a:endParaRPr lang="ru-RU"/>
           </a:p>
@@ -2008,7 +2028,7 @@
           <a:p>
             <a:fld id="{57E389D1-C2F8-40B4-B845-801280EA792C}" type="datetimeFigureOut">
               <a:rPr lang="ru-RU" smtClean="0"/>
-              <a:t>01.10.2015</a:t>
+              <a:t>07.10.2015</a:t>
             </a:fld>
             <a:endParaRPr lang="ru-RU"/>
           </a:p>
@@ -2285,7 +2305,7 @@
           <a:p>
             <a:fld id="{57E389D1-C2F8-40B4-B845-801280EA792C}" type="datetimeFigureOut">
               <a:rPr lang="ru-RU" smtClean="0"/>
-              <a:t>01.10.2015</a:t>
+              <a:t>07.10.2015</a:t>
             </a:fld>
             <a:endParaRPr lang="ru-RU"/>
           </a:p>
@@ -2538,7 +2558,7 @@
           <a:p>
             <a:fld id="{57E389D1-C2F8-40B4-B845-801280EA792C}" type="datetimeFigureOut">
               <a:rPr lang="ru-RU" smtClean="0"/>
-              <a:t>01.10.2015</a:t>
+              <a:t>07.10.2015</a:t>
             </a:fld>
             <a:endParaRPr lang="ru-RU"/>
           </a:p>
@@ -2751,7 +2771,7 @@
           <a:p>
             <a:fld id="{57E389D1-C2F8-40B4-B845-801280EA792C}" type="datetimeFigureOut">
               <a:rPr lang="ru-RU" smtClean="0"/>
-              <a:t>01.10.2015</a:t>
+              <a:t>07.10.2015</a:t>
             </a:fld>
             <a:endParaRPr lang="ru-RU"/>
           </a:p>
@@ -3217,8 +3237,12 @@
           <a:lstStyle/>
           <a:p>
             <a:r>
-              <a:rPr lang="en-US" dirty="0" smtClean="0"/>
-              <a:t>Performance</a:t>
+              <a:rPr lang="en-US" dirty="0" err="1" smtClean="0"/>
+              <a:t>Microservices</a:t>
+            </a:r>
+            <a:r>
+              <a:rPr lang="en-US" dirty="0" smtClean="0"/>
+              <a:t> Design</a:t>
             </a:r>
             <a:endParaRPr lang="ru-RU" dirty="0"/>
           </a:p>
@@ -3236,30 +3260,81 @@
         </p:nvSpPr>
         <p:spPr/>
         <p:txBody>
-          <a:bodyPr/>
-          <a:lstStyle/>
-          <a:p>
-            <a:r>
-              <a:rPr lang="en-US" dirty="0" smtClean="0"/>
-              <a:t>2 kind of services</a:t>
+          <a:bodyPr>
+            <a:normAutofit fontScale="85000" lnSpcReduction="20000"/>
+          </a:bodyPr>
+          <a:lstStyle/>
+          <a:p>
+            <a:r>
+              <a:rPr lang="en-US" dirty="0" smtClean="0"/>
+              <a:t>Interaction Protocol</a:t>
             </a:r>
           </a:p>
           <a:p>
             <a:pPr lvl="1"/>
             <a:r>
-              <a:rPr lang="en-US" dirty="0" err="1" smtClean="0"/>
-              <a:t>Async</a:t>
-            </a:r>
-            <a:endParaRPr lang="en-US" dirty="0" smtClean="0"/>
+              <a:rPr lang="en-US" dirty="0" smtClean="0"/>
+              <a:t>REST</a:t>
+            </a:r>
           </a:p>
           <a:p>
             <a:pPr lvl="1"/>
             <a:r>
               <a:rPr lang="en-US" dirty="0" smtClean="0"/>
-              <a:t>Sync</a:t>
-            </a:r>
-          </a:p>
-          <a:p>
+              <a:t>Messaging </a:t>
+            </a:r>
+          </a:p>
+          <a:p>
+            <a:pPr lvl="2"/>
+            <a:r>
+              <a:rPr lang="en-US" dirty="0" smtClean="0"/>
+              <a:t>JMS</a:t>
+            </a:r>
+          </a:p>
+          <a:p>
+            <a:r>
+              <a:rPr lang="en-US" dirty="0" smtClean="0"/>
+              <a:t>Compatibility</a:t>
+            </a:r>
+          </a:p>
+          <a:p>
+            <a:pPr lvl="1"/>
+            <a:r>
+              <a:rPr lang="en-US" dirty="0" smtClean="0"/>
+              <a:t>Trying to keep</a:t>
+            </a:r>
+          </a:p>
+          <a:p>
+            <a:pPr lvl="1"/>
+            <a:r>
+              <a:rPr lang="en-US" dirty="0" smtClean="0"/>
+              <a:t>Versioning system (different)</a:t>
+            </a:r>
+          </a:p>
+          <a:p>
+            <a:r>
+              <a:rPr lang="en-US" dirty="0" smtClean="0"/>
+              <a:t>Documentation</a:t>
+            </a:r>
+          </a:p>
+          <a:p>
+            <a:pPr lvl="1"/>
+            <a:r>
+              <a:rPr lang="en-US" dirty="0" smtClean="0"/>
+              <a:t>Should be thorough (word)</a:t>
+            </a:r>
+          </a:p>
+          <a:p>
+            <a:r>
+              <a:rPr lang="en-US" dirty="0" smtClean="0"/>
+              <a:t>Stateless</a:t>
+            </a:r>
+          </a:p>
+          <a:p>
+            <a:r>
+              <a:rPr lang="en-US" dirty="0" smtClean="0"/>
+              <a:t>Decentralized Data</a:t>
+            </a:r>
             <a:endParaRPr lang="ru-RU" dirty="0"/>
           </a:p>
         </p:txBody>
@@ -3267,13 +3342,20 @@
     </p:spTree>
     <p:extLst>
       <p:ext uri="{BB962C8B-B14F-4D97-AF65-F5344CB8AC3E}">
-        <p14:creationId xmlns:p14="http://schemas.microsoft.com/office/powerpoint/2010/main" val="365429632"/>
+        <p14:creationId xmlns:p14="http://schemas.microsoft.com/office/powerpoint/2010/main" val="3153769468"/>
       </p:ext>
     </p:extLst>
   </p:cSld>
   <p:clrMapOvr>
     <a:masterClrMapping/>
   </p:clrMapOvr>
+  <p:timing>
+    <p:tnLst>
+      <p:par>
+        <p:cTn id="1" dur="indefinite" restart="never" nodeType="tmRoot"/>
+      </p:par>
+    </p:tnLst>
+  </p:timing>
 </p:sld>
 </file>
 
@@ -3309,11 +3391,7 @@
           <a:bodyPr/>
           <a:lstStyle/>
           <a:p>
-            <a:r>
-              <a:rPr lang="en-US" dirty="0" smtClean="0"/>
-              <a:t>Sync</a:t>
-            </a:r>
-            <a:endParaRPr lang="ru-RU" dirty="0"/>
+            <a:endParaRPr lang="ru-RU"/>
           </a:p>
         </p:txBody>
       </p:sp>
@@ -3332,38 +3410,88 @@
           <a:bodyPr/>
           <a:lstStyle/>
           <a:p>
-            <a:r>
-              <a:rPr lang="en-US" dirty="0" smtClean="0"/>
-              <a:t>As fast as possible</a:t>
-            </a:r>
-          </a:p>
-          <a:p>
-            <a:r>
-              <a:rPr lang="en-US" dirty="0" smtClean="0"/>
-              <a:t>Cache retrieval</a:t>
-            </a:r>
-          </a:p>
-          <a:p>
-            <a:pPr lvl="1"/>
-            <a:r>
-              <a:rPr lang="en-US" dirty="0" smtClean="0"/>
-              <a:t>Guava for small </a:t>
-            </a:r>
-            <a:r>
-              <a:rPr lang="en-US" dirty="0" smtClean="0"/>
-              <a:t>caches</a:t>
-            </a:r>
-          </a:p>
-          <a:p>
-            <a:pPr lvl="2"/>
+            <a:pPr marL="0" indent="0">
+              <a:buNone/>
+            </a:pPr>
+            <a:r>
+              <a:rPr lang="en-US" u="sng" dirty="0"/>
+              <a:t>Decentralized </a:t>
+            </a:r>
+            <a:r>
+              <a:rPr lang="en-US" u="sng" dirty="0" smtClean="0"/>
+              <a:t>Governance</a:t>
+            </a:r>
+          </a:p>
+          <a:p>
+            <a:pPr marL="0" indent="0">
+              <a:buNone/>
+            </a:pPr>
+            <a:r>
+              <a:rPr lang="en-US" dirty="0" smtClean="0"/>
+              <a:t> - Different technologies for different purposes</a:t>
+            </a:r>
+          </a:p>
+          <a:p>
+            <a:pPr marL="0" indent="0">
+              <a:buNone/>
+            </a:pPr>
             <a:r>
               <a:rPr lang="en-US" dirty="0"/>
-              <a:t>Eliminate process interaction</a:t>
-            </a:r>
-            <a:endParaRPr lang="ru-RU" dirty="0"/>
-          </a:p>
-          <a:p>
-            <a:pPr lvl="2"/>
+              <a:t>	</a:t>
+            </a:r>
+            <a:r>
+              <a:rPr lang="en-US" dirty="0" smtClean="0"/>
+              <a:t>- Different </a:t>
+            </a:r>
+            <a:r>
+              <a:rPr lang="en-US" dirty="0" smtClean="0"/>
+              <a:t>Frameworks/Storages</a:t>
+            </a:r>
+          </a:p>
+          <a:p>
+            <a:pPr marL="0" indent="0">
+              <a:buNone/>
+            </a:pPr>
+            <a:r>
+              <a:rPr lang="en-US" dirty="0" smtClean="0"/>
+              <a:t>		- polyglot persistence</a:t>
+            </a:r>
+            <a:endParaRPr lang="en-US" dirty="0" smtClean="0"/>
+          </a:p>
+          <a:p>
+            <a:pPr marL="0" indent="0">
+              <a:buNone/>
+            </a:pPr>
+            <a:r>
+              <a:rPr lang="en-US" dirty="0"/>
+              <a:t>	</a:t>
+            </a:r>
+            <a:r>
+              <a:rPr lang="en-US" dirty="0" smtClean="0"/>
+              <a:t>	- Mongo/</a:t>
+            </a:r>
+            <a:r>
+              <a:rPr lang="en-US" dirty="0" err="1" smtClean="0"/>
+              <a:t>Postgres</a:t>
+            </a:r>
+            <a:r>
+              <a:rPr lang="en-US" dirty="0" smtClean="0"/>
+              <a:t>/</a:t>
+            </a:r>
+            <a:r>
+              <a:rPr lang="en-US" dirty="0" err="1" smtClean="0"/>
+              <a:t>Lucene</a:t>
+            </a:r>
+            <a:endParaRPr lang="en-US" dirty="0" smtClean="0"/>
+          </a:p>
+          <a:p>
+            <a:pPr marL="0" indent="0">
+              <a:buNone/>
+            </a:pPr>
+            <a:r>
+              <a:rPr lang="en-US" dirty="0" smtClean="0"/>
+              <a:t>- But still have one platform/standards/libs</a:t>
+            </a:r>
             <a:endParaRPr lang="ru-RU" dirty="0"/>
           </a:p>
         </p:txBody>
@@ -3371,7 +3499,7 @@
     </p:spTree>
     <p:extLst>
       <p:ext uri="{BB962C8B-B14F-4D97-AF65-F5344CB8AC3E}">
-        <p14:creationId xmlns:p14="http://schemas.microsoft.com/office/powerpoint/2010/main" val="3413120925"/>
+        <p14:creationId xmlns:p14="http://schemas.microsoft.com/office/powerpoint/2010/main" val="1910416683"/>
       </p:ext>
     </p:extLst>
   </p:cSld>
@@ -3414,8 +3542,8 @@
           <a:lstStyle/>
           <a:p>
             <a:r>
-              <a:rPr lang="en-US" dirty="0" err="1" smtClean="0"/>
-              <a:t>Async</a:t>
+              <a:rPr lang="en-US" dirty="0" smtClean="0"/>
+              <a:t>Design</a:t>
             </a:r>
             <a:endParaRPr lang="ru-RU" dirty="0"/>
           </a:p>
@@ -3436,58 +3564,23 @@
           <a:bodyPr/>
           <a:lstStyle/>
           <a:p>
-            <a:r>
-              <a:rPr lang="en-US" dirty="0" smtClean="0"/>
-              <a:t>Approach with storing id, making work in background</a:t>
-            </a:r>
-          </a:p>
-          <a:p>
-            <a:pPr lvl="1"/>
-            <a:r>
-              <a:rPr lang="en-US" dirty="0" smtClean="0"/>
-              <a:t>Need a storage</a:t>
-            </a:r>
-          </a:p>
-          <a:p>
-            <a:pPr lvl="1"/>
-            <a:r>
-              <a:rPr lang="en-US" dirty="0" smtClean="0"/>
-              <a:t>Store data in, data out</a:t>
-            </a:r>
-          </a:p>
-          <a:p>
-            <a:pPr lvl="2"/>
-            <a:r>
-              <a:rPr lang="en-US" dirty="0" smtClean="0"/>
-              <a:t>Duplicates, but need for recovery</a:t>
-            </a:r>
-          </a:p>
-          <a:p>
-            <a:r>
-              <a:rPr lang="en-US" dirty="0" smtClean="0"/>
-              <a:t>Provide a way to get a state</a:t>
-            </a:r>
-          </a:p>
-          <a:p>
-            <a:pPr lvl="1"/>
-            <a:r>
-              <a:rPr lang="en-US" dirty="0" smtClean="0"/>
-              <a:t>Get Status REST</a:t>
-            </a:r>
-          </a:p>
-          <a:p>
-            <a:pPr lvl="1"/>
-            <a:r>
-              <a:rPr lang="en-US" dirty="0" err="1" smtClean="0"/>
-              <a:t>Async</a:t>
-            </a:r>
-            <a:r>
-              <a:rPr lang="en-US" dirty="0" smtClean="0"/>
-              <a:t> Result message</a:t>
-            </a:r>
-          </a:p>
-          <a:p>
-            <a:pPr lvl="1"/>
+            <a:pPr marL="0" indent="0">
+              <a:buNone/>
+            </a:pPr>
+            <a:r>
+              <a:rPr lang="en-US" u="sng" dirty="0"/>
+              <a:t>Decentralized Data</a:t>
+            </a:r>
+            <a:endParaRPr lang="ru-RU" u="sng" dirty="0"/>
+          </a:p>
+          <a:p>
+            <a:endParaRPr lang="en-US" dirty="0" smtClean="0"/>
+          </a:p>
+          <a:p>
+            <a:r>
+              <a:rPr lang="en-US" dirty="0" smtClean="0"/>
+              <a:t>No access to DB of 3rd application</a:t>
+            </a:r>
             <a:endParaRPr lang="ru-RU" dirty="0"/>
           </a:p>
         </p:txBody>
@@ -3495,7 +3588,7 @@
     </p:spTree>
     <p:extLst>
       <p:ext uri="{BB962C8B-B14F-4D97-AF65-F5344CB8AC3E}">
-        <p14:creationId xmlns:p14="http://schemas.microsoft.com/office/powerpoint/2010/main" val="4035124494"/>
+        <p14:creationId xmlns:p14="http://schemas.microsoft.com/office/powerpoint/2010/main" val="1361634447"/>
       </p:ext>
     </p:extLst>
   </p:cSld>
@@ -3537,11 +3630,7 @@
           <a:bodyPr/>
           <a:lstStyle/>
           <a:p>
-            <a:r>
-              <a:rPr lang="en-US" dirty="0" smtClean="0"/>
-              <a:t>Failures</a:t>
-            </a:r>
-            <a:endParaRPr lang="ru-RU" dirty="0"/>
+            <a:endParaRPr lang="ru-RU"/>
           </a:p>
         </p:txBody>
       </p:sp>
@@ -3558,82 +3647,134 @@
         <p:spPr/>
         <p:txBody>
           <a:bodyPr>
-            <a:normAutofit lnSpcReduction="10000"/>
+            <a:normAutofit fontScale="92500" lnSpcReduction="10000"/>
           </a:bodyPr>
           <a:lstStyle/>
           <a:p>
             <a:r>
-              <a:rPr lang="en-US" dirty="0" smtClean="0"/>
-              <a:t>Be ready for failures</a:t>
-            </a:r>
-          </a:p>
-          <a:p>
-            <a:r>
-              <a:rPr lang="en-US" dirty="0" smtClean="0"/>
-              <a:t>Be ready to recover</a:t>
-            </a:r>
-          </a:p>
-          <a:p>
-            <a:r>
-              <a:rPr lang="en-US" dirty="0" smtClean="0"/>
-              <a:t>Identify failure points</a:t>
-            </a:r>
+              <a:rPr lang="ru-RU" u="sng" dirty="0" err="1"/>
+              <a:t>Design</a:t>
+            </a:r>
+            <a:r>
+              <a:rPr lang="ru-RU" u="sng" dirty="0"/>
+              <a:t> </a:t>
+            </a:r>
+            <a:r>
+              <a:rPr lang="ru-RU" u="sng" dirty="0" err="1"/>
+              <a:t>for</a:t>
+            </a:r>
+            <a:r>
+              <a:rPr lang="ru-RU" u="sng" dirty="0"/>
+              <a:t> </a:t>
+            </a:r>
+            <a:r>
+              <a:rPr lang="ru-RU" u="sng" dirty="0" err="1"/>
+              <a:t>failure</a:t>
+            </a:r>
+            <a:r>
+              <a:rPr lang="ru-RU" u="sng" dirty="0"/>
+              <a:t> | Проектирование под </a:t>
+            </a:r>
+            <a:r>
+              <a:rPr lang="ru-RU" u="sng" dirty="0" smtClean="0"/>
+              <a:t>отказ</a:t>
+            </a:r>
+            <a:endParaRPr lang="en-US" u="sng" dirty="0" smtClean="0"/>
           </a:p>
           <a:p>
             <a:pPr lvl="1"/>
             <a:r>
-              <a:rPr lang="en-US" dirty="0" smtClean="0"/>
-              <a:t>Show on our application</a:t>
-            </a:r>
-          </a:p>
-          <a:p>
-            <a:r>
-              <a:rPr lang="en-US" dirty="0" smtClean="0"/>
-              <a:t>Identify how to recover</a:t>
+              <a:rPr lang="en-US" u="sng" dirty="0" smtClean="0"/>
+              <a:t>Detect</a:t>
+            </a:r>
+          </a:p>
+          <a:p>
+            <a:pPr lvl="2"/>
+            <a:r>
+              <a:rPr lang="en-US" u="sng" dirty="0" smtClean="0"/>
+              <a:t>Monitoring</a:t>
+            </a:r>
+          </a:p>
+          <a:p>
+            <a:pPr lvl="3"/>
+            <a:r>
+              <a:rPr lang="en-US" u="sng" dirty="0" smtClean="0"/>
+              <a:t>Logs monitoring near </a:t>
+            </a:r>
+            <a:r>
+              <a:rPr lang="en-US" u="sng" dirty="0" smtClean="0"/>
+              <a:t>real-time (</a:t>
+            </a:r>
+            <a:r>
+              <a:rPr lang="en-US" u="sng" dirty="0" err="1" smtClean="0"/>
+              <a:t>splunk</a:t>
+            </a:r>
+            <a:r>
+              <a:rPr lang="en-US" u="sng" dirty="0" smtClean="0"/>
+              <a:t>)</a:t>
+            </a:r>
+          </a:p>
+          <a:p>
+            <a:pPr lvl="2"/>
+            <a:r>
+              <a:rPr lang="en-US" u="sng" dirty="0" smtClean="0"/>
+              <a:t>Extensive Logging</a:t>
+            </a:r>
+          </a:p>
+          <a:p>
+            <a:pPr lvl="2"/>
+            <a:r>
+              <a:rPr lang="en-US" u="sng" dirty="0" smtClean="0"/>
+              <a:t>Defensive Programming</a:t>
             </a:r>
           </a:p>
           <a:p>
             <a:pPr lvl="1"/>
             <a:r>
-              <a:rPr lang="en-US" dirty="0" smtClean="0"/>
-              <a:t>Sync- client side recovery</a:t>
+              <a:rPr lang="en-US" u="sng" dirty="0" smtClean="0"/>
+              <a:t>Overcome</a:t>
             </a:r>
           </a:p>
           <a:p>
             <a:pPr lvl="2"/>
             <a:r>
-              <a:rPr lang="en-US" dirty="0" smtClean="0"/>
-              <a:t>Responsible: client</a:t>
-            </a:r>
+              <a:rPr lang="en-US" u="sng" dirty="0" smtClean="0"/>
+              <a:t>Manual: monitoring emails</a:t>
+            </a:r>
+            <a:endParaRPr lang="en-US" u="sng" dirty="0" smtClean="0"/>
+          </a:p>
+          <a:p>
+            <a:pPr lvl="2"/>
+            <a:r>
+              <a:rPr lang="en-US" u="sng" dirty="0" smtClean="0"/>
+              <a:t>Automatic</a:t>
+            </a:r>
+          </a:p>
+          <a:p>
+            <a:pPr lvl="3"/>
+            <a:r>
+              <a:rPr lang="en-US" u="sng" dirty="0" smtClean="0"/>
+              <a:t>High Availability (Load balancing)</a:t>
+            </a:r>
+          </a:p>
+          <a:p>
+            <a:pPr lvl="3"/>
+            <a:r>
+              <a:rPr lang="en-US" u="sng" dirty="0" smtClean="0"/>
+              <a:t>Automatic retry</a:t>
+            </a:r>
+            <a:endParaRPr lang="en-US" u="sng" dirty="0" smtClean="0"/>
           </a:p>
           <a:p>
             <a:pPr lvl="1"/>
-            <a:r>
-              <a:rPr lang="en-US" dirty="0" err="1" smtClean="0"/>
-              <a:t>Async</a:t>
-            </a:r>
-            <a:r>
-              <a:rPr lang="en-US" dirty="0" smtClean="0"/>
-              <a:t>- server side recovery</a:t>
-            </a:r>
-          </a:p>
-          <a:p>
-            <a:pPr lvl="2"/>
-            <a:r>
-              <a:rPr lang="en-US" dirty="0" smtClean="0"/>
-              <a:t>Responsible: you</a:t>
-            </a:r>
-          </a:p>
-          <a:p>
-            <a:pPr lvl="2"/>
-            <a:endParaRPr lang="ru-RU" dirty="0"/>
+            <a:endParaRPr lang="ru-RU" u="sng" dirty="0"/>
           </a:p>
         </p:txBody>
       </p:sp>
     </p:spTree>
     <p:extLst>
       <p:ext uri="{BB962C8B-B14F-4D97-AF65-F5344CB8AC3E}">
-        <p14:creationId xmlns:p14="http://schemas.microsoft.com/office/powerpoint/2010/main" val="2944986697"/>
+        <p14:creationId xmlns:p14="http://schemas.microsoft.com/office/powerpoint/2010/main" val="555567851"/>
       </p:ext>
     </p:extLst>
   </p:cSld>
@@ -3677,11 +3818,7 @@
           <a:p>
             <a:r>
               <a:rPr lang="en-US" dirty="0" smtClean="0"/>
-              <a:t>Failures: </a:t>
-            </a:r>
-            <a:r>
-              <a:rPr lang="en-US" dirty="0" err="1" smtClean="0"/>
-              <a:t>Async</a:t>
+              <a:t>Design: Client-oriented</a:t>
             </a:r>
             <a:endParaRPr lang="ru-RU" dirty="0"/>
           </a:p>
@@ -3704,13 +3841,20 @@
           <a:p>
             <a:r>
               <a:rPr lang="en-US" dirty="0" smtClean="0"/>
-              <a:t>Redelivery</a:t>
-            </a:r>
-          </a:p>
-          <a:p>
-            <a:r>
-              <a:rPr lang="en-US" dirty="0" smtClean="0"/>
-              <a:t>DLQ</a:t>
+              <a:t>Helper client libs</a:t>
+            </a:r>
+          </a:p>
+          <a:p>
+            <a:pPr lvl="1"/>
+            <a:r>
+              <a:rPr lang="en-US" dirty="0" smtClean="0"/>
+              <a:t>Rup-rest example</a:t>
+            </a:r>
+          </a:p>
+          <a:p>
+            <a:r>
+              <a:rPr lang="en-US" dirty="0" smtClean="0"/>
+              <a:t>Steward API</a:t>
             </a:r>
             <a:endParaRPr lang="ru-RU" dirty="0"/>
           </a:p>
@@ -3719,7 +3863,7 @@
     </p:spTree>
     <p:extLst>
       <p:ext uri="{BB962C8B-B14F-4D97-AF65-F5344CB8AC3E}">
-        <p14:creationId xmlns:p14="http://schemas.microsoft.com/office/powerpoint/2010/main" val="3290812372"/>
+        <p14:creationId xmlns:p14="http://schemas.microsoft.com/office/powerpoint/2010/main" val="1995439128"/>
       </p:ext>
     </p:extLst>
   </p:cSld>
@@ -3748,7 +3892,7 @@
       </p:grpSpPr>
       <p:sp>
         <p:nvSpPr>
-          <p:cNvPr id="2" name="Title 1"/>
+          <p:cNvPr id="2" name="Заголовок 1"/>
           <p:cNvSpPr>
             <a:spLocks noGrp="1"/>
           </p:cNvSpPr>
@@ -3761,13 +3905,17 @@
           <a:bodyPr/>
           <a:lstStyle/>
           <a:p>
-            <a:endParaRPr lang="en-US" dirty="0"/>
-          </a:p>
-        </p:txBody>
-      </p:sp>
-      <p:sp>
-        <p:nvSpPr>
-          <p:cNvPr id="3" name="Content Placeholder 2"/>
+            <a:r>
+              <a:rPr lang="en-US" dirty="0" smtClean="0"/>
+              <a:t>Performance</a:t>
+            </a:r>
+            <a:endParaRPr lang="ru-RU" dirty="0"/>
+          </a:p>
+        </p:txBody>
+      </p:sp>
+      <p:sp>
+        <p:nvSpPr>
+          <p:cNvPr id="3" name="Объект 2"/>
           <p:cNvSpPr>
             <a:spLocks noGrp="1"/>
           </p:cNvSpPr>
@@ -3781,17 +3929,39 @@
           <a:lstStyle/>
           <a:p>
             <a:r>
-              <a:rPr lang="en-US" smtClean="0"/>
-              <a:t>Developers perform Support </a:t>
-            </a:r>
-            <a:endParaRPr lang="en-US" dirty="0"/>
+              <a:rPr lang="en-US" dirty="0" smtClean="0"/>
+              <a:t>2 kind of services</a:t>
+            </a:r>
+          </a:p>
+          <a:p>
+            <a:pPr lvl="1"/>
+            <a:r>
+              <a:rPr lang="en-US" dirty="0" err="1" smtClean="0"/>
+              <a:t>Async</a:t>
+            </a:r>
+            <a:r>
+              <a:rPr lang="en-US" dirty="0" smtClean="0"/>
+              <a:t> (usually CUD in CRUD)</a:t>
+            </a:r>
+            <a:endParaRPr lang="en-US" dirty="0" smtClean="0"/>
+          </a:p>
+          <a:p>
+            <a:pPr lvl="1"/>
+            <a:r>
+              <a:rPr lang="en-US" dirty="0" smtClean="0"/>
+              <a:t>Sync (usually R in CRUD)</a:t>
+            </a:r>
+            <a:endParaRPr lang="en-US" dirty="0" smtClean="0"/>
+          </a:p>
+          <a:p>
+            <a:endParaRPr lang="ru-RU" dirty="0"/>
           </a:p>
         </p:txBody>
       </p:sp>
     </p:spTree>
     <p:extLst>
       <p:ext uri="{BB962C8B-B14F-4D97-AF65-F5344CB8AC3E}">
-        <p14:creationId xmlns:p14="http://schemas.microsoft.com/office/powerpoint/2010/main" val="3122075378"/>
+        <p14:creationId xmlns:p14="http://schemas.microsoft.com/office/powerpoint/2010/main" val="365429632"/>
       </p:ext>
     </p:extLst>
   </p:cSld>
@@ -3833,7 +4003,11 @@
           <a:bodyPr/>
           <a:lstStyle/>
           <a:p>
-            <a:endParaRPr lang="ru-RU"/>
+            <a:r>
+              <a:rPr lang="en-US" dirty="0" smtClean="0"/>
+              <a:t>Sync</a:t>
+            </a:r>
+            <a:endParaRPr lang="ru-RU" dirty="0"/>
           </a:p>
         </p:txBody>
       </p:sp>
@@ -3852,14 +4026,430 @@
           <a:bodyPr/>
           <a:lstStyle/>
           <a:p>
-            <a:endParaRPr lang="ru-RU"/>
+            <a:r>
+              <a:rPr lang="en-US" dirty="0" smtClean="0"/>
+              <a:t>As fast as </a:t>
+            </a:r>
+            <a:r>
+              <a:rPr lang="en-US" dirty="0" smtClean="0"/>
+              <a:t>possible</a:t>
+            </a:r>
+          </a:p>
+          <a:p>
+            <a:pPr lvl="1"/>
+            <a:r>
+              <a:rPr lang="en-US" dirty="0" smtClean="0"/>
+              <a:t>Everything that do not require user attention/participation, made </a:t>
+            </a:r>
+            <a:r>
+              <a:rPr lang="en-US" dirty="0" err="1" smtClean="0"/>
+              <a:t>async</a:t>
+            </a:r>
+            <a:endParaRPr lang="en-US" dirty="0" smtClean="0"/>
+          </a:p>
+          <a:p>
+            <a:pPr marL="457200" lvl="1" indent="0">
+              <a:buNone/>
+            </a:pPr>
+            <a:r>
+              <a:rPr lang="en-US" sz="2400" i="1" dirty="0" smtClean="0"/>
+              <a:t>Store order(s) -&gt; Charge Money (s) -&gt; Create License (a)</a:t>
+            </a:r>
+            <a:endParaRPr lang="en-US" sz="2400" i="1" dirty="0" smtClean="0"/>
+          </a:p>
+          <a:p>
+            <a:r>
+              <a:rPr lang="en-US" dirty="0" smtClean="0"/>
+              <a:t>Cache retrieval</a:t>
+            </a:r>
+          </a:p>
+          <a:p>
+            <a:pPr lvl="1"/>
+            <a:r>
+              <a:rPr lang="en-US" dirty="0" smtClean="0"/>
+              <a:t>Guava for small caches</a:t>
+            </a:r>
+          </a:p>
+          <a:p>
+            <a:pPr lvl="2"/>
+            <a:r>
+              <a:rPr lang="en-US" dirty="0"/>
+              <a:t>Eliminate process interaction</a:t>
+            </a:r>
+            <a:endParaRPr lang="ru-RU" dirty="0"/>
+          </a:p>
+          <a:p>
+            <a:pPr lvl="2"/>
+            <a:endParaRPr lang="ru-RU" dirty="0"/>
           </a:p>
         </p:txBody>
       </p:sp>
     </p:spTree>
     <p:extLst>
       <p:ext uri="{BB962C8B-B14F-4D97-AF65-F5344CB8AC3E}">
-        <p14:creationId xmlns:p14="http://schemas.microsoft.com/office/powerpoint/2010/main" val="1486434484"/>
+        <p14:creationId xmlns:p14="http://schemas.microsoft.com/office/powerpoint/2010/main" val="3413120925"/>
+      </p:ext>
+    </p:extLst>
+  </p:cSld>
+  <p:clrMapOvr>
+    <a:masterClrMapping/>
+  </p:clrMapOvr>
+</p:sld>
+</file>
+
+<file path=ppt/slides/slide17.xml><?xml version="1.0" encoding="utf-8"?>
+<p:sld xmlns:a="http://schemas.openxmlformats.org/drawingml/2006/main" xmlns:r="http://schemas.openxmlformats.org/officeDocument/2006/relationships" xmlns:p="http://schemas.openxmlformats.org/presentationml/2006/main">
+  <p:cSld>
+    <p:spTree>
+      <p:nvGrpSpPr>
+        <p:cNvPr id="1" name=""/>
+        <p:cNvGrpSpPr/>
+        <p:nvPr/>
+      </p:nvGrpSpPr>
+      <p:grpSpPr>
+        <a:xfrm>
+          <a:off x="0" y="0"/>
+          <a:ext cx="0" cy="0"/>
+          <a:chOff x="0" y="0"/>
+          <a:chExt cx="0" cy="0"/>
+        </a:xfrm>
+      </p:grpSpPr>
+      <p:sp>
+        <p:nvSpPr>
+          <p:cNvPr id="2" name="Заголовок 1"/>
+          <p:cNvSpPr>
+            <a:spLocks noGrp="1"/>
+          </p:cNvSpPr>
+          <p:nvPr>
+            <p:ph type="title"/>
+          </p:nvPr>
+        </p:nvSpPr>
+        <p:spPr/>
+        <p:txBody>
+          <a:bodyPr/>
+          <a:lstStyle/>
+          <a:p>
+            <a:r>
+              <a:rPr lang="en-US" dirty="0" err="1" smtClean="0"/>
+              <a:t>Async</a:t>
+            </a:r>
+            <a:endParaRPr lang="ru-RU" dirty="0"/>
+          </a:p>
+        </p:txBody>
+      </p:sp>
+      <p:sp>
+        <p:nvSpPr>
+          <p:cNvPr id="3" name="Объект 2"/>
+          <p:cNvSpPr>
+            <a:spLocks noGrp="1"/>
+          </p:cNvSpPr>
+          <p:nvPr>
+            <p:ph idx="1"/>
+          </p:nvPr>
+        </p:nvSpPr>
+        <p:spPr/>
+        <p:txBody>
+          <a:bodyPr>
+            <a:normAutofit/>
+          </a:bodyPr>
+          <a:lstStyle/>
+          <a:p>
+            <a:r>
+              <a:rPr lang="en-US" dirty="0" smtClean="0"/>
+              <a:t>Deferred Processing</a:t>
+            </a:r>
+          </a:p>
+          <a:p>
+            <a:pPr lvl="1"/>
+            <a:r>
+              <a:rPr lang="en-US" dirty="0" smtClean="0"/>
+              <a:t>Approach </a:t>
+            </a:r>
+            <a:r>
+              <a:rPr lang="en-US" dirty="0" smtClean="0"/>
+              <a:t>with storing id, making work in background</a:t>
+            </a:r>
+          </a:p>
+          <a:p>
+            <a:pPr lvl="2"/>
+            <a:r>
+              <a:rPr lang="en-US" dirty="0" smtClean="0"/>
+              <a:t>Need a storage</a:t>
+            </a:r>
+          </a:p>
+          <a:p>
+            <a:pPr lvl="2"/>
+            <a:r>
+              <a:rPr lang="en-US" dirty="0" smtClean="0"/>
+              <a:t>Store data in, data out</a:t>
+            </a:r>
+          </a:p>
+          <a:p>
+            <a:pPr lvl="3"/>
+            <a:r>
+              <a:rPr lang="en-US" dirty="0" smtClean="0"/>
+              <a:t>Duplicates, but need for recovery</a:t>
+            </a:r>
+          </a:p>
+          <a:p>
+            <a:pPr lvl="1"/>
+            <a:r>
+              <a:rPr lang="en-US" dirty="0" smtClean="0"/>
+              <a:t>Provide a way to get a state</a:t>
+            </a:r>
+          </a:p>
+          <a:p>
+            <a:pPr lvl="2"/>
+            <a:r>
+              <a:rPr lang="en-US" dirty="0" smtClean="0"/>
+              <a:t>Get Status REST</a:t>
+            </a:r>
+          </a:p>
+          <a:p>
+            <a:pPr lvl="2"/>
+            <a:r>
+              <a:rPr lang="en-US" dirty="0" err="1" smtClean="0"/>
+              <a:t>Async</a:t>
+            </a:r>
+            <a:r>
+              <a:rPr lang="en-US" dirty="0" smtClean="0"/>
+              <a:t> Result message</a:t>
+            </a:r>
+          </a:p>
+          <a:p>
+            <a:pPr lvl="1"/>
+            <a:endParaRPr lang="ru-RU" dirty="0"/>
+          </a:p>
+        </p:txBody>
+      </p:sp>
+    </p:spTree>
+    <p:extLst>
+      <p:ext uri="{BB962C8B-B14F-4D97-AF65-F5344CB8AC3E}">
+        <p14:creationId xmlns:p14="http://schemas.microsoft.com/office/powerpoint/2010/main" val="4035124494"/>
+      </p:ext>
+    </p:extLst>
+  </p:cSld>
+  <p:clrMapOvr>
+    <a:masterClrMapping/>
+  </p:clrMapOvr>
+</p:sld>
+</file>
+
+<file path=ppt/slides/slide18.xml><?xml version="1.0" encoding="utf-8"?>
+<p:sld xmlns:a="http://schemas.openxmlformats.org/drawingml/2006/main" xmlns:r="http://schemas.openxmlformats.org/officeDocument/2006/relationships" xmlns:p="http://schemas.openxmlformats.org/presentationml/2006/main">
+  <p:cSld>
+    <p:spTree>
+      <p:nvGrpSpPr>
+        <p:cNvPr id="1" name=""/>
+        <p:cNvGrpSpPr/>
+        <p:nvPr/>
+      </p:nvGrpSpPr>
+      <p:grpSpPr>
+        <a:xfrm>
+          <a:off x="0" y="0"/>
+          <a:ext cx="0" cy="0"/>
+          <a:chOff x="0" y="0"/>
+          <a:chExt cx="0" cy="0"/>
+        </a:xfrm>
+      </p:grpSpPr>
+      <p:sp>
+        <p:nvSpPr>
+          <p:cNvPr id="2" name="Заголовок 1"/>
+          <p:cNvSpPr>
+            <a:spLocks noGrp="1"/>
+          </p:cNvSpPr>
+          <p:nvPr>
+            <p:ph type="title"/>
+          </p:nvPr>
+        </p:nvSpPr>
+        <p:spPr/>
+        <p:txBody>
+          <a:bodyPr/>
+          <a:lstStyle/>
+          <a:p>
+            <a:r>
+              <a:rPr lang="en-US" dirty="0" smtClean="0"/>
+              <a:t>Failures</a:t>
+            </a:r>
+            <a:endParaRPr lang="ru-RU" dirty="0"/>
+          </a:p>
+        </p:txBody>
+      </p:sp>
+      <p:sp>
+        <p:nvSpPr>
+          <p:cNvPr id="3" name="Объект 2"/>
+          <p:cNvSpPr>
+            <a:spLocks noGrp="1"/>
+          </p:cNvSpPr>
+          <p:nvPr>
+            <p:ph idx="1"/>
+          </p:nvPr>
+        </p:nvSpPr>
+        <p:spPr/>
+        <p:txBody>
+          <a:bodyPr>
+            <a:normAutofit lnSpcReduction="10000"/>
+          </a:bodyPr>
+          <a:lstStyle/>
+          <a:p>
+            <a:r>
+              <a:rPr lang="en-US" dirty="0" smtClean="0"/>
+              <a:t>Be ready for failures</a:t>
+            </a:r>
+          </a:p>
+          <a:p>
+            <a:r>
+              <a:rPr lang="en-US" dirty="0" smtClean="0"/>
+              <a:t>Be ready to recover</a:t>
+            </a:r>
+          </a:p>
+          <a:p>
+            <a:r>
+              <a:rPr lang="en-US" dirty="0" smtClean="0"/>
+              <a:t>Identify failure points</a:t>
+            </a:r>
+          </a:p>
+          <a:p>
+            <a:pPr lvl="1"/>
+            <a:r>
+              <a:rPr lang="en-US" dirty="0" smtClean="0"/>
+              <a:t>Show on our application</a:t>
+            </a:r>
+          </a:p>
+          <a:p>
+            <a:r>
+              <a:rPr lang="en-US" dirty="0" smtClean="0"/>
+              <a:t>Identify how to recover</a:t>
+            </a:r>
+          </a:p>
+          <a:p>
+            <a:pPr lvl="1"/>
+            <a:r>
+              <a:rPr lang="en-US" dirty="0" smtClean="0"/>
+              <a:t>Sync- client side recovery</a:t>
+            </a:r>
+          </a:p>
+          <a:p>
+            <a:pPr lvl="2"/>
+            <a:r>
+              <a:rPr lang="en-US" dirty="0" smtClean="0"/>
+              <a:t>Responsible: client</a:t>
+            </a:r>
+          </a:p>
+          <a:p>
+            <a:pPr lvl="1"/>
+            <a:r>
+              <a:rPr lang="en-US" dirty="0" err="1" smtClean="0"/>
+              <a:t>Async</a:t>
+            </a:r>
+            <a:r>
+              <a:rPr lang="en-US" dirty="0" smtClean="0"/>
+              <a:t>- server side recovery</a:t>
+            </a:r>
+          </a:p>
+          <a:p>
+            <a:pPr lvl="2"/>
+            <a:r>
+              <a:rPr lang="en-US" dirty="0" smtClean="0"/>
+              <a:t>Responsible: you</a:t>
+            </a:r>
+          </a:p>
+          <a:p>
+            <a:pPr lvl="2"/>
+            <a:endParaRPr lang="ru-RU" dirty="0"/>
+          </a:p>
+        </p:txBody>
+      </p:sp>
+    </p:spTree>
+    <p:extLst>
+      <p:ext uri="{BB962C8B-B14F-4D97-AF65-F5344CB8AC3E}">
+        <p14:creationId xmlns:p14="http://schemas.microsoft.com/office/powerpoint/2010/main" val="2944986697"/>
+      </p:ext>
+    </p:extLst>
+  </p:cSld>
+  <p:clrMapOvr>
+    <a:masterClrMapping/>
+  </p:clrMapOvr>
+</p:sld>
+</file>
+
+<file path=ppt/slides/slide19.xml><?xml version="1.0" encoding="utf-8"?>
+<p:sld xmlns:a="http://schemas.openxmlformats.org/drawingml/2006/main" xmlns:r="http://schemas.openxmlformats.org/officeDocument/2006/relationships" xmlns:p="http://schemas.openxmlformats.org/presentationml/2006/main">
+  <p:cSld>
+    <p:spTree>
+      <p:nvGrpSpPr>
+        <p:cNvPr id="1" name=""/>
+        <p:cNvGrpSpPr/>
+        <p:nvPr/>
+      </p:nvGrpSpPr>
+      <p:grpSpPr>
+        <a:xfrm>
+          <a:off x="0" y="0"/>
+          <a:ext cx="0" cy="0"/>
+          <a:chOff x="0" y="0"/>
+          <a:chExt cx="0" cy="0"/>
+        </a:xfrm>
+      </p:grpSpPr>
+      <p:sp>
+        <p:nvSpPr>
+          <p:cNvPr id="2" name="Заголовок 1"/>
+          <p:cNvSpPr>
+            <a:spLocks noGrp="1"/>
+          </p:cNvSpPr>
+          <p:nvPr>
+            <p:ph type="title"/>
+          </p:nvPr>
+        </p:nvSpPr>
+        <p:spPr/>
+        <p:txBody>
+          <a:bodyPr/>
+          <a:lstStyle/>
+          <a:p>
+            <a:r>
+              <a:rPr lang="en-US" dirty="0" smtClean="0"/>
+              <a:t>Failures: </a:t>
+            </a:r>
+            <a:r>
+              <a:rPr lang="en-US" dirty="0" err="1" smtClean="0"/>
+              <a:t>Async</a:t>
+            </a:r>
+            <a:endParaRPr lang="ru-RU" dirty="0"/>
+          </a:p>
+        </p:txBody>
+      </p:sp>
+      <p:sp>
+        <p:nvSpPr>
+          <p:cNvPr id="3" name="Объект 2"/>
+          <p:cNvSpPr>
+            <a:spLocks noGrp="1"/>
+          </p:cNvSpPr>
+          <p:nvPr>
+            <p:ph idx="1"/>
+          </p:nvPr>
+        </p:nvSpPr>
+        <p:spPr/>
+        <p:txBody>
+          <a:bodyPr/>
+          <a:lstStyle/>
+          <a:p>
+            <a:r>
+              <a:rPr lang="en-US" dirty="0" smtClean="0"/>
+              <a:t>Redelivery</a:t>
+            </a:r>
+          </a:p>
+          <a:p>
+            <a:r>
+              <a:rPr lang="en-US" dirty="0" smtClean="0"/>
+              <a:t>DLQ</a:t>
+            </a:r>
+            <a:endParaRPr lang="ru-RU" dirty="0"/>
+          </a:p>
+        </p:txBody>
+      </p:sp>
+    </p:spTree>
+    <p:extLst>
+      <p:ext uri="{BB962C8B-B14F-4D97-AF65-F5344CB8AC3E}">
+        <p14:creationId xmlns:p14="http://schemas.microsoft.com/office/powerpoint/2010/main" val="3290812372"/>
       </p:ext>
     </p:extLst>
   </p:cSld>
@@ -3901,26 +4491,340 @@
           <a:bodyPr/>
           <a:lstStyle/>
           <a:p>
-            <a:endParaRPr lang="ru-RU"/>
-          </a:p>
-        </p:txBody>
-      </p:sp>
-      <p:sp>
-        <p:nvSpPr>
-          <p:cNvPr id="3" name="Объект 2"/>
-          <p:cNvSpPr>
-            <a:spLocks noGrp="1"/>
-          </p:cNvSpPr>
-          <p:nvPr>
-            <p:ph idx="1"/>
-          </p:nvPr>
-        </p:nvSpPr>
-        <p:spPr/>
-        <p:txBody>
-          <a:bodyPr/>
-          <a:lstStyle/>
-          <a:p>
+            <a:r>
+              <a:rPr lang="ru-RU" dirty="0" smtClean="0"/>
+              <a:t>Тип Архитектуры</a:t>
+            </a:r>
             <a:endParaRPr lang="ru-RU" dirty="0"/>
+          </a:p>
+        </p:txBody>
+      </p:sp>
+      <p:pic>
+        <p:nvPicPr>
+          <p:cNvPr id="1027" name="Picture 3"/>
+          <p:cNvPicPr>
+            <a:picLocks noChangeAspect="1" noChangeArrowheads="1"/>
+          </p:cNvPicPr>
+          <p:nvPr/>
+        </p:nvPicPr>
+        <p:blipFill>
+          <a:blip r:embed="rId2">
+            <a:extLst>
+              <a:ext uri="{28A0092B-C50C-407E-A947-70E740481C1C}">
+                <a14:useLocalDpi xmlns:a14="http://schemas.microsoft.com/office/drawing/2010/main" val="0"/>
+              </a:ext>
+            </a:extLst>
+          </a:blip>
+          <a:srcRect/>
+          <a:stretch>
+            <a:fillRect/>
+          </a:stretch>
+        </p:blipFill>
+        <p:spPr bwMode="auto">
+          <a:xfrm>
+            <a:off x="1889696" y="2848863"/>
+            <a:ext cx="1440160" cy="1472164"/>
+          </a:xfrm>
+          <a:prstGeom prst="rect">
+            <a:avLst/>
+          </a:prstGeom>
+          <a:noFill/>
+          <a:ln>
+            <a:noFill/>
+          </a:ln>
+          <a:effectLst/>
+          <a:extLst>
+            <a:ext uri="{909E8E84-426E-40DD-AFC4-6F175D3DCCD1}">
+              <a14:hiddenFill xmlns:a14="http://schemas.microsoft.com/office/drawing/2010/main">
+                <a:solidFill>
+                  <a:schemeClr val="accent1"/>
+                </a:solidFill>
+              </a14:hiddenFill>
+            </a:ext>
+            <a:ext uri="{91240B29-F687-4F45-9708-019B960494DF}">
+              <a14:hiddenLine xmlns:a14="http://schemas.microsoft.com/office/drawing/2010/main" w="9525">
+                <a:solidFill>
+                  <a:schemeClr val="tx1"/>
+                </a:solidFill>
+                <a:miter lim="800000"/>
+                <a:headEnd/>
+                <a:tailEnd/>
+              </a14:hiddenLine>
+            </a:ext>
+            <a:ext uri="{AF507438-7753-43E0-B8FC-AC1667EBCBE1}">
+              <a14:hiddenEffects xmlns:a14="http://schemas.microsoft.com/office/drawing/2010/main">
+                <a:effectLst>
+                  <a:outerShdw dist="35921" dir="2700000" algn="ctr" rotWithShape="0">
+                    <a:schemeClr val="bg2"/>
+                  </a:outerShdw>
+                </a:effectLst>
+              </a14:hiddenEffects>
+            </a:ext>
+          </a:extLst>
+        </p:spPr>
+      </p:pic>
+      <p:pic>
+        <p:nvPicPr>
+          <p:cNvPr id="1028" name="Picture 4"/>
+          <p:cNvPicPr>
+            <a:picLocks noChangeAspect="1" noChangeArrowheads="1"/>
+          </p:cNvPicPr>
+          <p:nvPr/>
+        </p:nvPicPr>
+        <p:blipFill>
+          <a:blip r:embed="rId3">
+            <a:extLst>
+              <a:ext uri="{28A0092B-C50C-407E-A947-70E740481C1C}">
+                <a14:useLocalDpi xmlns:a14="http://schemas.microsoft.com/office/drawing/2010/main" val="0"/>
+              </a:ext>
+            </a:extLst>
+          </a:blip>
+          <a:srcRect/>
+          <a:stretch>
+            <a:fillRect/>
+          </a:stretch>
+        </p:blipFill>
+        <p:spPr bwMode="auto">
+          <a:xfrm>
+            <a:off x="5070296" y="2787295"/>
+            <a:ext cx="720080" cy="720080"/>
+          </a:xfrm>
+          <a:prstGeom prst="rect">
+            <a:avLst/>
+          </a:prstGeom>
+          <a:noFill/>
+          <a:ln>
+            <a:noFill/>
+          </a:ln>
+          <a:effectLst/>
+          <a:extLst>
+            <a:ext uri="{909E8E84-426E-40DD-AFC4-6F175D3DCCD1}">
+              <a14:hiddenFill xmlns:a14="http://schemas.microsoft.com/office/drawing/2010/main">
+                <a:solidFill>
+                  <a:schemeClr val="accent1"/>
+                </a:solidFill>
+              </a14:hiddenFill>
+            </a:ext>
+            <a:ext uri="{91240B29-F687-4F45-9708-019B960494DF}">
+              <a14:hiddenLine xmlns:a14="http://schemas.microsoft.com/office/drawing/2010/main" w="9525">
+                <a:solidFill>
+                  <a:schemeClr val="tx1"/>
+                </a:solidFill>
+                <a:miter lim="800000"/>
+                <a:headEnd/>
+                <a:tailEnd/>
+              </a14:hiddenLine>
+            </a:ext>
+            <a:ext uri="{AF507438-7753-43E0-B8FC-AC1667EBCBE1}">
+              <a14:hiddenEffects xmlns:a14="http://schemas.microsoft.com/office/drawing/2010/main">
+                <a:effectLst>
+                  <a:outerShdw dist="35921" dir="2700000" algn="ctr" rotWithShape="0">
+                    <a:schemeClr val="bg2"/>
+                  </a:outerShdw>
+                </a:effectLst>
+              </a14:hiddenEffects>
+            </a:ext>
+          </a:extLst>
+        </p:spPr>
+      </p:pic>
+      <p:pic>
+        <p:nvPicPr>
+          <p:cNvPr id="1029" name="Picture 5"/>
+          <p:cNvPicPr>
+            <a:picLocks noChangeAspect="1" noChangeArrowheads="1"/>
+          </p:cNvPicPr>
+          <p:nvPr/>
+        </p:nvPicPr>
+        <p:blipFill>
+          <a:blip r:embed="rId4">
+            <a:extLst>
+              <a:ext uri="{28A0092B-C50C-407E-A947-70E740481C1C}">
+                <a14:useLocalDpi xmlns:a14="http://schemas.microsoft.com/office/drawing/2010/main" val="0"/>
+              </a:ext>
+            </a:extLst>
+          </a:blip>
+          <a:srcRect/>
+          <a:stretch>
+            <a:fillRect/>
+          </a:stretch>
+        </p:blipFill>
+        <p:spPr bwMode="auto">
+          <a:xfrm>
+            <a:off x="6021620" y="2998388"/>
+            <a:ext cx="650556" cy="650556"/>
+          </a:xfrm>
+          <a:prstGeom prst="rect">
+            <a:avLst/>
+          </a:prstGeom>
+          <a:noFill/>
+          <a:ln>
+            <a:noFill/>
+          </a:ln>
+          <a:effectLst/>
+          <a:extLst>
+            <a:ext uri="{909E8E84-426E-40DD-AFC4-6F175D3DCCD1}">
+              <a14:hiddenFill xmlns:a14="http://schemas.microsoft.com/office/drawing/2010/main">
+                <a:solidFill>
+                  <a:schemeClr val="accent1"/>
+                </a:solidFill>
+              </a14:hiddenFill>
+            </a:ext>
+            <a:ext uri="{91240B29-F687-4F45-9708-019B960494DF}">
+              <a14:hiddenLine xmlns:a14="http://schemas.microsoft.com/office/drawing/2010/main" w="9525">
+                <a:solidFill>
+                  <a:schemeClr val="tx1"/>
+                </a:solidFill>
+                <a:miter lim="800000"/>
+                <a:headEnd/>
+                <a:tailEnd/>
+              </a14:hiddenLine>
+            </a:ext>
+            <a:ext uri="{AF507438-7753-43E0-B8FC-AC1667EBCBE1}">
+              <a14:hiddenEffects xmlns:a14="http://schemas.microsoft.com/office/drawing/2010/main">
+                <a:effectLst>
+                  <a:outerShdw dist="35921" dir="2700000" algn="ctr" rotWithShape="0">
+                    <a:schemeClr val="bg2"/>
+                  </a:outerShdw>
+                </a:effectLst>
+              </a14:hiddenEffects>
+            </a:ext>
+          </a:extLst>
+        </p:spPr>
+      </p:pic>
+      <p:pic>
+        <p:nvPicPr>
+          <p:cNvPr id="1030" name="Picture 6"/>
+          <p:cNvPicPr>
+            <a:picLocks noChangeAspect="1" noChangeArrowheads="1"/>
+          </p:cNvPicPr>
+          <p:nvPr/>
+        </p:nvPicPr>
+        <p:blipFill>
+          <a:blip r:embed="rId5">
+            <a:extLst>
+              <a:ext uri="{28A0092B-C50C-407E-A947-70E740481C1C}">
+                <a14:useLocalDpi xmlns:a14="http://schemas.microsoft.com/office/drawing/2010/main" val="0"/>
+              </a:ext>
+            </a:extLst>
+          </a:blip>
+          <a:srcRect/>
+          <a:stretch>
+            <a:fillRect/>
+          </a:stretch>
+        </p:blipFill>
+        <p:spPr bwMode="auto">
+          <a:xfrm>
+            <a:off x="5644861" y="3759787"/>
+            <a:ext cx="690040" cy="690040"/>
+          </a:xfrm>
+          <a:prstGeom prst="rect">
+            <a:avLst/>
+          </a:prstGeom>
+          <a:noFill/>
+          <a:ln>
+            <a:noFill/>
+          </a:ln>
+          <a:effectLst/>
+          <a:extLst>
+            <a:ext uri="{909E8E84-426E-40DD-AFC4-6F175D3DCCD1}">
+              <a14:hiddenFill xmlns:a14="http://schemas.microsoft.com/office/drawing/2010/main">
+                <a:solidFill>
+                  <a:schemeClr val="accent1"/>
+                </a:solidFill>
+              </a14:hiddenFill>
+            </a:ext>
+            <a:ext uri="{91240B29-F687-4F45-9708-019B960494DF}">
+              <a14:hiddenLine xmlns:a14="http://schemas.microsoft.com/office/drawing/2010/main" w="9525">
+                <a:solidFill>
+                  <a:schemeClr val="tx1"/>
+                </a:solidFill>
+                <a:miter lim="800000"/>
+                <a:headEnd/>
+                <a:tailEnd/>
+              </a14:hiddenLine>
+            </a:ext>
+            <a:ext uri="{AF507438-7753-43E0-B8FC-AC1667EBCBE1}">
+              <a14:hiddenEffects xmlns:a14="http://schemas.microsoft.com/office/drawing/2010/main">
+                <a:effectLst>
+                  <a:outerShdw dist="35921" dir="2700000" algn="ctr" rotWithShape="0">
+                    <a:schemeClr val="bg2"/>
+                  </a:outerShdw>
+                </a:effectLst>
+              </a14:hiddenEffects>
+            </a:ext>
+          </a:extLst>
+        </p:spPr>
+      </p:pic>
+      <p:sp>
+        <p:nvSpPr>
+          <p:cNvPr id="4" name="TextBox 3"/>
+          <p:cNvSpPr txBox="1"/>
+          <p:nvPr/>
+        </p:nvSpPr>
+        <p:spPr>
+          <a:xfrm>
+            <a:off x="1313631" y="1807623"/>
+            <a:ext cx="2592289" cy="954107"/>
+          </a:xfrm>
+          <a:prstGeom prst="rect">
+            <a:avLst/>
+          </a:prstGeom>
+          <a:noFill/>
+        </p:spPr>
+        <p:txBody>
+          <a:bodyPr wrap="square" rtlCol="0">
+            <a:spAutoFit/>
+          </a:bodyPr>
+          <a:lstStyle/>
+          <a:p>
+            <a:pPr algn="ctr"/>
+            <a:r>
+              <a:rPr lang="ru-RU" sz="2800" dirty="0" smtClean="0"/>
+              <a:t>Монолитное приложение</a:t>
+            </a:r>
+            <a:endParaRPr lang="ru-RU" sz="2800" dirty="0"/>
+          </a:p>
+        </p:txBody>
+      </p:sp>
+      <p:sp>
+        <p:nvSpPr>
+          <p:cNvPr id="10" name="TextBox 9"/>
+          <p:cNvSpPr txBox="1"/>
+          <p:nvPr/>
+        </p:nvSpPr>
+        <p:spPr>
+          <a:xfrm>
+            <a:off x="4538581" y="1807621"/>
+            <a:ext cx="2902600" cy="954107"/>
+          </a:xfrm>
+          <a:prstGeom prst="rect">
+            <a:avLst/>
+          </a:prstGeom>
+          <a:noFill/>
+        </p:spPr>
+        <p:txBody>
+          <a:bodyPr wrap="square" rtlCol="0">
+            <a:spAutoFit/>
+          </a:bodyPr>
+          <a:lstStyle/>
+          <a:p>
+            <a:pPr algn="ctr"/>
+            <a:r>
+              <a:rPr lang="ru-RU" sz="2800" dirty="0" err="1" smtClean="0"/>
+              <a:t>Микросервисное</a:t>
+            </a:r>
+            <a:r>
+              <a:rPr lang="ru-RU" sz="2800" dirty="0" smtClean="0"/>
+              <a:t> </a:t>
+            </a:r>
+          </a:p>
+          <a:p>
+            <a:pPr algn="ctr"/>
+            <a:r>
+              <a:rPr lang="ru-RU" sz="2800" dirty="0" smtClean="0"/>
+              <a:t>приложение</a:t>
+            </a:r>
+            <a:endParaRPr lang="ru-RU" sz="2800" dirty="0"/>
           </a:p>
         </p:txBody>
       </p:sp>
@@ -3928,6 +4832,161 @@
     <p:extLst>
       <p:ext uri="{BB962C8B-B14F-4D97-AF65-F5344CB8AC3E}">
         <p14:creationId xmlns:p14="http://schemas.microsoft.com/office/powerpoint/2010/main" val="3638713563"/>
+      </p:ext>
+    </p:extLst>
+  </p:cSld>
+  <p:clrMapOvr>
+    <a:masterClrMapping/>
+  </p:clrMapOvr>
+</p:sld>
+</file>
+
+<file path=ppt/slides/slide20.xml><?xml version="1.0" encoding="utf-8"?>
+<p:sld xmlns:a="http://schemas.openxmlformats.org/drawingml/2006/main" xmlns:r="http://schemas.openxmlformats.org/officeDocument/2006/relationships" xmlns:p="http://schemas.openxmlformats.org/presentationml/2006/main">
+  <p:cSld>
+    <p:spTree>
+      <p:nvGrpSpPr>
+        <p:cNvPr id="1" name=""/>
+        <p:cNvGrpSpPr/>
+        <p:nvPr/>
+      </p:nvGrpSpPr>
+      <p:grpSpPr>
+        <a:xfrm>
+          <a:off x="0" y="0"/>
+          <a:ext cx="0" cy="0"/>
+          <a:chOff x="0" y="0"/>
+          <a:chExt cx="0" cy="0"/>
+        </a:xfrm>
+      </p:grpSpPr>
+      <p:sp>
+        <p:nvSpPr>
+          <p:cNvPr id="2" name="Title 1"/>
+          <p:cNvSpPr>
+            <a:spLocks noGrp="1"/>
+          </p:cNvSpPr>
+          <p:nvPr>
+            <p:ph type="title"/>
+          </p:nvPr>
+        </p:nvSpPr>
+        <p:spPr/>
+        <p:txBody>
+          <a:bodyPr/>
+          <a:lstStyle/>
+          <a:p>
+            <a:endParaRPr lang="en-US" dirty="0"/>
+          </a:p>
+        </p:txBody>
+      </p:sp>
+      <p:sp>
+        <p:nvSpPr>
+          <p:cNvPr id="3" name="Content Placeholder 2"/>
+          <p:cNvSpPr>
+            <a:spLocks noGrp="1"/>
+          </p:cNvSpPr>
+          <p:nvPr>
+            <p:ph idx="1"/>
+          </p:nvPr>
+        </p:nvSpPr>
+        <p:spPr/>
+        <p:txBody>
+          <a:bodyPr/>
+          <a:lstStyle/>
+          <a:p>
+            <a:r>
+              <a:rPr lang="en-US" dirty="0" smtClean="0"/>
+              <a:t>Developers perform </a:t>
+            </a:r>
+            <a:r>
+              <a:rPr lang="en-US" dirty="0" smtClean="0"/>
+              <a:t>Support</a:t>
+            </a:r>
+          </a:p>
+          <a:p>
+            <a:pPr lvl="1"/>
+            <a:r>
+              <a:rPr lang="en-US" dirty="0" smtClean="0"/>
+              <a:t>Helps to build tools to simplify support</a:t>
+            </a:r>
+            <a:r>
+              <a:rPr lang="en-US" dirty="0" smtClean="0"/>
+              <a:t> </a:t>
+            </a:r>
+            <a:endParaRPr lang="en-US" dirty="0"/>
+          </a:p>
+        </p:txBody>
+      </p:sp>
+    </p:spTree>
+    <p:extLst>
+      <p:ext uri="{BB962C8B-B14F-4D97-AF65-F5344CB8AC3E}">
+        <p14:creationId xmlns:p14="http://schemas.microsoft.com/office/powerpoint/2010/main" val="3122075378"/>
+      </p:ext>
+    </p:extLst>
+  </p:cSld>
+  <p:clrMapOvr>
+    <a:masterClrMapping/>
+  </p:clrMapOvr>
+</p:sld>
+</file>
+
+<file path=ppt/slides/slide21.xml><?xml version="1.0" encoding="utf-8"?>
+<p:sld xmlns:a="http://schemas.openxmlformats.org/drawingml/2006/main" xmlns:r="http://schemas.openxmlformats.org/officeDocument/2006/relationships" xmlns:p="http://schemas.openxmlformats.org/presentationml/2006/main">
+  <p:cSld>
+    <p:spTree>
+      <p:nvGrpSpPr>
+        <p:cNvPr id="1" name=""/>
+        <p:cNvGrpSpPr/>
+        <p:nvPr/>
+      </p:nvGrpSpPr>
+      <p:grpSpPr>
+        <a:xfrm>
+          <a:off x="0" y="0"/>
+          <a:ext cx="0" cy="0"/>
+          <a:chOff x="0" y="0"/>
+          <a:chExt cx="0" cy="0"/>
+        </a:xfrm>
+      </p:grpSpPr>
+      <p:sp>
+        <p:nvSpPr>
+          <p:cNvPr id="2" name="Заголовок 1"/>
+          <p:cNvSpPr>
+            <a:spLocks noGrp="1"/>
+          </p:cNvSpPr>
+          <p:nvPr>
+            <p:ph type="title"/>
+          </p:nvPr>
+        </p:nvSpPr>
+        <p:spPr/>
+        <p:txBody>
+          <a:bodyPr/>
+          <a:lstStyle/>
+          <a:p>
+            <a:endParaRPr lang="ru-RU"/>
+          </a:p>
+        </p:txBody>
+      </p:sp>
+      <p:sp>
+        <p:nvSpPr>
+          <p:cNvPr id="3" name="Объект 2"/>
+          <p:cNvSpPr>
+            <a:spLocks noGrp="1"/>
+          </p:cNvSpPr>
+          <p:nvPr>
+            <p:ph idx="1"/>
+          </p:nvPr>
+        </p:nvSpPr>
+        <p:spPr/>
+        <p:txBody>
+          <a:bodyPr/>
+          <a:lstStyle/>
+          <a:p>
+            <a:endParaRPr lang="ru-RU"/>
+          </a:p>
+        </p:txBody>
+      </p:sp>
+    </p:spTree>
+    <p:extLst>
+      <p:ext uri="{BB962C8B-B14F-4D97-AF65-F5344CB8AC3E}">
+        <p14:creationId xmlns:p14="http://schemas.microsoft.com/office/powerpoint/2010/main" val="1486434484"/>
       </p:ext>
     </p:extLst>
   </p:cSld>
@@ -3969,113 +5028,444 @@
           <a:bodyPr/>
           <a:lstStyle/>
           <a:p>
-            <a:endParaRPr lang="ru-RU"/>
-          </a:p>
-        </p:txBody>
-      </p:sp>
-      <p:sp>
-        <p:nvSpPr>
-          <p:cNvPr id="3" name="Объект 2"/>
-          <p:cNvSpPr>
-            <a:spLocks noGrp="1"/>
-          </p:cNvSpPr>
-          <p:nvPr>
-            <p:ph idx="1"/>
-          </p:nvPr>
-        </p:nvSpPr>
-        <p:spPr/>
-        <p:txBody>
-          <a:bodyPr/>
-          <a:lstStyle/>
-          <a:p>
-            <a:pPr marL="0" indent="0">
-              <a:buNone/>
-            </a:pPr>
-            <a:r>
-              <a:rPr lang="ru-RU" u="sng" dirty="0" err="1"/>
-              <a:t>Business</a:t>
-            </a:r>
-            <a:r>
-              <a:rPr lang="ru-RU" u="sng" dirty="0"/>
+            <a:r>
+              <a:rPr lang="ru-RU" dirty="0" smtClean="0"/>
+              <a:t>Тип Архитектуры</a:t>
+            </a:r>
+            <a:endParaRPr lang="ru-RU" dirty="0"/>
+          </a:p>
+        </p:txBody>
+      </p:sp>
+      <p:pic>
+        <p:nvPicPr>
+          <p:cNvPr id="1027" name="Picture 3"/>
+          <p:cNvPicPr>
+            <a:picLocks noChangeAspect="1" noChangeArrowheads="1"/>
+          </p:cNvPicPr>
+          <p:nvPr/>
+        </p:nvPicPr>
+        <p:blipFill>
+          <a:blip r:embed="rId2">
+            <a:extLst>
+              <a:ext uri="{28A0092B-C50C-407E-A947-70E740481C1C}">
+                <a14:useLocalDpi xmlns:a14="http://schemas.microsoft.com/office/drawing/2010/main" val="0"/>
+              </a:ext>
+            </a:extLst>
+          </a:blip>
+          <a:srcRect/>
+          <a:stretch>
+            <a:fillRect/>
+          </a:stretch>
+        </p:blipFill>
+        <p:spPr bwMode="auto">
+          <a:xfrm>
+            <a:off x="1889696" y="2848863"/>
+            <a:ext cx="1440160" cy="1472164"/>
+          </a:xfrm>
+          <a:prstGeom prst="rect">
+            <a:avLst/>
+          </a:prstGeom>
+          <a:noFill/>
+          <a:ln>
+            <a:noFill/>
+          </a:ln>
+          <a:effectLst/>
+          <a:extLst>
+            <a:ext uri="{909E8E84-426E-40DD-AFC4-6F175D3DCCD1}">
+              <a14:hiddenFill xmlns:a14="http://schemas.microsoft.com/office/drawing/2010/main">
+                <a:solidFill>
+                  <a:schemeClr val="accent1"/>
+                </a:solidFill>
+              </a14:hiddenFill>
+            </a:ext>
+            <a:ext uri="{91240B29-F687-4F45-9708-019B960494DF}">
+              <a14:hiddenLine xmlns:a14="http://schemas.microsoft.com/office/drawing/2010/main" w="9525">
+                <a:solidFill>
+                  <a:schemeClr val="tx1"/>
+                </a:solidFill>
+                <a:miter lim="800000"/>
+                <a:headEnd/>
+                <a:tailEnd/>
+              </a14:hiddenLine>
+            </a:ext>
+            <a:ext uri="{AF507438-7753-43E0-B8FC-AC1667EBCBE1}">
+              <a14:hiddenEffects xmlns:a14="http://schemas.microsoft.com/office/drawing/2010/main">
+                <a:effectLst>
+                  <a:outerShdw dist="35921" dir="2700000" algn="ctr" rotWithShape="0">
+                    <a:schemeClr val="bg2"/>
+                  </a:outerShdw>
+                </a:effectLst>
+              </a14:hiddenEffects>
+            </a:ext>
+          </a:extLst>
+        </p:spPr>
+      </p:pic>
+      <p:pic>
+        <p:nvPicPr>
+          <p:cNvPr id="1028" name="Picture 4"/>
+          <p:cNvPicPr>
+            <a:picLocks noChangeAspect="1" noChangeArrowheads="1"/>
+          </p:cNvPicPr>
+          <p:nvPr/>
+        </p:nvPicPr>
+        <p:blipFill>
+          <a:blip r:embed="rId3">
+            <a:extLst>
+              <a:ext uri="{28A0092B-C50C-407E-A947-70E740481C1C}">
+                <a14:useLocalDpi xmlns:a14="http://schemas.microsoft.com/office/drawing/2010/main" val="0"/>
+              </a:ext>
+            </a:extLst>
+          </a:blip>
+          <a:srcRect/>
+          <a:stretch>
+            <a:fillRect/>
+          </a:stretch>
+        </p:blipFill>
+        <p:spPr bwMode="auto">
+          <a:xfrm>
+            <a:off x="5070296" y="2787295"/>
+            <a:ext cx="720080" cy="720080"/>
+          </a:xfrm>
+          <a:prstGeom prst="rect">
+            <a:avLst/>
+          </a:prstGeom>
+          <a:noFill/>
+          <a:ln>
+            <a:noFill/>
+          </a:ln>
+          <a:effectLst/>
+          <a:extLst>
+            <a:ext uri="{909E8E84-426E-40DD-AFC4-6F175D3DCCD1}">
+              <a14:hiddenFill xmlns:a14="http://schemas.microsoft.com/office/drawing/2010/main">
+                <a:solidFill>
+                  <a:schemeClr val="accent1"/>
+                </a:solidFill>
+              </a14:hiddenFill>
+            </a:ext>
+            <a:ext uri="{91240B29-F687-4F45-9708-019B960494DF}">
+              <a14:hiddenLine xmlns:a14="http://schemas.microsoft.com/office/drawing/2010/main" w="9525">
+                <a:solidFill>
+                  <a:schemeClr val="tx1"/>
+                </a:solidFill>
+                <a:miter lim="800000"/>
+                <a:headEnd/>
+                <a:tailEnd/>
+              </a14:hiddenLine>
+            </a:ext>
+            <a:ext uri="{AF507438-7753-43E0-B8FC-AC1667EBCBE1}">
+              <a14:hiddenEffects xmlns:a14="http://schemas.microsoft.com/office/drawing/2010/main">
+                <a:effectLst>
+                  <a:outerShdw dist="35921" dir="2700000" algn="ctr" rotWithShape="0">
+                    <a:schemeClr val="bg2"/>
+                  </a:outerShdw>
+                </a:effectLst>
+              </a14:hiddenEffects>
+            </a:ext>
+          </a:extLst>
+        </p:spPr>
+      </p:pic>
+      <p:pic>
+        <p:nvPicPr>
+          <p:cNvPr id="1029" name="Picture 5"/>
+          <p:cNvPicPr>
+            <a:picLocks noChangeAspect="1" noChangeArrowheads="1"/>
+          </p:cNvPicPr>
+          <p:nvPr/>
+        </p:nvPicPr>
+        <p:blipFill>
+          <a:blip r:embed="rId4">
+            <a:extLst>
+              <a:ext uri="{28A0092B-C50C-407E-A947-70E740481C1C}">
+                <a14:useLocalDpi xmlns:a14="http://schemas.microsoft.com/office/drawing/2010/main" val="0"/>
+              </a:ext>
+            </a:extLst>
+          </a:blip>
+          <a:srcRect/>
+          <a:stretch>
+            <a:fillRect/>
+          </a:stretch>
+        </p:blipFill>
+        <p:spPr bwMode="auto">
+          <a:xfrm>
+            <a:off x="6021620" y="2998388"/>
+            <a:ext cx="650556" cy="650556"/>
+          </a:xfrm>
+          <a:prstGeom prst="rect">
+            <a:avLst/>
+          </a:prstGeom>
+          <a:noFill/>
+          <a:ln>
+            <a:noFill/>
+          </a:ln>
+          <a:effectLst/>
+          <a:extLst>
+            <a:ext uri="{909E8E84-426E-40DD-AFC4-6F175D3DCCD1}">
+              <a14:hiddenFill xmlns:a14="http://schemas.microsoft.com/office/drawing/2010/main">
+                <a:solidFill>
+                  <a:schemeClr val="accent1"/>
+                </a:solidFill>
+              </a14:hiddenFill>
+            </a:ext>
+            <a:ext uri="{91240B29-F687-4F45-9708-019B960494DF}">
+              <a14:hiddenLine xmlns:a14="http://schemas.microsoft.com/office/drawing/2010/main" w="9525">
+                <a:solidFill>
+                  <a:schemeClr val="tx1"/>
+                </a:solidFill>
+                <a:miter lim="800000"/>
+                <a:headEnd/>
+                <a:tailEnd/>
+              </a14:hiddenLine>
+            </a:ext>
+            <a:ext uri="{AF507438-7753-43E0-B8FC-AC1667EBCBE1}">
+              <a14:hiddenEffects xmlns:a14="http://schemas.microsoft.com/office/drawing/2010/main">
+                <a:effectLst>
+                  <a:outerShdw dist="35921" dir="2700000" algn="ctr" rotWithShape="0">
+                    <a:schemeClr val="bg2"/>
+                  </a:outerShdw>
+                </a:effectLst>
+              </a14:hiddenEffects>
+            </a:ext>
+          </a:extLst>
+        </p:spPr>
+      </p:pic>
+      <p:pic>
+        <p:nvPicPr>
+          <p:cNvPr id="1030" name="Picture 6"/>
+          <p:cNvPicPr>
+            <a:picLocks noChangeAspect="1" noChangeArrowheads="1"/>
+          </p:cNvPicPr>
+          <p:nvPr/>
+        </p:nvPicPr>
+        <p:blipFill>
+          <a:blip r:embed="rId5">
+            <a:extLst>
+              <a:ext uri="{28A0092B-C50C-407E-A947-70E740481C1C}">
+                <a14:useLocalDpi xmlns:a14="http://schemas.microsoft.com/office/drawing/2010/main" val="0"/>
+              </a:ext>
+            </a:extLst>
+          </a:blip>
+          <a:srcRect/>
+          <a:stretch>
+            <a:fillRect/>
+          </a:stretch>
+        </p:blipFill>
+        <p:spPr bwMode="auto">
+          <a:xfrm>
+            <a:off x="5644861" y="3759787"/>
+            <a:ext cx="690040" cy="690040"/>
+          </a:xfrm>
+          <a:prstGeom prst="rect">
+            <a:avLst/>
+          </a:prstGeom>
+          <a:noFill/>
+          <a:ln>
+            <a:noFill/>
+          </a:ln>
+          <a:effectLst/>
+          <a:extLst>
+            <a:ext uri="{909E8E84-426E-40DD-AFC4-6F175D3DCCD1}">
+              <a14:hiddenFill xmlns:a14="http://schemas.microsoft.com/office/drawing/2010/main">
+                <a:solidFill>
+                  <a:schemeClr val="accent1"/>
+                </a:solidFill>
+              </a14:hiddenFill>
+            </a:ext>
+            <a:ext uri="{91240B29-F687-4F45-9708-019B960494DF}">
+              <a14:hiddenLine xmlns:a14="http://schemas.microsoft.com/office/drawing/2010/main" w="9525">
+                <a:solidFill>
+                  <a:schemeClr val="tx1"/>
+                </a:solidFill>
+                <a:miter lim="800000"/>
+                <a:headEnd/>
+                <a:tailEnd/>
+              </a14:hiddenLine>
+            </a:ext>
+            <a:ext uri="{AF507438-7753-43E0-B8FC-AC1667EBCBE1}">
+              <a14:hiddenEffects xmlns:a14="http://schemas.microsoft.com/office/drawing/2010/main">
+                <a:effectLst>
+                  <a:outerShdw dist="35921" dir="2700000" algn="ctr" rotWithShape="0">
+                    <a:schemeClr val="bg2"/>
+                  </a:outerShdw>
+                </a:effectLst>
+              </a14:hiddenEffects>
+            </a:ext>
+          </a:extLst>
+        </p:spPr>
+      </p:pic>
+      <p:sp>
+        <p:nvSpPr>
+          <p:cNvPr id="4" name="TextBox 3"/>
+          <p:cNvSpPr txBox="1"/>
+          <p:nvPr/>
+        </p:nvSpPr>
+        <p:spPr>
+          <a:xfrm>
+            <a:off x="1313631" y="1807623"/>
+            <a:ext cx="2592289" cy="954107"/>
+          </a:xfrm>
+          <a:prstGeom prst="rect">
+            <a:avLst/>
+          </a:prstGeom>
+          <a:noFill/>
+        </p:spPr>
+        <p:txBody>
+          <a:bodyPr wrap="square" rtlCol="0">
+            <a:spAutoFit/>
+          </a:bodyPr>
+          <a:lstStyle/>
+          <a:p>
+            <a:pPr algn="ctr"/>
+            <a:r>
+              <a:rPr lang="ru-RU" sz="2800" dirty="0" smtClean="0"/>
+              <a:t>Монолитное приложение</a:t>
+            </a:r>
+            <a:endParaRPr lang="ru-RU" sz="2800" dirty="0"/>
+          </a:p>
+        </p:txBody>
+      </p:sp>
+      <p:sp>
+        <p:nvSpPr>
+          <p:cNvPr id="10" name="TextBox 9"/>
+          <p:cNvSpPr txBox="1"/>
+          <p:nvPr/>
+        </p:nvSpPr>
+        <p:spPr>
+          <a:xfrm>
+            <a:off x="4538581" y="1807621"/>
+            <a:ext cx="2902600" cy="954107"/>
+          </a:xfrm>
+          <a:prstGeom prst="rect">
+            <a:avLst/>
+          </a:prstGeom>
+          <a:noFill/>
+        </p:spPr>
+        <p:txBody>
+          <a:bodyPr wrap="square" rtlCol="0">
+            <a:spAutoFit/>
+          </a:bodyPr>
+          <a:lstStyle/>
+          <a:p>
+            <a:pPr algn="ctr"/>
+            <a:r>
+              <a:rPr lang="ru-RU" sz="2800" dirty="0" err="1" smtClean="0"/>
+              <a:t>Микросервисное</a:t>
+            </a:r>
+            <a:r>
+              <a:rPr lang="ru-RU" sz="2800" dirty="0" smtClean="0"/>
               <a:t> </a:t>
             </a:r>
-            <a:r>
-              <a:rPr lang="ru-RU" u="sng" dirty="0" err="1"/>
-              <a:t>Capabilities</a:t>
-            </a:r>
-            <a:r>
-              <a:rPr lang="ru-RU" u="sng" dirty="0"/>
-              <a:t> | Организация вокруг </a:t>
-            </a:r>
-            <a:r>
-              <a:rPr lang="ru-RU" u="sng" dirty="0" smtClean="0"/>
-              <a:t>потребностей бизнеса</a:t>
-            </a:r>
-            <a:endParaRPr lang="en-US" u="sng" dirty="0" smtClean="0"/>
-          </a:p>
-          <a:p>
-            <a:pPr marL="0" indent="0">
-              <a:buNone/>
-            </a:pPr>
-            <a:r>
-              <a:rPr lang="en-US" dirty="0" smtClean="0"/>
-              <a:t>- Different components implement different business needs</a:t>
-            </a:r>
-          </a:p>
-          <a:p>
-            <a:pPr marL="0" indent="0">
-              <a:buNone/>
-            </a:pPr>
-            <a:r>
-              <a:rPr lang="en-US" dirty="0"/>
-              <a:t>	</a:t>
-            </a:r>
-            <a:r>
-              <a:rPr lang="en-US" dirty="0" smtClean="0"/>
-              <a:t>- reporting</a:t>
-            </a:r>
-          </a:p>
-          <a:p>
-            <a:pPr marL="0" indent="0">
-              <a:buNone/>
-            </a:pPr>
-            <a:r>
-              <a:rPr lang="en-US" dirty="0"/>
-              <a:t>	</a:t>
-            </a:r>
-            <a:r>
-              <a:rPr lang="en-US" dirty="0" smtClean="0"/>
-              <a:t>- emailing</a:t>
-            </a:r>
-          </a:p>
-          <a:p>
-            <a:pPr marL="0" indent="0">
-              <a:buNone/>
-            </a:pPr>
-            <a:r>
-              <a:rPr lang="en-US" dirty="0"/>
-              <a:t>	</a:t>
-            </a:r>
-            <a:r>
-              <a:rPr lang="en-US" dirty="0" smtClean="0"/>
-              <a:t>- taxes</a:t>
-            </a:r>
-          </a:p>
-          <a:p>
-            <a:pPr marL="0" indent="0">
-              <a:buNone/>
-            </a:pPr>
-            <a:r>
-              <a:rPr lang="en-US" dirty="0"/>
-              <a:t>	</a:t>
-            </a:r>
-            <a:r>
-              <a:rPr lang="en-US" dirty="0" smtClean="0"/>
-              <a:t>- credit card </a:t>
-            </a:r>
-            <a:r>
-              <a:rPr lang="en-US" dirty="0" err="1" smtClean="0"/>
-              <a:t>mgmt</a:t>
+          </a:p>
+          <a:p>
+            <a:pPr algn="ctr"/>
+            <a:r>
+              <a:rPr lang="ru-RU" sz="2800" dirty="0" smtClean="0"/>
+              <a:t>приложение</a:t>
+            </a:r>
+            <a:endParaRPr lang="ru-RU" sz="2800" dirty="0"/>
+          </a:p>
+        </p:txBody>
+      </p:sp>
+      <p:sp>
+        <p:nvSpPr>
+          <p:cNvPr id="3" name="TextBox 2"/>
+          <p:cNvSpPr txBox="1"/>
+          <p:nvPr/>
+        </p:nvSpPr>
+        <p:spPr>
+          <a:xfrm>
+            <a:off x="971600" y="4869160"/>
+            <a:ext cx="2423933" cy="2031325"/>
+          </a:xfrm>
+          <a:prstGeom prst="rect">
+            <a:avLst/>
+          </a:prstGeom>
+          <a:noFill/>
+        </p:spPr>
+        <p:txBody>
+          <a:bodyPr wrap="none" rtlCol="0">
+            <a:spAutoFit/>
+          </a:bodyPr>
+          <a:lstStyle/>
+          <a:p>
+            <a:r>
+              <a:rPr lang="ru-RU" dirty="0" smtClean="0"/>
+              <a:t>+ Протокол</a:t>
+            </a:r>
+          </a:p>
+          <a:p>
+            <a:r>
+              <a:rPr lang="ru-RU" dirty="0" smtClean="0"/>
+              <a:t>+ Простота модуля</a:t>
+            </a:r>
+          </a:p>
+          <a:p>
+            <a:r>
+              <a:rPr lang="ru-RU" dirty="0" smtClean="0"/>
+              <a:t>+ Скорость разработки</a:t>
+            </a:r>
+          </a:p>
+          <a:p>
+            <a:r>
+              <a:rPr lang="ru-RU" dirty="0" smtClean="0"/>
+              <a:t>+ Независимость</a:t>
+            </a:r>
+          </a:p>
+          <a:p>
+            <a:r>
+              <a:rPr lang="ru-RU" dirty="0"/>
+              <a:t> </a:t>
+            </a:r>
+            <a:r>
+              <a:rPr lang="ru-RU" dirty="0" smtClean="0"/>
+              <a:t>      команд</a:t>
+            </a:r>
+          </a:p>
+          <a:p>
+            <a:r>
+              <a:rPr lang="ru-RU" dirty="0" smtClean="0"/>
+              <a:t>       технологий</a:t>
+            </a:r>
+          </a:p>
+          <a:p>
+            <a:endParaRPr lang="ru-RU" dirty="0"/>
+          </a:p>
+        </p:txBody>
+      </p:sp>
+      <p:sp>
+        <p:nvSpPr>
+          <p:cNvPr id="11" name="TextBox 10"/>
+          <p:cNvSpPr txBox="1"/>
+          <p:nvPr/>
+        </p:nvSpPr>
+        <p:spPr>
+          <a:xfrm>
+            <a:off x="5063185" y="4853053"/>
+            <a:ext cx="2940933" cy="646331"/>
+          </a:xfrm>
+          <a:prstGeom prst="rect">
+            <a:avLst/>
+          </a:prstGeom>
+          <a:noFill/>
+        </p:spPr>
+        <p:txBody>
+          <a:bodyPr wrap="none" rtlCol="0">
+            <a:spAutoFit/>
+          </a:bodyPr>
+          <a:lstStyle/>
+          <a:p>
+            <a:r>
+              <a:rPr lang="ru-RU" dirty="0"/>
+              <a:t>-</a:t>
+            </a:r>
+            <a:r>
+              <a:rPr lang="ru-RU" dirty="0" smtClean="0"/>
+              <a:t> Сложность</a:t>
+            </a:r>
+          </a:p>
+          <a:p>
+            <a:r>
+              <a:rPr lang="ru-RU" dirty="0" smtClean="0"/>
+              <a:t>- Подверженность ошибкам</a:t>
             </a:r>
             <a:endParaRPr lang="ru-RU" dirty="0"/>
           </a:p>
@@ -4084,7 +5474,7 @@
     </p:spTree>
     <p:extLst>
       <p:ext uri="{BB962C8B-B14F-4D97-AF65-F5344CB8AC3E}">
-        <p14:creationId xmlns:p14="http://schemas.microsoft.com/office/powerpoint/2010/main" val="2238289338"/>
+        <p14:creationId xmlns:p14="http://schemas.microsoft.com/office/powerpoint/2010/main" val="1838205495"/>
       </p:ext>
     </p:extLst>
   </p:cSld>
@@ -4113,6 +5503,50 @@
       </p:grpSpPr>
       <p:sp>
         <p:nvSpPr>
+          <p:cNvPr id="7" name="Прямоугольник 6"/>
+          <p:cNvSpPr/>
+          <p:nvPr/>
+        </p:nvSpPr>
+        <p:spPr>
+          <a:xfrm>
+            <a:off x="2435341" y="2348880"/>
+            <a:ext cx="4004882" cy="2520280"/>
+          </a:xfrm>
+          <a:prstGeom prst="rect">
+            <a:avLst/>
+          </a:prstGeom>
+        </p:spPr>
+        <p:style>
+          <a:lnRef idx="2">
+            <a:schemeClr val="accent6">
+              <a:shade val="50000"/>
+            </a:schemeClr>
+          </a:lnRef>
+          <a:fillRef idx="1">
+            <a:schemeClr val="accent6"/>
+          </a:fillRef>
+          <a:effectRef idx="0">
+            <a:schemeClr val="accent6"/>
+          </a:effectRef>
+          <a:fontRef idx="minor">
+            <a:schemeClr val="lt1"/>
+          </a:fontRef>
+        </p:style>
+        <p:txBody>
+          <a:bodyPr rtlCol="0" anchor="b"/>
+          <a:lstStyle/>
+          <a:p>
+            <a:pPr algn="ctr"/>
+            <a:r>
+              <a:rPr lang="en-US" sz="4000" dirty="0" smtClean="0"/>
+              <a:t>ROA</a:t>
+            </a:r>
+            <a:endParaRPr lang="ru-RU" sz="4000" dirty="0"/>
+          </a:p>
+        </p:txBody>
+      </p:sp>
+      <p:sp>
+        <p:nvSpPr>
           <p:cNvPr id="2" name="Заголовок 1"/>
           <p:cNvSpPr>
             <a:spLocks noGrp="1"/>
@@ -4127,8 +5561,8 @@
           <a:lstStyle/>
           <a:p>
             <a:r>
-              <a:rPr lang="en-US" dirty="0" smtClean="0"/>
-              <a:t>Deployment</a:t>
+              <a:rPr lang="ru-RU" dirty="0" smtClean="0"/>
+              <a:t>Монолит</a:t>
             </a:r>
             <a:endParaRPr lang="ru-RU" dirty="0"/>
           </a:p>
@@ -4136,79 +5570,263 @@
       </p:sp>
       <p:sp>
         <p:nvSpPr>
-          <p:cNvPr id="3" name="Объект 2"/>
-          <p:cNvSpPr>
-            <a:spLocks noGrp="1"/>
-          </p:cNvSpPr>
-          <p:nvPr>
-            <p:ph idx="1"/>
-          </p:nvPr>
-        </p:nvSpPr>
-        <p:spPr/>
-        <p:txBody>
-          <a:bodyPr>
-            <a:normAutofit lnSpcReduction="10000"/>
-          </a:bodyPr>
-          <a:lstStyle/>
-          <a:p>
-            <a:pPr marL="0" indent="0">
-              <a:buNone/>
-            </a:pPr>
-            <a:r>
-              <a:rPr lang="en-US" u="sng" dirty="0"/>
-              <a:t>Infrastructure Automation | </a:t>
-            </a:r>
-            <a:r>
-              <a:rPr lang="ru-RU" u="sng" dirty="0"/>
-              <a:t>Автоматизация инфраструктуры</a:t>
-            </a:r>
-            <a:endParaRPr lang="en-US" u="sng" dirty="0" smtClean="0"/>
-          </a:p>
-          <a:p>
-            <a:r>
-              <a:rPr lang="en-US" dirty="0" smtClean="0"/>
-              <a:t>Automation</a:t>
-            </a:r>
-            <a:endParaRPr lang="en-US" dirty="0" smtClean="0"/>
-          </a:p>
-          <a:p>
-            <a:pPr lvl="1"/>
-            <a:r>
-              <a:rPr lang="en-US" dirty="0" smtClean="0"/>
-              <a:t>Continuous Integration</a:t>
-            </a:r>
-          </a:p>
-          <a:p>
-            <a:pPr lvl="1"/>
-            <a:r>
-              <a:rPr lang="en-US" dirty="0" smtClean="0"/>
-              <a:t>Continuous Delivery (on the road to…)</a:t>
-            </a:r>
-          </a:p>
-          <a:p>
-            <a:pPr lvl="1"/>
-            <a:r>
-              <a:rPr lang="en-US" dirty="0" smtClean="0"/>
-              <a:t>Chef</a:t>
-            </a:r>
-          </a:p>
-          <a:p>
-            <a:r>
-              <a:rPr lang="en-US" dirty="0" smtClean="0"/>
-              <a:t>Step Away from infrastructure</a:t>
-            </a:r>
-          </a:p>
-          <a:p>
-            <a:r>
-              <a:rPr lang="en-US" dirty="0" smtClean="0"/>
-              <a:t>Align environment</a:t>
-            </a:r>
-          </a:p>
-          <a:p>
-            <a:pPr lvl="1"/>
-            <a:r>
-              <a:rPr lang="en-US" dirty="0" smtClean="0"/>
-              <a:t>We have separate environments!</a:t>
+          <p:cNvPr id="4" name="Прямоугольник 3"/>
+          <p:cNvSpPr/>
+          <p:nvPr/>
+        </p:nvSpPr>
+        <p:spPr>
+          <a:xfrm>
+            <a:off x="2543560" y="2376500"/>
+            <a:ext cx="1080120" cy="677251"/>
+          </a:xfrm>
+          <a:prstGeom prst="rect">
+            <a:avLst/>
+          </a:prstGeom>
+        </p:spPr>
+        <p:style>
+          <a:lnRef idx="2">
+            <a:schemeClr val="accent1">
+              <a:shade val="50000"/>
+            </a:schemeClr>
+          </a:lnRef>
+          <a:fillRef idx="1">
+            <a:schemeClr val="accent1"/>
+          </a:fillRef>
+          <a:effectRef idx="0">
+            <a:schemeClr val="accent1"/>
+          </a:effectRef>
+          <a:fontRef idx="minor">
+            <a:schemeClr val="lt1"/>
+          </a:fontRef>
+        </p:style>
+        <p:txBody>
+          <a:bodyPr rtlCol="0" anchor="ctr"/>
+          <a:lstStyle/>
+          <a:p>
+            <a:pPr algn="ctr"/>
+            <a:r>
+              <a:rPr lang="ru-RU" dirty="0" smtClean="0"/>
+              <a:t>Налоги</a:t>
+            </a:r>
+            <a:endParaRPr lang="ru-RU" dirty="0"/>
+          </a:p>
+        </p:txBody>
+      </p:sp>
+      <p:sp>
+        <p:nvSpPr>
+          <p:cNvPr id="5" name="Прямоугольник 4"/>
+          <p:cNvSpPr/>
+          <p:nvPr/>
+        </p:nvSpPr>
+        <p:spPr>
+          <a:xfrm>
+            <a:off x="3775927" y="2388911"/>
+            <a:ext cx="1152128" cy="664840"/>
+          </a:xfrm>
+          <a:prstGeom prst="rect">
+            <a:avLst/>
+          </a:prstGeom>
+        </p:spPr>
+        <p:style>
+          <a:lnRef idx="2">
+            <a:schemeClr val="accent1">
+              <a:shade val="50000"/>
+            </a:schemeClr>
+          </a:lnRef>
+          <a:fillRef idx="1">
+            <a:schemeClr val="accent1"/>
+          </a:fillRef>
+          <a:effectRef idx="0">
+            <a:schemeClr val="accent1"/>
+          </a:effectRef>
+          <a:fontRef idx="minor">
+            <a:schemeClr val="lt1"/>
+          </a:fontRef>
+        </p:style>
+        <p:txBody>
+          <a:bodyPr rtlCol="0" anchor="ctr"/>
+          <a:lstStyle/>
+          <a:p>
+            <a:pPr algn="ctr"/>
+            <a:r>
+              <a:rPr lang="en-US" dirty="0" smtClean="0"/>
+              <a:t>Emailing</a:t>
+            </a:r>
+            <a:endParaRPr lang="ru-RU" dirty="0"/>
+          </a:p>
+        </p:txBody>
+      </p:sp>
+      <p:sp>
+        <p:nvSpPr>
+          <p:cNvPr id="6" name="Прямоугольник 5"/>
+          <p:cNvSpPr/>
+          <p:nvPr/>
+        </p:nvSpPr>
+        <p:spPr>
+          <a:xfrm>
+            <a:off x="5030800" y="2388911"/>
+            <a:ext cx="1008112" cy="664840"/>
+          </a:xfrm>
+          <a:prstGeom prst="rect">
+            <a:avLst/>
+          </a:prstGeom>
+        </p:spPr>
+        <p:style>
+          <a:lnRef idx="2">
+            <a:schemeClr val="accent1">
+              <a:shade val="50000"/>
+            </a:schemeClr>
+          </a:lnRef>
+          <a:fillRef idx="1">
+            <a:schemeClr val="accent1"/>
+          </a:fillRef>
+          <a:effectRef idx="0">
+            <a:schemeClr val="accent1"/>
+          </a:effectRef>
+          <a:fontRef idx="minor">
+            <a:schemeClr val="lt1"/>
+          </a:fontRef>
+        </p:style>
+        <p:txBody>
+          <a:bodyPr rtlCol="0" anchor="ctr"/>
+          <a:lstStyle/>
+          <a:p>
+            <a:pPr algn="ctr"/>
+            <a:r>
+              <a:rPr lang="ru-RU" dirty="0" smtClean="0"/>
+              <a:t>Отчеты</a:t>
+            </a:r>
+            <a:endParaRPr lang="ru-RU" dirty="0"/>
+          </a:p>
+        </p:txBody>
+      </p:sp>
+      <p:sp>
+        <p:nvSpPr>
+          <p:cNvPr id="8" name="Прямоугольник 7"/>
+          <p:cNvSpPr/>
+          <p:nvPr/>
+        </p:nvSpPr>
+        <p:spPr>
+          <a:xfrm>
+            <a:off x="2552192" y="4005064"/>
+            <a:ext cx="1188132" cy="720080"/>
+          </a:xfrm>
+          <a:prstGeom prst="rect">
+            <a:avLst/>
+          </a:prstGeom>
+        </p:spPr>
+        <p:style>
+          <a:lnRef idx="2">
+            <a:schemeClr val="accent1">
+              <a:shade val="50000"/>
+            </a:schemeClr>
+          </a:lnRef>
+          <a:fillRef idx="1">
+            <a:schemeClr val="accent1"/>
+          </a:fillRef>
+          <a:effectRef idx="0">
+            <a:schemeClr val="accent1"/>
+          </a:effectRef>
+          <a:fontRef idx="minor">
+            <a:schemeClr val="lt1"/>
+          </a:fontRef>
+        </p:style>
+        <p:txBody>
+          <a:bodyPr rtlCol="0" anchor="ctr"/>
+          <a:lstStyle/>
+          <a:p>
+            <a:pPr algn="ctr"/>
+            <a:r>
+              <a:rPr lang="ru-RU" dirty="0" smtClean="0"/>
+              <a:t>Кредитки</a:t>
+            </a:r>
+            <a:endParaRPr lang="ru-RU" dirty="0"/>
+          </a:p>
+        </p:txBody>
+      </p:sp>
+      <p:sp>
+        <p:nvSpPr>
+          <p:cNvPr id="9" name="Прямоугольник 8"/>
+          <p:cNvSpPr/>
+          <p:nvPr/>
+        </p:nvSpPr>
+        <p:spPr>
+          <a:xfrm>
+            <a:off x="4135967" y="3140968"/>
+            <a:ext cx="1080120" cy="774576"/>
+          </a:xfrm>
+          <a:prstGeom prst="rect">
+            <a:avLst/>
+          </a:prstGeom>
+        </p:spPr>
+        <p:style>
+          <a:lnRef idx="2">
+            <a:schemeClr val="accent1">
+              <a:shade val="50000"/>
+            </a:schemeClr>
+          </a:lnRef>
+          <a:fillRef idx="1">
+            <a:schemeClr val="accent1"/>
+          </a:fillRef>
+          <a:effectRef idx="0">
+            <a:schemeClr val="accent1"/>
+          </a:effectRef>
+          <a:fontRef idx="minor">
+            <a:schemeClr val="lt1"/>
+          </a:fontRef>
+        </p:style>
+        <p:txBody>
+          <a:bodyPr rtlCol="0" anchor="ctr"/>
+          <a:lstStyle/>
+          <a:p>
+            <a:pPr algn="ctr"/>
+            <a:r>
+              <a:rPr lang="ru-RU" dirty="0" smtClean="0"/>
+              <a:t>Скидки</a:t>
+            </a:r>
+            <a:endParaRPr lang="ru-RU" dirty="0"/>
+          </a:p>
+        </p:txBody>
+      </p:sp>
+      <p:sp>
+        <p:nvSpPr>
+          <p:cNvPr id="10" name="Прямоугольник 9"/>
+          <p:cNvSpPr/>
+          <p:nvPr/>
+        </p:nvSpPr>
+        <p:spPr>
+          <a:xfrm>
+            <a:off x="2543560" y="3140968"/>
+            <a:ext cx="1503784" cy="774576"/>
+          </a:xfrm>
+          <a:prstGeom prst="rect">
+            <a:avLst/>
+          </a:prstGeom>
+        </p:spPr>
+        <p:style>
+          <a:lnRef idx="2">
+            <a:schemeClr val="accent1">
+              <a:shade val="50000"/>
+            </a:schemeClr>
+          </a:lnRef>
+          <a:fillRef idx="1">
+            <a:schemeClr val="accent1"/>
+          </a:fillRef>
+          <a:effectRef idx="0">
+            <a:schemeClr val="accent1"/>
+          </a:effectRef>
+          <a:fontRef idx="minor">
+            <a:schemeClr val="lt1"/>
+          </a:fontRef>
+        </p:style>
+        <p:txBody>
+          <a:bodyPr rtlCol="0" anchor="ctr"/>
+          <a:lstStyle/>
+          <a:p>
+            <a:pPr algn="ctr"/>
+            <a:r>
+              <a:rPr lang="ru-RU" dirty="0" smtClean="0"/>
+              <a:t>Справочники Издателей</a:t>
             </a:r>
             <a:endParaRPr lang="ru-RU" dirty="0"/>
           </a:p>
@@ -4217,20 +5835,13 @@
     </p:spTree>
     <p:extLst>
       <p:ext uri="{BB962C8B-B14F-4D97-AF65-F5344CB8AC3E}">
-        <p14:creationId xmlns:p14="http://schemas.microsoft.com/office/powerpoint/2010/main" val="1221449566"/>
+        <p14:creationId xmlns:p14="http://schemas.microsoft.com/office/powerpoint/2010/main" val="2068003828"/>
       </p:ext>
     </p:extLst>
   </p:cSld>
   <p:clrMapOvr>
     <a:masterClrMapping/>
   </p:clrMapOvr>
-  <p:timing>
-    <p:tnLst>
-      <p:par>
-        <p:cTn id="1" dur="indefinite" restart="never" nodeType="tmRoot"/>
-      </p:par>
-    </p:tnLst>
-  </p:timing>
 </p:sld>
 </file>
 
@@ -4253,6 +5864,94 @@
       </p:grpSpPr>
       <p:sp>
         <p:nvSpPr>
+          <p:cNvPr id="11" name="Прямоугольник 10"/>
+          <p:cNvSpPr/>
+          <p:nvPr/>
+        </p:nvSpPr>
+        <p:spPr>
+          <a:xfrm>
+            <a:off x="727500" y="1241140"/>
+            <a:ext cx="7732931" cy="4564124"/>
+          </a:xfrm>
+          <a:prstGeom prst="rect">
+            <a:avLst/>
+          </a:prstGeom>
+        </p:spPr>
+        <p:style>
+          <a:lnRef idx="2">
+            <a:schemeClr val="accent4">
+              <a:shade val="50000"/>
+            </a:schemeClr>
+          </a:lnRef>
+          <a:fillRef idx="1">
+            <a:schemeClr val="accent4"/>
+          </a:fillRef>
+          <a:effectRef idx="0">
+            <a:schemeClr val="accent4"/>
+          </a:effectRef>
+          <a:fontRef idx="minor">
+            <a:schemeClr val="lt1"/>
+          </a:fontRef>
+        </p:style>
+        <p:txBody>
+          <a:bodyPr rtlCol="0" anchor="b"/>
+          <a:lstStyle/>
+          <a:p>
+            <a:pPr algn="ctr"/>
+            <a:r>
+              <a:rPr lang="en-US" sz="4000" dirty="0" smtClean="0"/>
+              <a:t>copyright.com</a:t>
+            </a:r>
+            <a:endParaRPr lang="ru-RU" sz="4000" dirty="0"/>
+          </a:p>
+        </p:txBody>
+      </p:sp>
+      <p:sp>
+        <p:nvSpPr>
+          <p:cNvPr id="7" name="Прямоугольник 6"/>
+          <p:cNvSpPr/>
+          <p:nvPr/>
+        </p:nvSpPr>
+        <p:spPr>
+          <a:xfrm>
+            <a:off x="2234705" y="3012161"/>
+            <a:ext cx="1188338" cy="704871"/>
+          </a:xfrm>
+          <a:prstGeom prst="rect">
+            <a:avLst/>
+          </a:prstGeom>
+        </p:spPr>
+        <p:style>
+          <a:lnRef idx="2">
+            <a:schemeClr val="accent6">
+              <a:shade val="50000"/>
+            </a:schemeClr>
+          </a:lnRef>
+          <a:fillRef idx="1">
+            <a:schemeClr val="accent6"/>
+          </a:fillRef>
+          <a:effectRef idx="0">
+            <a:schemeClr val="accent6"/>
+          </a:effectRef>
+          <a:fontRef idx="minor">
+            <a:schemeClr val="lt1"/>
+          </a:fontRef>
+        </p:style>
+        <p:txBody>
+          <a:bodyPr rtlCol="0" anchor="b"/>
+          <a:lstStyle/>
+          <a:p>
+            <a:pPr algn="ctr"/>
+            <a:r>
+              <a:rPr lang="en-US" sz="4000" dirty="0" smtClean="0"/>
+              <a:t>ROA</a:t>
+            </a:r>
+            <a:endParaRPr lang="ru-RU" sz="4000" dirty="0"/>
+          </a:p>
+        </p:txBody>
+      </p:sp>
+      <p:sp>
+        <p:nvSpPr>
           <p:cNvPr id="2" name="Заголовок 1"/>
           <p:cNvSpPr>
             <a:spLocks noGrp="1"/>
@@ -4267,12 +5966,8 @@
           <a:lstStyle/>
           <a:p>
             <a:r>
-              <a:rPr lang="en-US" dirty="0" err="1" smtClean="0"/>
-              <a:t>Microservices</a:t>
-            </a:r>
-            <a:r>
-              <a:rPr lang="en-US" dirty="0" smtClean="0"/>
-              <a:t> Design</a:t>
+              <a:rPr lang="ru-RU" dirty="0" err="1" smtClean="0"/>
+              <a:t>СуперМонолит</a:t>
             </a:r>
             <a:endParaRPr lang="ru-RU" dirty="0"/>
           </a:p>
@@ -4280,112 +5975,402 @@
       </p:sp>
       <p:sp>
         <p:nvSpPr>
-          <p:cNvPr id="3" name="Объект 2"/>
-          <p:cNvSpPr>
-            <a:spLocks noGrp="1"/>
-          </p:cNvSpPr>
-          <p:nvPr>
-            <p:ph idx="1"/>
-          </p:nvPr>
-        </p:nvSpPr>
-        <p:spPr/>
-        <p:txBody>
-          <a:bodyPr>
-            <a:normAutofit fontScale="85000" lnSpcReduction="20000"/>
-          </a:bodyPr>
-          <a:lstStyle/>
-          <a:p>
-            <a:r>
-              <a:rPr lang="en-US" dirty="0" smtClean="0"/>
-              <a:t>Interaction Protocol</a:t>
-            </a:r>
-          </a:p>
-          <a:p>
-            <a:pPr lvl="1"/>
-            <a:r>
-              <a:rPr lang="en-US" dirty="0" smtClean="0"/>
-              <a:t>REST</a:t>
-            </a:r>
-          </a:p>
-          <a:p>
-            <a:pPr lvl="1"/>
-            <a:r>
-              <a:rPr lang="en-US" dirty="0" smtClean="0"/>
-              <a:t>Messaging </a:t>
-            </a:r>
-          </a:p>
-          <a:p>
-            <a:pPr lvl="2"/>
-            <a:r>
-              <a:rPr lang="en-US" dirty="0" smtClean="0"/>
-              <a:t>JMS</a:t>
-            </a:r>
-          </a:p>
-          <a:p>
-            <a:r>
-              <a:rPr lang="en-US" dirty="0" smtClean="0"/>
-              <a:t>Compatibility</a:t>
-            </a:r>
-          </a:p>
-          <a:p>
-            <a:pPr lvl="1"/>
-            <a:r>
-              <a:rPr lang="en-US" dirty="0" smtClean="0"/>
-              <a:t>Trying to keep</a:t>
-            </a:r>
-          </a:p>
-          <a:p>
-            <a:pPr lvl="1"/>
-            <a:r>
-              <a:rPr lang="en-US" dirty="0" smtClean="0"/>
-              <a:t>Versioning system (different)</a:t>
-            </a:r>
-          </a:p>
-          <a:p>
-            <a:r>
-              <a:rPr lang="en-US" dirty="0" smtClean="0"/>
-              <a:t>Documentation</a:t>
-            </a:r>
-          </a:p>
-          <a:p>
-            <a:pPr lvl="1"/>
-            <a:r>
-              <a:rPr lang="en-US" dirty="0" smtClean="0"/>
-              <a:t>Should be thorough (word)</a:t>
-            </a:r>
-          </a:p>
-          <a:p>
-            <a:r>
-              <a:rPr lang="en-US" dirty="0" smtClean="0"/>
-              <a:t>Stateless</a:t>
-            </a:r>
-          </a:p>
-          <a:p>
-            <a:r>
-              <a:rPr lang="en-US" dirty="0" smtClean="0"/>
-              <a:t>Decentralized Data</a:t>
+          <p:cNvPr id="4" name="Прямоугольник 3"/>
+          <p:cNvSpPr/>
+          <p:nvPr/>
+        </p:nvSpPr>
+        <p:spPr>
+          <a:xfrm>
+            <a:off x="935803" y="1368388"/>
+            <a:ext cx="1080120" cy="677251"/>
+          </a:xfrm>
+          <a:prstGeom prst="rect">
+            <a:avLst/>
+          </a:prstGeom>
+        </p:spPr>
+        <p:style>
+          <a:lnRef idx="2">
+            <a:schemeClr val="accent1">
+              <a:shade val="50000"/>
+            </a:schemeClr>
+          </a:lnRef>
+          <a:fillRef idx="1">
+            <a:schemeClr val="accent1"/>
+          </a:fillRef>
+          <a:effectRef idx="0">
+            <a:schemeClr val="accent1"/>
+          </a:effectRef>
+          <a:fontRef idx="minor">
+            <a:schemeClr val="lt1"/>
+          </a:fontRef>
+        </p:style>
+        <p:txBody>
+          <a:bodyPr rtlCol="0" anchor="ctr"/>
+          <a:lstStyle/>
+          <a:p>
+            <a:pPr algn="ctr"/>
+            <a:r>
+              <a:rPr lang="ru-RU" dirty="0" smtClean="0"/>
+              <a:t>Налоги</a:t>
             </a:r>
             <a:endParaRPr lang="ru-RU" dirty="0"/>
+          </a:p>
+        </p:txBody>
+      </p:sp>
+      <p:sp>
+        <p:nvSpPr>
+          <p:cNvPr id="5" name="Прямоугольник 4"/>
+          <p:cNvSpPr/>
+          <p:nvPr/>
+        </p:nvSpPr>
+        <p:spPr>
+          <a:xfrm>
+            <a:off x="2168170" y="1380799"/>
+            <a:ext cx="1152128" cy="664840"/>
+          </a:xfrm>
+          <a:prstGeom prst="rect">
+            <a:avLst/>
+          </a:prstGeom>
+        </p:spPr>
+        <p:style>
+          <a:lnRef idx="2">
+            <a:schemeClr val="accent1">
+              <a:shade val="50000"/>
+            </a:schemeClr>
+          </a:lnRef>
+          <a:fillRef idx="1">
+            <a:schemeClr val="accent1"/>
+          </a:fillRef>
+          <a:effectRef idx="0">
+            <a:schemeClr val="accent1"/>
+          </a:effectRef>
+          <a:fontRef idx="minor">
+            <a:schemeClr val="lt1"/>
+          </a:fontRef>
+        </p:style>
+        <p:txBody>
+          <a:bodyPr rtlCol="0" anchor="ctr"/>
+          <a:lstStyle/>
+          <a:p>
+            <a:pPr algn="ctr"/>
+            <a:r>
+              <a:rPr lang="en-US" dirty="0" smtClean="0"/>
+              <a:t>Emailing</a:t>
+            </a:r>
+            <a:endParaRPr lang="ru-RU" dirty="0"/>
+          </a:p>
+        </p:txBody>
+      </p:sp>
+      <p:sp>
+        <p:nvSpPr>
+          <p:cNvPr id="6" name="Прямоугольник 5"/>
+          <p:cNvSpPr/>
+          <p:nvPr/>
+        </p:nvSpPr>
+        <p:spPr>
+          <a:xfrm>
+            <a:off x="3423043" y="1380799"/>
+            <a:ext cx="1008112" cy="664840"/>
+          </a:xfrm>
+          <a:prstGeom prst="rect">
+            <a:avLst/>
+          </a:prstGeom>
+        </p:spPr>
+        <p:style>
+          <a:lnRef idx="2">
+            <a:schemeClr val="accent1">
+              <a:shade val="50000"/>
+            </a:schemeClr>
+          </a:lnRef>
+          <a:fillRef idx="1">
+            <a:schemeClr val="accent1"/>
+          </a:fillRef>
+          <a:effectRef idx="0">
+            <a:schemeClr val="accent1"/>
+          </a:effectRef>
+          <a:fontRef idx="minor">
+            <a:schemeClr val="lt1"/>
+          </a:fontRef>
+        </p:style>
+        <p:txBody>
+          <a:bodyPr rtlCol="0" anchor="ctr"/>
+          <a:lstStyle/>
+          <a:p>
+            <a:pPr algn="ctr"/>
+            <a:r>
+              <a:rPr lang="ru-RU" dirty="0" smtClean="0"/>
+              <a:t>Отчеты</a:t>
+            </a:r>
+            <a:endParaRPr lang="ru-RU" dirty="0"/>
+          </a:p>
+        </p:txBody>
+      </p:sp>
+      <p:sp>
+        <p:nvSpPr>
+          <p:cNvPr id="8" name="Прямоугольник 7"/>
+          <p:cNvSpPr/>
+          <p:nvPr/>
+        </p:nvSpPr>
+        <p:spPr>
+          <a:xfrm>
+            <a:off x="944435" y="2996952"/>
+            <a:ext cx="1188132" cy="720080"/>
+          </a:xfrm>
+          <a:prstGeom prst="rect">
+            <a:avLst/>
+          </a:prstGeom>
+        </p:spPr>
+        <p:style>
+          <a:lnRef idx="2">
+            <a:schemeClr val="accent1">
+              <a:shade val="50000"/>
+            </a:schemeClr>
+          </a:lnRef>
+          <a:fillRef idx="1">
+            <a:schemeClr val="accent1"/>
+          </a:fillRef>
+          <a:effectRef idx="0">
+            <a:schemeClr val="accent1"/>
+          </a:effectRef>
+          <a:fontRef idx="minor">
+            <a:schemeClr val="lt1"/>
+          </a:fontRef>
+        </p:style>
+        <p:txBody>
+          <a:bodyPr rtlCol="0" anchor="ctr"/>
+          <a:lstStyle/>
+          <a:p>
+            <a:pPr algn="ctr"/>
+            <a:r>
+              <a:rPr lang="ru-RU" dirty="0" smtClean="0"/>
+              <a:t>Кредитки</a:t>
+            </a:r>
+            <a:endParaRPr lang="ru-RU" dirty="0"/>
+          </a:p>
+        </p:txBody>
+      </p:sp>
+      <p:sp>
+        <p:nvSpPr>
+          <p:cNvPr id="9" name="Прямоугольник 8"/>
+          <p:cNvSpPr/>
+          <p:nvPr/>
+        </p:nvSpPr>
+        <p:spPr>
+          <a:xfrm>
+            <a:off x="2528210" y="2132856"/>
+            <a:ext cx="1080120" cy="774576"/>
+          </a:xfrm>
+          <a:prstGeom prst="rect">
+            <a:avLst/>
+          </a:prstGeom>
+        </p:spPr>
+        <p:style>
+          <a:lnRef idx="2">
+            <a:schemeClr val="accent1">
+              <a:shade val="50000"/>
+            </a:schemeClr>
+          </a:lnRef>
+          <a:fillRef idx="1">
+            <a:schemeClr val="accent1"/>
+          </a:fillRef>
+          <a:effectRef idx="0">
+            <a:schemeClr val="accent1"/>
+          </a:effectRef>
+          <a:fontRef idx="minor">
+            <a:schemeClr val="lt1"/>
+          </a:fontRef>
+        </p:style>
+        <p:txBody>
+          <a:bodyPr rtlCol="0" anchor="ctr"/>
+          <a:lstStyle/>
+          <a:p>
+            <a:pPr algn="ctr"/>
+            <a:r>
+              <a:rPr lang="ru-RU" dirty="0" smtClean="0"/>
+              <a:t>Скидки</a:t>
+            </a:r>
+            <a:endParaRPr lang="ru-RU" dirty="0"/>
+          </a:p>
+        </p:txBody>
+      </p:sp>
+      <p:sp>
+        <p:nvSpPr>
+          <p:cNvPr id="10" name="Прямоугольник 9"/>
+          <p:cNvSpPr/>
+          <p:nvPr/>
+        </p:nvSpPr>
+        <p:spPr>
+          <a:xfrm>
+            <a:off x="935803" y="2132856"/>
+            <a:ext cx="1503784" cy="774576"/>
+          </a:xfrm>
+          <a:prstGeom prst="rect">
+            <a:avLst/>
+          </a:prstGeom>
+        </p:spPr>
+        <p:style>
+          <a:lnRef idx="2">
+            <a:schemeClr val="accent1">
+              <a:shade val="50000"/>
+            </a:schemeClr>
+          </a:lnRef>
+          <a:fillRef idx="1">
+            <a:schemeClr val="accent1"/>
+          </a:fillRef>
+          <a:effectRef idx="0">
+            <a:schemeClr val="accent1"/>
+          </a:effectRef>
+          <a:fontRef idx="minor">
+            <a:schemeClr val="lt1"/>
+          </a:fontRef>
+        </p:style>
+        <p:txBody>
+          <a:bodyPr rtlCol="0" anchor="ctr"/>
+          <a:lstStyle/>
+          <a:p>
+            <a:pPr algn="ctr"/>
+            <a:r>
+              <a:rPr lang="ru-RU" dirty="0" smtClean="0"/>
+              <a:t>Справочники Издателей</a:t>
+            </a:r>
+            <a:endParaRPr lang="ru-RU" dirty="0"/>
+          </a:p>
+        </p:txBody>
+      </p:sp>
+      <p:sp>
+        <p:nvSpPr>
+          <p:cNvPr id="12" name="Прямоугольник 11"/>
+          <p:cNvSpPr/>
+          <p:nvPr/>
+        </p:nvSpPr>
+        <p:spPr>
+          <a:xfrm>
+            <a:off x="5004048" y="1336163"/>
+            <a:ext cx="3312368" cy="2520280"/>
+          </a:xfrm>
+          <a:prstGeom prst="rect">
+            <a:avLst/>
+          </a:prstGeom>
+        </p:spPr>
+        <p:style>
+          <a:lnRef idx="2">
+            <a:schemeClr val="accent6">
+              <a:shade val="50000"/>
+            </a:schemeClr>
+          </a:lnRef>
+          <a:fillRef idx="1">
+            <a:schemeClr val="accent6"/>
+          </a:fillRef>
+          <a:effectRef idx="0">
+            <a:schemeClr val="accent6"/>
+          </a:effectRef>
+          <a:fontRef idx="minor">
+            <a:schemeClr val="lt1"/>
+          </a:fontRef>
+        </p:style>
+        <p:txBody>
+          <a:bodyPr rtlCol="0" anchor="b"/>
+          <a:lstStyle/>
+          <a:p>
+            <a:pPr algn="ctr"/>
+            <a:r>
+              <a:rPr lang="ru-RU" sz="4000" dirty="0" smtClean="0"/>
+              <a:t>Кто-то еще</a:t>
+            </a:r>
+            <a:endParaRPr lang="ru-RU" sz="4000" dirty="0"/>
+          </a:p>
+        </p:txBody>
+      </p:sp>
+      <p:sp>
+        <p:nvSpPr>
+          <p:cNvPr id="13" name="Прямоугольник 12"/>
+          <p:cNvSpPr/>
+          <p:nvPr/>
+        </p:nvSpPr>
+        <p:spPr>
+          <a:xfrm>
+            <a:off x="3491880" y="3012161"/>
+            <a:ext cx="1224136" cy="720080"/>
+          </a:xfrm>
+          <a:prstGeom prst="rect">
+            <a:avLst/>
+          </a:prstGeom>
+        </p:spPr>
+        <p:style>
+          <a:lnRef idx="2">
+            <a:schemeClr val="accent6">
+              <a:shade val="50000"/>
+            </a:schemeClr>
+          </a:lnRef>
+          <a:fillRef idx="1">
+            <a:schemeClr val="accent6"/>
+          </a:fillRef>
+          <a:effectRef idx="0">
+            <a:schemeClr val="accent6"/>
+          </a:effectRef>
+          <a:fontRef idx="minor">
+            <a:schemeClr val="lt1"/>
+          </a:fontRef>
+        </p:style>
+        <p:txBody>
+          <a:bodyPr rtlCol="0" anchor="b"/>
+          <a:lstStyle/>
+          <a:p>
+            <a:pPr algn="ctr"/>
+            <a:endParaRPr lang="ru-RU" sz="4000" dirty="0"/>
+          </a:p>
+        </p:txBody>
+      </p:sp>
+      <p:sp>
+        <p:nvSpPr>
+          <p:cNvPr id="14" name="Прямоугольник 13"/>
+          <p:cNvSpPr/>
+          <p:nvPr/>
+        </p:nvSpPr>
+        <p:spPr>
+          <a:xfrm>
+            <a:off x="3648472" y="2132856"/>
+            <a:ext cx="1224136" cy="774576"/>
+          </a:xfrm>
+          <a:prstGeom prst="rect">
+            <a:avLst/>
+          </a:prstGeom>
+        </p:spPr>
+        <p:style>
+          <a:lnRef idx="2">
+            <a:schemeClr val="accent6">
+              <a:shade val="50000"/>
+            </a:schemeClr>
+          </a:lnRef>
+          <a:fillRef idx="1">
+            <a:schemeClr val="accent6"/>
+          </a:fillRef>
+          <a:effectRef idx="0">
+            <a:schemeClr val="accent6"/>
+          </a:effectRef>
+          <a:fontRef idx="minor">
+            <a:schemeClr val="lt1"/>
+          </a:fontRef>
+        </p:style>
+        <p:txBody>
+          <a:bodyPr rtlCol="0" anchor="b"/>
+          <a:lstStyle/>
+          <a:p>
+            <a:pPr algn="ctr"/>
+            <a:endParaRPr lang="ru-RU" sz="4000" dirty="0"/>
           </a:p>
         </p:txBody>
       </p:sp>
     </p:spTree>
     <p:extLst>
       <p:ext uri="{BB962C8B-B14F-4D97-AF65-F5344CB8AC3E}">
-        <p14:creationId xmlns:p14="http://schemas.microsoft.com/office/powerpoint/2010/main" val="3153769468"/>
+        <p14:creationId xmlns:p14="http://schemas.microsoft.com/office/powerpoint/2010/main" val="1726718859"/>
       </p:ext>
     </p:extLst>
   </p:cSld>
   <p:clrMapOvr>
     <a:masterClrMapping/>
   </p:clrMapOvr>
-  <p:timing>
-    <p:tnLst>
-      <p:par>
-        <p:cTn id="1" dur="indefinite" restart="never" nodeType="tmRoot"/>
-      </p:par>
-    </p:tnLst>
-  </p:timing>
 </p:sld>
 </file>
 
@@ -4427,95 +6412,604 @@
       </p:sp>
       <p:sp>
         <p:nvSpPr>
-          <p:cNvPr id="3" name="Объект 2"/>
-          <p:cNvSpPr>
-            <a:spLocks noGrp="1"/>
-          </p:cNvSpPr>
-          <p:nvPr>
-            <p:ph idx="1"/>
-          </p:nvPr>
-        </p:nvSpPr>
-        <p:spPr/>
-        <p:txBody>
-          <a:bodyPr/>
-          <a:lstStyle/>
-          <a:p>
-            <a:pPr marL="0" indent="0">
-              <a:buNone/>
-            </a:pPr>
-            <a:r>
-              <a:rPr lang="en-US" u="sng" dirty="0"/>
-              <a:t>Decentralized </a:t>
-            </a:r>
-            <a:r>
-              <a:rPr lang="en-US" u="sng" dirty="0" smtClean="0"/>
-              <a:t>Governance</a:t>
-            </a:r>
-          </a:p>
-          <a:p>
-            <a:pPr marL="0" indent="0">
-              <a:buNone/>
-            </a:pPr>
-            <a:r>
-              <a:rPr lang="en-US" dirty="0" smtClean="0"/>
-              <a:t> - Different technologies for different purposes</a:t>
-            </a:r>
-          </a:p>
-          <a:p>
-            <a:pPr marL="0" indent="0">
-              <a:buNone/>
-            </a:pPr>
-            <a:r>
-              <a:rPr lang="en-US" dirty="0"/>
-              <a:t>	</a:t>
-            </a:r>
-            <a:r>
-              <a:rPr lang="en-US" dirty="0" smtClean="0"/>
-              <a:t>- Different Frameworks/Storages</a:t>
-            </a:r>
-          </a:p>
-          <a:p>
-            <a:pPr marL="0" indent="0">
-              <a:buNone/>
-            </a:pPr>
-            <a:r>
-              <a:rPr lang="en-US" dirty="0"/>
-              <a:t>	</a:t>
-            </a:r>
-            <a:r>
-              <a:rPr lang="en-US" dirty="0" smtClean="0"/>
-              <a:t>	- Mongo/</a:t>
-            </a:r>
-            <a:r>
-              <a:rPr lang="en-US" dirty="0" err="1" smtClean="0"/>
-              <a:t>Postgres</a:t>
-            </a:r>
-            <a:r>
-              <a:rPr lang="en-US" dirty="0" smtClean="0"/>
-              <a:t>/</a:t>
-            </a:r>
-            <a:r>
-              <a:rPr lang="en-US" dirty="0" err="1" smtClean="0"/>
-              <a:t>Lucene</a:t>
-            </a:r>
-            <a:endParaRPr lang="en-US" dirty="0" smtClean="0"/>
-          </a:p>
-          <a:p>
-            <a:pPr marL="0" indent="0">
-              <a:buNone/>
-            </a:pPr>
-            <a:r>
-              <a:rPr lang="en-US" dirty="0" smtClean="0"/>
-              <a:t>- But still have one platform/standards/libs</a:t>
+          <p:cNvPr id="4" name="Прямоугольник 3"/>
+          <p:cNvSpPr/>
+          <p:nvPr/>
+        </p:nvSpPr>
+        <p:spPr>
+          <a:xfrm>
+            <a:off x="1211867" y="1986945"/>
+            <a:ext cx="1080120" cy="720080"/>
+          </a:xfrm>
+          <a:prstGeom prst="rect">
+            <a:avLst/>
+          </a:prstGeom>
+        </p:spPr>
+        <p:style>
+          <a:lnRef idx="2">
+            <a:schemeClr val="accent1">
+              <a:shade val="50000"/>
+            </a:schemeClr>
+          </a:lnRef>
+          <a:fillRef idx="1">
+            <a:schemeClr val="accent1"/>
+          </a:fillRef>
+          <a:effectRef idx="0">
+            <a:schemeClr val="accent1"/>
+          </a:effectRef>
+          <a:fontRef idx="minor">
+            <a:schemeClr val="lt1"/>
+          </a:fontRef>
+        </p:style>
+        <p:txBody>
+          <a:bodyPr rtlCol="0" anchor="ctr"/>
+          <a:lstStyle/>
+          <a:p>
+            <a:pPr algn="ctr"/>
+            <a:r>
+              <a:rPr lang="ru-RU" dirty="0" smtClean="0"/>
+              <a:t>Налоги</a:t>
             </a:r>
             <a:endParaRPr lang="ru-RU" dirty="0"/>
           </a:p>
         </p:txBody>
       </p:sp>
+      <p:sp>
+        <p:nvSpPr>
+          <p:cNvPr id="5" name="Прямоугольник 4"/>
+          <p:cNvSpPr/>
+          <p:nvPr/>
+        </p:nvSpPr>
+        <p:spPr>
+          <a:xfrm>
+            <a:off x="6199419" y="2329550"/>
+            <a:ext cx="1152128" cy="664840"/>
+          </a:xfrm>
+          <a:prstGeom prst="rect">
+            <a:avLst/>
+          </a:prstGeom>
+        </p:spPr>
+        <p:style>
+          <a:lnRef idx="2">
+            <a:schemeClr val="accent1">
+              <a:shade val="50000"/>
+            </a:schemeClr>
+          </a:lnRef>
+          <a:fillRef idx="1">
+            <a:schemeClr val="accent1"/>
+          </a:fillRef>
+          <a:effectRef idx="0">
+            <a:schemeClr val="accent1"/>
+          </a:effectRef>
+          <a:fontRef idx="minor">
+            <a:schemeClr val="lt1"/>
+          </a:fontRef>
+        </p:style>
+        <p:txBody>
+          <a:bodyPr rtlCol="0" anchor="ctr"/>
+          <a:lstStyle/>
+          <a:p>
+            <a:pPr algn="ctr"/>
+            <a:r>
+              <a:rPr lang="en-US" dirty="0" smtClean="0"/>
+              <a:t>Emailing</a:t>
+            </a:r>
+            <a:endParaRPr lang="ru-RU" dirty="0"/>
+          </a:p>
+        </p:txBody>
+      </p:sp>
+      <p:sp>
+        <p:nvSpPr>
+          <p:cNvPr id="7" name="Прямоугольник 6"/>
+          <p:cNvSpPr/>
+          <p:nvPr/>
+        </p:nvSpPr>
+        <p:spPr>
+          <a:xfrm>
+            <a:off x="6156176" y="3717032"/>
+            <a:ext cx="1008112" cy="648072"/>
+          </a:xfrm>
+          <a:prstGeom prst="rect">
+            <a:avLst/>
+          </a:prstGeom>
+        </p:spPr>
+        <p:style>
+          <a:lnRef idx="2">
+            <a:schemeClr val="accent1">
+              <a:shade val="50000"/>
+            </a:schemeClr>
+          </a:lnRef>
+          <a:fillRef idx="1">
+            <a:schemeClr val="accent1"/>
+          </a:fillRef>
+          <a:effectRef idx="0">
+            <a:schemeClr val="accent1"/>
+          </a:effectRef>
+          <a:fontRef idx="minor">
+            <a:schemeClr val="lt1"/>
+          </a:fontRef>
+        </p:style>
+        <p:txBody>
+          <a:bodyPr rtlCol="0" anchor="ctr"/>
+          <a:lstStyle/>
+          <a:p>
+            <a:pPr algn="ctr"/>
+            <a:r>
+              <a:rPr lang="ru-RU" dirty="0" smtClean="0"/>
+              <a:t>Отчеты</a:t>
+            </a:r>
+            <a:endParaRPr lang="ru-RU" dirty="0"/>
+          </a:p>
+        </p:txBody>
+      </p:sp>
+      <p:sp>
+        <p:nvSpPr>
+          <p:cNvPr id="8" name="Прямоугольник 7"/>
+          <p:cNvSpPr/>
+          <p:nvPr/>
+        </p:nvSpPr>
+        <p:spPr>
+          <a:xfrm>
+            <a:off x="3477485" y="3109587"/>
+            <a:ext cx="1080120" cy="720080"/>
+          </a:xfrm>
+          <a:prstGeom prst="rect">
+            <a:avLst/>
+          </a:prstGeom>
+        </p:spPr>
+        <p:style>
+          <a:lnRef idx="2">
+            <a:schemeClr val="accent6">
+              <a:shade val="50000"/>
+            </a:schemeClr>
+          </a:lnRef>
+          <a:fillRef idx="1">
+            <a:schemeClr val="accent6"/>
+          </a:fillRef>
+          <a:effectRef idx="0">
+            <a:schemeClr val="accent6"/>
+          </a:effectRef>
+          <a:fontRef idx="minor">
+            <a:schemeClr val="lt1"/>
+          </a:fontRef>
+        </p:style>
+        <p:txBody>
+          <a:bodyPr rtlCol="0" anchor="ctr"/>
+          <a:lstStyle/>
+          <a:p>
+            <a:pPr algn="ctr"/>
+            <a:r>
+              <a:rPr lang="en-US" dirty="0" smtClean="0"/>
+              <a:t>ROA</a:t>
+            </a:r>
+            <a:endParaRPr lang="ru-RU" dirty="0"/>
+          </a:p>
+        </p:txBody>
+      </p:sp>
+      <p:sp>
+        <p:nvSpPr>
+          <p:cNvPr id="9" name="Прямоугольник 8"/>
+          <p:cNvSpPr/>
+          <p:nvPr/>
+        </p:nvSpPr>
+        <p:spPr>
+          <a:xfrm>
+            <a:off x="3423479" y="4715437"/>
+            <a:ext cx="1188132" cy="720080"/>
+          </a:xfrm>
+          <a:prstGeom prst="rect">
+            <a:avLst/>
+          </a:prstGeom>
+        </p:spPr>
+        <p:style>
+          <a:lnRef idx="2">
+            <a:schemeClr val="accent1">
+              <a:shade val="50000"/>
+            </a:schemeClr>
+          </a:lnRef>
+          <a:fillRef idx="1">
+            <a:schemeClr val="accent1"/>
+          </a:fillRef>
+          <a:effectRef idx="0">
+            <a:schemeClr val="accent1"/>
+          </a:effectRef>
+          <a:fontRef idx="minor">
+            <a:schemeClr val="lt1"/>
+          </a:fontRef>
+        </p:style>
+        <p:txBody>
+          <a:bodyPr rtlCol="0" anchor="ctr"/>
+          <a:lstStyle/>
+          <a:p>
+            <a:pPr algn="ctr"/>
+            <a:r>
+              <a:rPr lang="ru-RU" dirty="0" smtClean="0"/>
+              <a:t>Кредитки</a:t>
+            </a:r>
+            <a:endParaRPr lang="ru-RU" dirty="0"/>
+          </a:p>
+        </p:txBody>
+      </p:sp>
+      <p:sp>
+        <p:nvSpPr>
+          <p:cNvPr id="10" name="Прямоугольник 9"/>
+          <p:cNvSpPr/>
+          <p:nvPr/>
+        </p:nvSpPr>
+        <p:spPr>
+          <a:xfrm>
+            <a:off x="5508104" y="5057965"/>
+            <a:ext cx="1008112" cy="629580"/>
+          </a:xfrm>
+          <a:prstGeom prst="rect">
+            <a:avLst/>
+          </a:prstGeom>
+        </p:spPr>
+        <p:style>
+          <a:lnRef idx="2">
+            <a:schemeClr val="accent1">
+              <a:shade val="50000"/>
+            </a:schemeClr>
+          </a:lnRef>
+          <a:fillRef idx="1">
+            <a:schemeClr val="accent1"/>
+          </a:fillRef>
+          <a:effectRef idx="0">
+            <a:schemeClr val="accent1"/>
+          </a:effectRef>
+          <a:fontRef idx="minor">
+            <a:schemeClr val="lt1"/>
+          </a:fontRef>
+        </p:style>
+        <p:txBody>
+          <a:bodyPr rtlCol="0" anchor="ctr"/>
+          <a:lstStyle/>
+          <a:p>
+            <a:pPr algn="ctr"/>
+            <a:r>
+              <a:rPr lang="ru-RU" dirty="0" smtClean="0"/>
+              <a:t>Скидки</a:t>
+            </a:r>
+            <a:endParaRPr lang="ru-RU" dirty="0"/>
+          </a:p>
+        </p:txBody>
+      </p:sp>
+      <p:sp>
+        <p:nvSpPr>
+          <p:cNvPr id="11" name="Прямоугольник 10"/>
+          <p:cNvSpPr/>
+          <p:nvPr/>
+        </p:nvSpPr>
+        <p:spPr>
+          <a:xfrm>
+            <a:off x="3713899" y="1772816"/>
+            <a:ext cx="1503784" cy="720080"/>
+          </a:xfrm>
+          <a:prstGeom prst="rect">
+            <a:avLst/>
+          </a:prstGeom>
+        </p:spPr>
+        <p:style>
+          <a:lnRef idx="2">
+            <a:schemeClr val="accent1">
+              <a:shade val="50000"/>
+            </a:schemeClr>
+          </a:lnRef>
+          <a:fillRef idx="1">
+            <a:schemeClr val="accent1"/>
+          </a:fillRef>
+          <a:effectRef idx="0">
+            <a:schemeClr val="accent1"/>
+          </a:effectRef>
+          <a:fontRef idx="minor">
+            <a:schemeClr val="lt1"/>
+          </a:fontRef>
+        </p:style>
+        <p:txBody>
+          <a:bodyPr rtlCol="0" anchor="ctr"/>
+          <a:lstStyle/>
+          <a:p>
+            <a:pPr algn="ctr"/>
+            <a:r>
+              <a:rPr lang="ru-RU" dirty="0" smtClean="0"/>
+              <a:t>Справочники Издателей</a:t>
+            </a:r>
+            <a:endParaRPr lang="ru-RU" dirty="0"/>
+          </a:p>
+        </p:txBody>
+      </p:sp>
+      <p:cxnSp>
+        <p:nvCxnSpPr>
+          <p:cNvPr id="13" name="Прямая со стрелкой 12"/>
+          <p:cNvCxnSpPr>
+            <a:stCxn id="8" idx="0"/>
+            <a:endCxn id="11" idx="2"/>
+          </p:cNvCxnSpPr>
+          <p:nvPr/>
+        </p:nvCxnSpPr>
+        <p:spPr>
+          <a:xfrm flipV="1">
+            <a:off x="4017545" y="2492896"/>
+            <a:ext cx="448246" cy="616691"/>
+          </a:xfrm>
+          <a:prstGeom prst="straightConnector1">
+            <a:avLst/>
+          </a:prstGeom>
+          <a:ln>
+            <a:tailEnd type="arrow"/>
+          </a:ln>
+        </p:spPr>
+        <p:style>
+          <a:lnRef idx="1">
+            <a:schemeClr val="accent1"/>
+          </a:lnRef>
+          <a:fillRef idx="0">
+            <a:schemeClr val="accent1"/>
+          </a:fillRef>
+          <a:effectRef idx="0">
+            <a:schemeClr val="accent1"/>
+          </a:effectRef>
+          <a:fontRef idx="minor">
+            <a:schemeClr val="tx1"/>
+          </a:fontRef>
+        </p:style>
+      </p:cxnSp>
+      <p:cxnSp>
+        <p:nvCxnSpPr>
+          <p:cNvPr id="15" name="Прямая со стрелкой 14"/>
+          <p:cNvCxnSpPr>
+            <a:stCxn id="8" idx="3"/>
+            <a:endCxn id="7" idx="1"/>
+          </p:cNvCxnSpPr>
+          <p:nvPr/>
+        </p:nvCxnSpPr>
+        <p:spPr>
+          <a:xfrm>
+            <a:off x="4557605" y="3469627"/>
+            <a:ext cx="1598571" cy="571441"/>
+          </a:xfrm>
+          <a:prstGeom prst="straightConnector1">
+            <a:avLst/>
+          </a:prstGeom>
+          <a:ln>
+            <a:tailEnd type="arrow"/>
+          </a:ln>
+        </p:spPr>
+        <p:style>
+          <a:lnRef idx="1">
+            <a:schemeClr val="accent1"/>
+          </a:lnRef>
+          <a:fillRef idx="0">
+            <a:schemeClr val="accent1"/>
+          </a:fillRef>
+          <a:effectRef idx="0">
+            <a:schemeClr val="accent1"/>
+          </a:effectRef>
+          <a:fontRef idx="minor">
+            <a:schemeClr val="tx1"/>
+          </a:fontRef>
+        </p:style>
+      </p:cxnSp>
+      <p:cxnSp>
+        <p:nvCxnSpPr>
+          <p:cNvPr id="23" name="Прямая со стрелкой 22"/>
+          <p:cNvCxnSpPr>
+            <a:stCxn id="8" idx="2"/>
+            <a:endCxn id="9" idx="0"/>
+          </p:cNvCxnSpPr>
+          <p:nvPr/>
+        </p:nvCxnSpPr>
+        <p:spPr>
+          <a:xfrm>
+            <a:off x="4017545" y="3829667"/>
+            <a:ext cx="0" cy="885770"/>
+          </a:xfrm>
+          <a:prstGeom prst="straightConnector1">
+            <a:avLst/>
+          </a:prstGeom>
+          <a:ln>
+            <a:tailEnd type="arrow"/>
+          </a:ln>
+        </p:spPr>
+        <p:style>
+          <a:lnRef idx="1">
+            <a:schemeClr val="accent1"/>
+          </a:lnRef>
+          <a:fillRef idx="0">
+            <a:schemeClr val="accent1"/>
+          </a:fillRef>
+          <a:effectRef idx="0">
+            <a:schemeClr val="accent1"/>
+          </a:effectRef>
+          <a:fontRef idx="minor">
+            <a:schemeClr val="tx1"/>
+          </a:fontRef>
+        </p:style>
+      </p:cxnSp>
+      <p:cxnSp>
+        <p:nvCxnSpPr>
+          <p:cNvPr id="27" name="Прямая со стрелкой 26"/>
+          <p:cNvCxnSpPr>
+            <a:stCxn id="8" idx="0"/>
+            <a:endCxn id="5" idx="1"/>
+          </p:cNvCxnSpPr>
+          <p:nvPr/>
+        </p:nvCxnSpPr>
+        <p:spPr>
+          <a:xfrm flipV="1">
+            <a:off x="4017545" y="2661970"/>
+            <a:ext cx="2181874" cy="447617"/>
+          </a:xfrm>
+          <a:prstGeom prst="straightConnector1">
+            <a:avLst/>
+          </a:prstGeom>
+          <a:ln>
+            <a:tailEnd type="arrow"/>
+          </a:ln>
+        </p:spPr>
+        <p:style>
+          <a:lnRef idx="1">
+            <a:schemeClr val="accent1"/>
+          </a:lnRef>
+          <a:fillRef idx="0">
+            <a:schemeClr val="accent1"/>
+          </a:fillRef>
+          <a:effectRef idx="0">
+            <a:schemeClr val="accent1"/>
+          </a:effectRef>
+          <a:fontRef idx="minor">
+            <a:schemeClr val="tx1"/>
+          </a:fontRef>
+        </p:style>
+      </p:cxnSp>
+      <p:cxnSp>
+        <p:nvCxnSpPr>
+          <p:cNvPr id="29" name="Прямая со стрелкой 28"/>
+          <p:cNvCxnSpPr>
+            <a:stCxn id="8" idx="0"/>
+            <a:endCxn id="4" idx="3"/>
+          </p:cNvCxnSpPr>
+          <p:nvPr/>
+        </p:nvCxnSpPr>
+        <p:spPr>
+          <a:xfrm flipH="1" flipV="1">
+            <a:off x="2291987" y="2346985"/>
+            <a:ext cx="1725558" cy="762602"/>
+          </a:xfrm>
+          <a:prstGeom prst="straightConnector1">
+            <a:avLst/>
+          </a:prstGeom>
+          <a:ln>
+            <a:tailEnd type="arrow"/>
+          </a:ln>
+        </p:spPr>
+        <p:style>
+          <a:lnRef idx="1">
+            <a:schemeClr val="accent1"/>
+          </a:lnRef>
+          <a:fillRef idx="0">
+            <a:schemeClr val="accent1"/>
+          </a:fillRef>
+          <a:effectRef idx="0">
+            <a:schemeClr val="accent1"/>
+          </a:effectRef>
+          <a:fontRef idx="minor">
+            <a:schemeClr val="tx1"/>
+          </a:fontRef>
+        </p:style>
+      </p:cxnSp>
+      <p:cxnSp>
+        <p:nvCxnSpPr>
+          <p:cNvPr id="45" name="Прямая со стрелкой 44"/>
+          <p:cNvCxnSpPr>
+            <a:stCxn id="8" idx="2"/>
+            <a:endCxn id="10" idx="0"/>
+          </p:cNvCxnSpPr>
+          <p:nvPr/>
+        </p:nvCxnSpPr>
+        <p:spPr>
+          <a:xfrm>
+            <a:off x="4017545" y="3829667"/>
+            <a:ext cx="1994615" cy="1228298"/>
+          </a:xfrm>
+          <a:prstGeom prst="straightConnector1">
+            <a:avLst/>
+          </a:prstGeom>
+          <a:ln>
+            <a:tailEnd type="arrow"/>
+          </a:ln>
+        </p:spPr>
+        <p:style>
+          <a:lnRef idx="1">
+            <a:schemeClr val="accent1"/>
+          </a:lnRef>
+          <a:fillRef idx="0">
+            <a:schemeClr val="accent1"/>
+          </a:fillRef>
+          <a:effectRef idx="0">
+            <a:schemeClr val="accent1"/>
+          </a:effectRef>
+          <a:fontRef idx="minor">
+            <a:schemeClr val="tx1"/>
+          </a:fontRef>
+        </p:style>
+      </p:cxnSp>
+      <p:cxnSp>
+        <p:nvCxnSpPr>
+          <p:cNvPr id="49" name="Прямая со стрелкой 48"/>
+          <p:cNvCxnSpPr>
+            <a:stCxn id="7" idx="2"/>
+            <a:endCxn id="10" idx="0"/>
+          </p:cNvCxnSpPr>
+          <p:nvPr/>
+        </p:nvCxnSpPr>
+        <p:spPr>
+          <a:xfrm flipH="1">
+            <a:off x="6012160" y="4365104"/>
+            <a:ext cx="648072" cy="692861"/>
+          </a:xfrm>
+          <a:prstGeom prst="straightConnector1">
+            <a:avLst/>
+          </a:prstGeom>
+          <a:ln>
+            <a:tailEnd type="arrow"/>
+          </a:ln>
+        </p:spPr>
+        <p:style>
+          <a:lnRef idx="1">
+            <a:schemeClr val="accent1"/>
+          </a:lnRef>
+          <a:fillRef idx="0">
+            <a:schemeClr val="accent1"/>
+          </a:fillRef>
+          <a:effectRef idx="0">
+            <a:schemeClr val="accent1"/>
+          </a:effectRef>
+          <a:fontRef idx="minor">
+            <a:schemeClr val="tx1"/>
+          </a:fontRef>
+        </p:style>
+      </p:cxnSp>
+      <p:cxnSp>
+        <p:nvCxnSpPr>
+          <p:cNvPr id="51" name="Прямая со стрелкой 50"/>
+          <p:cNvCxnSpPr>
+            <a:stCxn id="4" idx="3"/>
+            <a:endCxn id="11" idx="1"/>
+          </p:cNvCxnSpPr>
+          <p:nvPr/>
+        </p:nvCxnSpPr>
+        <p:spPr>
+          <a:xfrm flipV="1">
+            <a:off x="2291987" y="2132856"/>
+            <a:ext cx="1421912" cy="214129"/>
+          </a:xfrm>
+          <a:prstGeom prst="straightConnector1">
+            <a:avLst/>
+          </a:prstGeom>
+          <a:ln>
+            <a:tailEnd type="arrow"/>
+          </a:ln>
+        </p:spPr>
+        <p:style>
+          <a:lnRef idx="1">
+            <a:schemeClr val="accent1"/>
+          </a:lnRef>
+          <a:fillRef idx="0">
+            <a:schemeClr val="accent1"/>
+          </a:fillRef>
+          <a:effectRef idx="0">
+            <a:schemeClr val="accent1"/>
+          </a:effectRef>
+          <a:fontRef idx="minor">
+            <a:schemeClr val="tx1"/>
+          </a:fontRef>
+        </p:style>
+      </p:cxnSp>
     </p:spTree>
     <p:extLst>
       <p:ext uri="{BB962C8B-B14F-4D97-AF65-F5344CB8AC3E}">
-        <p14:creationId xmlns:p14="http://schemas.microsoft.com/office/powerpoint/2010/main" val="1910416683"/>
+        <p14:creationId xmlns:p14="http://schemas.microsoft.com/office/powerpoint/2010/main" val="4029644176"/>
       </p:ext>
     </p:extLst>
   </p:cSld>
@@ -4557,11 +7051,7 @@
           <a:bodyPr/>
           <a:lstStyle/>
           <a:p>
-            <a:r>
-              <a:rPr lang="en-US" dirty="0" smtClean="0"/>
-              <a:t>Design</a:t>
-            </a:r>
-            <a:endParaRPr lang="ru-RU" dirty="0"/>
+            <a:endParaRPr lang="ru-RU"/>
           </a:p>
         </p:txBody>
       </p:sp>
@@ -4584,22 +7074,90 @@
               <a:buNone/>
             </a:pPr>
             <a:r>
-              <a:rPr lang="en-US" u="sng" dirty="0"/>
-              <a:t>Decentralized Data</a:t>
-            </a:r>
-            <a:endParaRPr lang="ru-RU" u="sng" dirty="0"/>
-          </a:p>
-          <a:p>
-            <a:endParaRPr lang="en-US" dirty="0" smtClean="0"/>
-          </a:p>
-          <a:p>
-            <a:r>
-              <a:rPr lang="en-US" dirty="0" smtClean="0"/>
-              <a:t>No </a:t>
-            </a:r>
-            <a:r>
-              <a:rPr lang="en-US" dirty="0" smtClean="0"/>
-              <a:t>access to DB of 3rd application</a:t>
+              <a:rPr lang="ru-RU" u="sng" dirty="0" err="1"/>
+              <a:t>Business</a:t>
+            </a:r>
+            <a:r>
+              <a:rPr lang="ru-RU" u="sng" dirty="0"/>
+              <a:t> </a:t>
+            </a:r>
+            <a:r>
+              <a:rPr lang="ru-RU" u="sng" dirty="0" err="1"/>
+              <a:t>Capabilities</a:t>
+            </a:r>
+            <a:r>
+              <a:rPr lang="ru-RU" u="sng" dirty="0"/>
+              <a:t> | Организация вокруг </a:t>
+            </a:r>
+            <a:r>
+              <a:rPr lang="ru-RU" u="sng" dirty="0" smtClean="0"/>
+              <a:t>потребностей бизнеса</a:t>
+            </a:r>
+            <a:endParaRPr lang="en-US" u="sng" dirty="0" smtClean="0"/>
+          </a:p>
+          <a:p>
+            <a:pPr marL="0" indent="0">
+              <a:buNone/>
+            </a:pPr>
+            <a:r>
+              <a:rPr lang="en-US" dirty="0" smtClean="0"/>
+              <a:t>- Different components implement different business needs</a:t>
+            </a:r>
+          </a:p>
+          <a:p>
+            <a:pPr marL="0" indent="0">
+              <a:buNone/>
+            </a:pPr>
+            <a:r>
+              <a:rPr lang="en-US" dirty="0"/>
+              <a:t>	</a:t>
+            </a:r>
+            <a:r>
+              <a:rPr lang="en-US" dirty="0" smtClean="0"/>
+              <a:t>- reporting</a:t>
+            </a:r>
+          </a:p>
+          <a:p>
+            <a:pPr marL="0" indent="0">
+              <a:buNone/>
+            </a:pPr>
+            <a:r>
+              <a:rPr lang="en-US" dirty="0"/>
+              <a:t>	</a:t>
+            </a:r>
+            <a:r>
+              <a:rPr lang="en-US" dirty="0" smtClean="0"/>
+              <a:t>- emailing</a:t>
+            </a:r>
+          </a:p>
+          <a:p>
+            <a:pPr marL="0" indent="0">
+              <a:buNone/>
+            </a:pPr>
+            <a:r>
+              <a:rPr lang="en-US" dirty="0"/>
+              <a:t>	</a:t>
+            </a:r>
+            <a:r>
+              <a:rPr lang="en-US" dirty="0" smtClean="0"/>
+              <a:t>- taxes</a:t>
+            </a:r>
+          </a:p>
+          <a:p>
+            <a:pPr marL="0" indent="0">
+              <a:buNone/>
+            </a:pPr>
+            <a:r>
+              <a:rPr lang="en-US" dirty="0"/>
+              <a:t>	</a:t>
+            </a:r>
+            <a:r>
+              <a:rPr lang="en-US" dirty="0" smtClean="0"/>
+              <a:t>- credit card </a:t>
+            </a:r>
+            <a:r>
+              <a:rPr lang="en-US" dirty="0" err="1" smtClean="0"/>
+              <a:t>mgmt</a:t>
             </a:r>
             <a:endParaRPr lang="ru-RU" dirty="0"/>
           </a:p>
@@ -4608,7 +7166,7 @@
     </p:spTree>
     <p:extLst>
       <p:ext uri="{BB962C8B-B14F-4D97-AF65-F5344CB8AC3E}">
-        <p14:creationId xmlns:p14="http://schemas.microsoft.com/office/powerpoint/2010/main" val="1361634447"/>
+        <p14:creationId xmlns:p14="http://schemas.microsoft.com/office/powerpoint/2010/main" val="2238289338"/>
       </p:ext>
     </p:extLst>
   </p:cSld>
@@ -4650,7 +7208,11 @@
           <a:bodyPr/>
           <a:lstStyle/>
           <a:p>
-            <a:endParaRPr lang="ru-RU"/>
+            <a:r>
+              <a:rPr lang="en-US" dirty="0" smtClean="0"/>
+              <a:t>Infrastructure</a:t>
+            </a:r>
+            <a:endParaRPr lang="ru-RU" dirty="0"/>
           </a:p>
         </p:txBody>
       </p:sp>
@@ -4667,127 +7229,132 @@
         <p:spPr/>
         <p:txBody>
           <a:bodyPr>
-            <a:normAutofit fontScale="92500"/>
+            <a:normAutofit fontScale="92500" lnSpcReduction="20000"/>
           </a:bodyPr>
           <a:lstStyle/>
           <a:p>
             <a:r>
-              <a:rPr lang="ru-RU" u="sng" dirty="0" err="1"/>
-              <a:t>Design</a:t>
-            </a:r>
-            <a:r>
-              <a:rPr lang="ru-RU" u="sng" dirty="0"/>
-              <a:t> </a:t>
-            </a:r>
-            <a:r>
-              <a:rPr lang="ru-RU" u="sng" dirty="0" err="1"/>
-              <a:t>for</a:t>
-            </a:r>
-            <a:r>
-              <a:rPr lang="ru-RU" u="sng" dirty="0"/>
-              <a:t> </a:t>
-            </a:r>
-            <a:r>
-              <a:rPr lang="ru-RU" u="sng" dirty="0" err="1"/>
-              <a:t>failure</a:t>
-            </a:r>
-            <a:r>
-              <a:rPr lang="ru-RU" u="sng" dirty="0"/>
-              <a:t> | Проектирование под </a:t>
-            </a:r>
-            <a:r>
-              <a:rPr lang="ru-RU" u="sng" dirty="0" smtClean="0"/>
-              <a:t>отказ</a:t>
-            </a:r>
-            <a:endParaRPr lang="en-US" u="sng" dirty="0" smtClean="0"/>
+              <a:rPr lang="en-US" dirty="0" smtClean="0"/>
+              <a:t>Step </a:t>
+            </a:r>
+            <a:r>
+              <a:rPr lang="en-US" dirty="0"/>
+              <a:t>Away from </a:t>
+            </a:r>
+            <a:r>
+              <a:rPr lang="en-US" dirty="0" smtClean="0"/>
+              <a:t>infrastructure</a:t>
+            </a:r>
+            <a:endParaRPr lang="ru-RU" dirty="0" smtClean="0"/>
+          </a:p>
+          <a:p>
+            <a:r>
+              <a:rPr lang="en-US" dirty="0"/>
+              <a:t>Align environment</a:t>
+            </a:r>
           </a:p>
           <a:p>
             <a:pPr lvl="1"/>
             <a:r>
-              <a:rPr lang="en-US" u="sng" dirty="0" smtClean="0"/>
-              <a:t>Detect</a:t>
+              <a:rPr lang="en-US" dirty="0"/>
+              <a:t>We have separate </a:t>
+            </a:r>
+            <a:r>
+              <a:rPr lang="en-US" dirty="0" smtClean="0"/>
+              <a:t>environments</a:t>
+            </a:r>
+            <a:r>
+              <a:rPr lang="ru-RU" dirty="0" smtClean="0"/>
+              <a:t> (</a:t>
+            </a:r>
+            <a:r>
+              <a:rPr lang="en-US" dirty="0" smtClean="0"/>
+              <a:t>DEV/QA/PS/PROD)</a:t>
+            </a:r>
+            <a:endParaRPr lang="ru-RU" dirty="0" smtClean="0"/>
+          </a:p>
+          <a:p>
+            <a:r>
+              <a:rPr lang="en-US" dirty="0" smtClean="0"/>
+              <a:t>Automation</a:t>
+            </a:r>
+            <a:endParaRPr lang="en-US" dirty="0" smtClean="0"/>
+          </a:p>
+          <a:p>
+            <a:pPr lvl="1"/>
+            <a:r>
+              <a:rPr lang="en-US" dirty="0" smtClean="0"/>
+              <a:t>Continuous Integration</a:t>
+            </a:r>
+          </a:p>
+          <a:p>
+            <a:pPr lvl="1"/>
+            <a:r>
+              <a:rPr lang="en-US" dirty="0" smtClean="0"/>
+              <a:t>Continuous Delivery (on the road to</a:t>
+            </a:r>
+            <a:r>
+              <a:rPr lang="en-US" dirty="0" smtClean="0"/>
+              <a:t>…)</a:t>
+            </a:r>
+          </a:p>
+          <a:p>
+            <a:pPr lvl="1"/>
+            <a:r>
+              <a:rPr lang="en-US" dirty="0" smtClean="0"/>
+              <a:t>One-button Deployment</a:t>
+            </a:r>
+          </a:p>
+          <a:p>
+            <a:pPr lvl="1"/>
+            <a:r>
+              <a:rPr lang="en-US" dirty="0" smtClean="0"/>
+              <a:t>Database Evolution</a:t>
             </a:r>
           </a:p>
           <a:p>
             <a:pPr lvl="2"/>
             <a:r>
-              <a:rPr lang="en-US" u="sng" dirty="0" smtClean="0"/>
-              <a:t>Monitoring</a:t>
-            </a:r>
-          </a:p>
-          <a:p>
-            <a:pPr lvl="3"/>
-            <a:r>
-              <a:rPr lang="en-US" u="sng" dirty="0" smtClean="0"/>
-              <a:t>Near real-time (</a:t>
-            </a:r>
-            <a:r>
-              <a:rPr lang="en-US" u="sng" dirty="0" err="1" smtClean="0"/>
-              <a:t>splunk</a:t>
-            </a:r>
-            <a:r>
-              <a:rPr lang="en-US" u="sng" dirty="0" smtClean="0"/>
-              <a:t>)</a:t>
-            </a:r>
+              <a:rPr lang="en-US" dirty="0" err="1" smtClean="0"/>
+              <a:t>Liquibase</a:t>
+            </a:r>
+            <a:endParaRPr lang="en-US" dirty="0" smtClean="0"/>
           </a:p>
           <a:p>
             <a:pPr lvl="2"/>
             <a:r>
-              <a:rPr lang="en-US" u="sng" dirty="0" smtClean="0"/>
-              <a:t>Extensive Logging</a:t>
-            </a:r>
-          </a:p>
-          <a:p>
-            <a:pPr lvl="2"/>
-            <a:r>
-              <a:rPr lang="en-US" u="sng" dirty="0" smtClean="0"/>
-              <a:t>Defensive Programming</a:t>
-            </a:r>
+              <a:rPr lang="en-US" dirty="0" smtClean="0"/>
+              <a:t>Data migration</a:t>
+            </a:r>
+            <a:endParaRPr lang="en-US" dirty="0" smtClean="0"/>
           </a:p>
           <a:p>
             <a:pPr lvl="1"/>
             <a:r>
-              <a:rPr lang="en-US" u="sng" dirty="0" smtClean="0"/>
-              <a:t>Overcome</a:t>
-            </a:r>
-          </a:p>
-          <a:p>
-            <a:pPr lvl="2"/>
-            <a:r>
-              <a:rPr lang="en-US" u="sng" dirty="0" smtClean="0"/>
-              <a:t>Monitoring emails (manual)</a:t>
-            </a:r>
-          </a:p>
-          <a:p>
-            <a:pPr lvl="2"/>
-            <a:r>
-              <a:rPr lang="en-US" u="sng" dirty="0" smtClean="0"/>
-              <a:t>High Availability</a:t>
-            </a:r>
-          </a:p>
-          <a:p>
-            <a:pPr lvl="3"/>
-            <a:r>
-              <a:rPr lang="en-US" u="sng" smtClean="0"/>
-              <a:t>Load balancing</a:t>
-            </a:r>
-          </a:p>
-          <a:p>
-            <a:pPr lvl="1"/>
-            <a:endParaRPr lang="ru-RU" u="sng" dirty="0"/>
+              <a:rPr lang="en-US" dirty="0" smtClean="0"/>
+              <a:t>Chef</a:t>
+            </a:r>
+            <a:endParaRPr lang="en-US" dirty="0" smtClean="0"/>
           </a:p>
         </p:txBody>
       </p:sp>
     </p:spTree>
     <p:extLst>
       <p:ext uri="{BB962C8B-B14F-4D97-AF65-F5344CB8AC3E}">
-        <p14:creationId xmlns:p14="http://schemas.microsoft.com/office/powerpoint/2010/main" val="555567851"/>
+        <p14:creationId xmlns:p14="http://schemas.microsoft.com/office/powerpoint/2010/main" val="1221449566"/>
       </p:ext>
     </p:extLst>
   </p:cSld>
   <p:clrMapOvr>
     <a:masterClrMapping/>
   </p:clrMapOvr>
+  <p:timing>
+    <p:tnLst>
+      <p:par>
+        <p:cTn id="1" dur="indefinite" restart="never" nodeType="tmRoot"/>
+      </p:par>
+    </p:tnLst>
+  </p:timing>
 </p:sld>
 </file>
 
@@ -4825,7 +7392,7 @@
           <a:p>
             <a:r>
               <a:rPr lang="en-US" dirty="0" smtClean="0"/>
-              <a:t>Client-oriented</a:t>
+              <a:t>Infrastructure</a:t>
             </a:r>
             <a:endParaRPr lang="ru-RU" dirty="0"/>
           </a:p>
@@ -4843,40 +7410,130 @@
         </p:nvSpPr>
         <p:spPr/>
         <p:txBody>
-          <a:bodyPr/>
-          <a:lstStyle/>
-          <a:p>
-            <a:r>
-              <a:rPr lang="en-US" dirty="0" smtClean="0"/>
-              <a:t>Helper client libs</a:t>
-            </a:r>
+          <a:bodyPr>
+            <a:normAutofit fontScale="92500" lnSpcReduction="20000"/>
+          </a:bodyPr>
+          <a:lstStyle/>
+          <a:p>
+            <a:pPr marL="0" indent="0">
+              <a:buNone/>
+            </a:pPr>
+            <a:r>
+              <a:rPr lang="en-US" u="sng" dirty="0"/>
+              <a:t>Infrastructure Automation | </a:t>
+            </a:r>
+            <a:r>
+              <a:rPr lang="ru-RU" u="sng" dirty="0"/>
+              <a:t>Автоматизация инфраструктуры</a:t>
+            </a:r>
+            <a:endParaRPr lang="en-US" u="sng" dirty="0" smtClean="0"/>
           </a:p>
           <a:p>
             <a:pPr lvl="1"/>
             <a:r>
               <a:rPr lang="en-US" dirty="0" smtClean="0"/>
-              <a:t>Rup-rest example</a:t>
-            </a:r>
-          </a:p>
-          <a:p>
-            <a:r>
-              <a:rPr lang="en-US" dirty="0" smtClean="0"/>
-              <a:t>Steward API</a:t>
-            </a:r>
-            <a:endParaRPr lang="ru-RU" dirty="0"/>
+              <a:t>Continuous Integration</a:t>
+            </a:r>
+          </a:p>
+          <a:p>
+            <a:pPr lvl="2"/>
+            <a:r>
+              <a:rPr lang="en-US" dirty="0" smtClean="0"/>
+              <a:t>Jenkins</a:t>
+            </a:r>
+          </a:p>
+          <a:p>
+            <a:pPr lvl="2"/>
+            <a:r>
+              <a:rPr lang="en-US" dirty="0" smtClean="0"/>
+              <a:t>Dedicated Shared Development Environment</a:t>
+            </a:r>
+            <a:endParaRPr lang="en-US" dirty="0" smtClean="0"/>
+          </a:p>
+          <a:p>
+            <a:pPr lvl="1"/>
+            <a:r>
+              <a:rPr lang="en-US" dirty="0" smtClean="0"/>
+              <a:t>Continuous Delivery (on the road to</a:t>
+            </a:r>
+            <a:r>
+              <a:rPr lang="en-US" dirty="0" smtClean="0"/>
+              <a:t>…)</a:t>
+            </a:r>
+          </a:p>
+          <a:p>
+            <a:pPr lvl="1"/>
+            <a:r>
+              <a:rPr lang="en-US" dirty="0" smtClean="0"/>
+              <a:t>One-button Deployment</a:t>
+            </a:r>
+            <a:r>
+              <a:rPr lang="ru-RU" dirty="0" smtClean="0"/>
+              <a:t> (</a:t>
+            </a:r>
+            <a:r>
+              <a:rPr lang="en-US" dirty="0" smtClean="0"/>
+              <a:t>TODO: unfold)</a:t>
+            </a:r>
+          </a:p>
+          <a:p>
+            <a:pPr lvl="1"/>
+            <a:r>
+              <a:rPr lang="en-US" dirty="0" smtClean="0"/>
+              <a:t>Database Evolution (TODO: unfold)</a:t>
+            </a:r>
+          </a:p>
+          <a:p>
+            <a:pPr lvl="2"/>
+            <a:r>
+              <a:rPr lang="en-US" dirty="0" err="1" smtClean="0"/>
+              <a:t>Liquibase</a:t>
+            </a:r>
+            <a:endParaRPr lang="en-US" dirty="0" smtClean="0"/>
+          </a:p>
+          <a:p>
+            <a:pPr lvl="3"/>
+            <a:r>
+              <a:rPr lang="en-US" dirty="0" smtClean="0"/>
+              <a:t>Automated run</a:t>
+            </a:r>
+            <a:endParaRPr lang="en-US" dirty="0" smtClean="0"/>
+          </a:p>
+          <a:p>
+            <a:pPr lvl="2"/>
+            <a:r>
+              <a:rPr lang="en-US" dirty="0" smtClean="0"/>
+              <a:t>Data migration</a:t>
+            </a:r>
+            <a:endParaRPr lang="en-US" dirty="0" smtClean="0"/>
+          </a:p>
+          <a:p>
+            <a:pPr lvl="1"/>
+            <a:r>
+              <a:rPr lang="en-US" smtClean="0"/>
+              <a:t>Chef</a:t>
+            </a:r>
+            <a:endParaRPr lang="en-US" dirty="0" smtClean="0"/>
           </a:p>
         </p:txBody>
       </p:sp>
     </p:spTree>
     <p:extLst>
       <p:ext uri="{BB962C8B-B14F-4D97-AF65-F5344CB8AC3E}">
-        <p14:creationId xmlns:p14="http://schemas.microsoft.com/office/powerpoint/2010/main" val="1995439128"/>
+        <p14:creationId xmlns:p14="http://schemas.microsoft.com/office/powerpoint/2010/main" val="4087347277"/>
       </p:ext>
     </p:extLst>
   </p:cSld>
   <p:clrMapOvr>
     <a:masterClrMapping/>
   </p:clrMapOvr>
+  <p:timing>
+    <p:tnLst>
+      <p:par>
+        <p:cTn id="1" dur="indefinite" restart="never" nodeType="tmRoot"/>
+      </p:par>
+    </p:tnLst>
+  </p:timing>
 </p:sld>
 </file>
 

</xml_diff>

<commit_message>
Translated to russian, grouped
</commit_message>
<xml_diff>
--- a/Microservices.pptx
+++ b/Microservices.pptx
@@ -4,6 +4,9 @@
   <p:sldMasterIdLst>
     <p:sldMasterId id="2147483648" r:id="rId1"/>
   </p:sldMasterIdLst>
+  <p:notesMasterIdLst>
+    <p:notesMasterId r:id="rId23"/>
+  </p:notesMasterIdLst>
   <p:sldIdLst>
     <p:sldId id="256" r:id="rId2"/>
     <p:sldId id="269" r:id="rId3"/>
@@ -17,15 +20,15 @@
     <p:sldId id="258" r:id="rId11"/>
     <p:sldId id="270" r:id="rId12"/>
     <p:sldId id="266" r:id="rId13"/>
-    <p:sldId id="272" r:id="rId14"/>
-    <p:sldId id="260" r:id="rId15"/>
+    <p:sldId id="278" r:id="rId14"/>
+    <p:sldId id="272" r:id="rId15"/>
     <p:sldId id="262" r:id="rId16"/>
     <p:sldId id="263" r:id="rId17"/>
     <p:sldId id="264" r:id="rId18"/>
     <p:sldId id="259" r:id="rId19"/>
-    <p:sldId id="265" r:id="rId20"/>
-    <p:sldId id="267" r:id="rId21"/>
-    <p:sldId id="268" r:id="rId22"/>
+    <p:sldId id="260" r:id="rId20"/>
+    <p:sldId id="265" r:id="rId21"/>
+    <p:sldId id="267" r:id="rId22"/>
   </p:sldIdLst>
   <p:sldSz cx="9144000" cy="6858000" type="screen4x3"/>
   <p:notesSz cx="6858000" cy="9144000"/>
@@ -126,7 +129,7 @@
   </p:defaultTextStyle>
   <p:extLst>
     <p:ext uri="{EFAFB233-063F-42B5-8137-9DF3F51BA10A}">
-      <p15:sldGuideLst xmlns="" xmlns:p15="http://schemas.microsoft.com/office/powerpoint/2012/main">
+      <p15:sldGuideLst xmlns:p15="http://schemas.microsoft.com/office/powerpoint/2012/main" xmlns="">
         <p15:guide id="1" orient="horz" pos="2160">
           <p15:clr>
             <a:srgbClr val="A4A3A4"/>
@@ -156,6 +159,444 @@
     <p:text>Пересмотреть плюсы и минусы</p:text>
   </p:cm>
 </p:cmLst>
+</file>
+
+<file path=ppt/notesMasters/notesMaster1.xml><?xml version="1.0" encoding="utf-8"?>
+<p:notesMaster xmlns:a="http://schemas.openxmlformats.org/drawingml/2006/main" xmlns:r="http://schemas.openxmlformats.org/officeDocument/2006/relationships" xmlns:p="http://schemas.openxmlformats.org/presentationml/2006/main">
+  <p:cSld>
+    <p:bg>
+      <p:bgRef idx="1001">
+        <a:schemeClr val="bg1"/>
+      </p:bgRef>
+    </p:bg>
+    <p:spTree>
+      <p:nvGrpSpPr>
+        <p:cNvPr id="1" name=""/>
+        <p:cNvGrpSpPr/>
+        <p:nvPr/>
+      </p:nvGrpSpPr>
+      <p:grpSpPr>
+        <a:xfrm>
+          <a:off x="0" y="0"/>
+          <a:ext cx="0" cy="0"/>
+          <a:chOff x="0" y="0"/>
+          <a:chExt cx="0" cy="0"/>
+        </a:xfrm>
+      </p:grpSpPr>
+      <p:sp>
+        <p:nvSpPr>
+          <p:cNvPr id="2" name="Верхний колонтитул 1"/>
+          <p:cNvSpPr>
+            <a:spLocks noGrp="1"/>
+          </p:cNvSpPr>
+          <p:nvPr>
+            <p:ph type="hdr" sz="quarter"/>
+          </p:nvPr>
+        </p:nvSpPr>
+        <p:spPr>
+          <a:xfrm>
+            <a:off x="0" y="0"/>
+            <a:ext cx="2971800" cy="457200"/>
+          </a:xfrm>
+          <a:prstGeom prst="rect">
+            <a:avLst/>
+          </a:prstGeom>
+        </p:spPr>
+        <p:txBody>
+          <a:bodyPr vert="horz" lIns="91440" tIns="45720" rIns="91440" bIns="45720" rtlCol="0"/>
+          <a:lstStyle>
+            <a:lvl1pPr algn="l">
+              <a:defRPr sz="1200"/>
+            </a:lvl1pPr>
+          </a:lstStyle>
+          <a:p>
+            <a:endParaRPr lang="ru-RU"/>
+          </a:p>
+        </p:txBody>
+      </p:sp>
+      <p:sp>
+        <p:nvSpPr>
+          <p:cNvPr id="3" name="Дата 2"/>
+          <p:cNvSpPr>
+            <a:spLocks noGrp="1"/>
+          </p:cNvSpPr>
+          <p:nvPr>
+            <p:ph type="dt" idx="1"/>
+          </p:nvPr>
+        </p:nvSpPr>
+        <p:spPr>
+          <a:xfrm>
+            <a:off x="3884613" y="0"/>
+            <a:ext cx="2971800" cy="457200"/>
+          </a:xfrm>
+          <a:prstGeom prst="rect">
+            <a:avLst/>
+          </a:prstGeom>
+        </p:spPr>
+        <p:txBody>
+          <a:bodyPr vert="horz" lIns="91440" tIns="45720" rIns="91440" bIns="45720" rtlCol="0"/>
+          <a:lstStyle>
+            <a:lvl1pPr algn="r">
+              <a:defRPr sz="1200"/>
+            </a:lvl1pPr>
+          </a:lstStyle>
+          <a:p>
+            <a:fld id="{C756A4D3-FAF9-48FE-A65C-CE6AA122FD4A}" type="datetimeFigureOut">
+              <a:rPr lang="ru-RU" smtClean="0"/>
+              <a:t>11.10.2015</a:t>
+            </a:fld>
+            <a:endParaRPr lang="ru-RU"/>
+          </a:p>
+        </p:txBody>
+      </p:sp>
+      <p:sp>
+        <p:nvSpPr>
+          <p:cNvPr id="4" name="Образ слайда 3"/>
+          <p:cNvSpPr>
+            <a:spLocks noGrp="1" noRot="1" noChangeAspect="1"/>
+          </p:cNvSpPr>
+          <p:nvPr>
+            <p:ph type="sldImg" idx="2"/>
+          </p:nvPr>
+        </p:nvSpPr>
+        <p:spPr>
+          <a:xfrm>
+            <a:off x="1143000" y="685800"/>
+            <a:ext cx="4572000" cy="3429000"/>
+          </a:xfrm>
+          <a:prstGeom prst="rect">
+            <a:avLst/>
+          </a:prstGeom>
+          <a:noFill/>
+          <a:ln w="12700">
+            <a:solidFill>
+              <a:prstClr val="black"/>
+            </a:solidFill>
+          </a:ln>
+        </p:spPr>
+        <p:txBody>
+          <a:bodyPr vert="horz" lIns="91440" tIns="45720" rIns="91440" bIns="45720" rtlCol="0" anchor="ctr"/>
+          <a:lstStyle/>
+          <a:p>
+            <a:endParaRPr lang="ru-RU"/>
+          </a:p>
+        </p:txBody>
+      </p:sp>
+      <p:sp>
+        <p:nvSpPr>
+          <p:cNvPr id="5" name="Заметки 4"/>
+          <p:cNvSpPr>
+            <a:spLocks noGrp="1"/>
+          </p:cNvSpPr>
+          <p:nvPr>
+            <p:ph type="body" sz="quarter" idx="3"/>
+          </p:nvPr>
+        </p:nvSpPr>
+        <p:spPr>
+          <a:xfrm>
+            <a:off x="685800" y="4343400"/>
+            <a:ext cx="5486400" cy="4114800"/>
+          </a:xfrm>
+          <a:prstGeom prst="rect">
+            <a:avLst/>
+          </a:prstGeom>
+        </p:spPr>
+        <p:txBody>
+          <a:bodyPr vert="horz" lIns="91440" tIns="45720" rIns="91440" bIns="45720" rtlCol="0"/>
+          <a:lstStyle/>
+          <a:p>
+            <a:pPr lvl="0"/>
+            <a:r>
+              <a:rPr lang="ru-RU" smtClean="0"/>
+              <a:t>Образец текста</a:t>
+            </a:r>
+          </a:p>
+          <a:p>
+            <a:pPr lvl="1"/>
+            <a:r>
+              <a:rPr lang="ru-RU" smtClean="0"/>
+              <a:t>Второй уровень</a:t>
+            </a:r>
+          </a:p>
+          <a:p>
+            <a:pPr lvl="2"/>
+            <a:r>
+              <a:rPr lang="ru-RU" smtClean="0"/>
+              <a:t>Третий уровень</a:t>
+            </a:r>
+          </a:p>
+          <a:p>
+            <a:pPr lvl="3"/>
+            <a:r>
+              <a:rPr lang="ru-RU" smtClean="0"/>
+              <a:t>Четвертый уровень</a:t>
+            </a:r>
+          </a:p>
+          <a:p>
+            <a:pPr lvl="4"/>
+            <a:r>
+              <a:rPr lang="ru-RU" smtClean="0"/>
+              <a:t>Пятый уровень</a:t>
+            </a:r>
+            <a:endParaRPr lang="ru-RU"/>
+          </a:p>
+        </p:txBody>
+      </p:sp>
+      <p:sp>
+        <p:nvSpPr>
+          <p:cNvPr id="6" name="Нижний колонтитул 5"/>
+          <p:cNvSpPr>
+            <a:spLocks noGrp="1"/>
+          </p:cNvSpPr>
+          <p:nvPr>
+            <p:ph type="ftr" sz="quarter" idx="4"/>
+          </p:nvPr>
+        </p:nvSpPr>
+        <p:spPr>
+          <a:xfrm>
+            <a:off x="0" y="8685213"/>
+            <a:ext cx="2971800" cy="457200"/>
+          </a:xfrm>
+          <a:prstGeom prst="rect">
+            <a:avLst/>
+          </a:prstGeom>
+        </p:spPr>
+        <p:txBody>
+          <a:bodyPr vert="horz" lIns="91440" tIns="45720" rIns="91440" bIns="45720" rtlCol="0" anchor="b"/>
+          <a:lstStyle>
+            <a:lvl1pPr algn="l">
+              <a:defRPr sz="1200"/>
+            </a:lvl1pPr>
+          </a:lstStyle>
+          <a:p>
+            <a:endParaRPr lang="ru-RU"/>
+          </a:p>
+        </p:txBody>
+      </p:sp>
+      <p:sp>
+        <p:nvSpPr>
+          <p:cNvPr id="7" name="Номер слайда 6"/>
+          <p:cNvSpPr>
+            <a:spLocks noGrp="1"/>
+          </p:cNvSpPr>
+          <p:nvPr>
+            <p:ph type="sldNum" sz="quarter" idx="5"/>
+          </p:nvPr>
+        </p:nvSpPr>
+        <p:spPr>
+          <a:xfrm>
+            <a:off x="3884613" y="8685213"/>
+            <a:ext cx="2971800" cy="457200"/>
+          </a:xfrm>
+          <a:prstGeom prst="rect">
+            <a:avLst/>
+          </a:prstGeom>
+        </p:spPr>
+        <p:txBody>
+          <a:bodyPr vert="horz" lIns="91440" tIns="45720" rIns="91440" bIns="45720" rtlCol="0" anchor="b"/>
+          <a:lstStyle>
+            <a:lvl1pPr algn="r">
+              <a:defRPr sz="1200"/>
+            </a:lvl1pPr>
+          </a:lstStyle>
+          <a:p>
+            <a:fld id="{178952C0-3E1F-49A2-A869-ED810EA2C686}" type="slidenum">
+              <a:rPr lang="ru-RU" smtClean="0"/>
+              <a:t>‹#›</a:t>
+            </a:fld>
+            <a:endParaRPr lang="ru-RU"/>
+          </a:p>
+        </p:txBody>
+      </p:sp>
+    </p:spTree>
+    <p:extLst>
+      <p:ext uri="{BB962C8B-B14F-4D97-AF65-F5344CB8AC3E}">
+        <p14:creationId xmlns:p14="http://schemas.microsoft.com/office/powerpoint/2010/main" val="1328742417"/>
+      </p:ext>
+    </p:extLst>
+  </p:cSld>
+  <p:clrMap bg1="lt1" tx1="dk1" bg2="lt2" tx2="dk2" accent1="accent1" accent2="accent2" accent3="accent3" accent4="accent4" accent5="accent5" accent6="accent6" hlink="hlink" folHlink="folHlink"/>
+  <p:notesStyle>
+    <a:lvl1pPr marL="0" algn="l" defTabSz="914400" rtl="0" eaLnBrk="1" latinLnBrk="0" hangingPunct="1">
+      <a:defRPr sz="1200" kern="1200">
+        <a:solidFill>
+          <a:schemeClr val="tx1"/>
+        </a:solidFill>
+        <a:latin typeface="+mn-lt"/>
+        <a:ea typeface="+mn-ea"/>
+        <a:cs typeface="+mn-cs"/>
+      </a:defRPr>
+    </a:lvl1pPr>
+    <a:lvl2pPr marL="457200" algn="l" defTabSz="914400" rtl="0" eaLnBrk="1" latinLnBrk="0" hangingPunct="1">
+      <a:defRPr sz="1200" kern="1200">
+        <a:solidFill>
+          <a:schemeClr val="tx1"/>
+        </a:solidFill>
+        <a:latin typeface="+mn-lt"/>
+        <a:ea typeface="+mn-ea"/>
+        <a:cs typeface="+mn-cs"/>
+      </a:defRPr>
+    </a:lvl2pPr>
+    <a:lvl3pPr marL="914400" algn="l" defTabSz="914400" rtl="0" eaLnBrk="1" latinLnBrk="0" hangingPunct="1">
+      <a:defRPr sz="1200" kern="1200">
+        <a:solidFill>
+          <a:schemeClr val="tx1"/>
+        </a:solidFill>
+        <a:latin typeface="+mn-lt"/>
+        <a:ea typeface="+mn-ea"/>
+        <a:cs typeface="+mn-cs"/>
+      </a:defRPr>
+    </a:lvl3pPr>
+    <a:lvl4pPr marL="1371600" algn="l" defTabSz="914400" rtl="0" eaLnBrk="1" latinLnBrk="0" hangingPunct="1">
+      <a:defRPr sz="1200" kern="1200">
+        <a:solidFill>
+          <a:schemeClr val="tx1"/>
+        </a:solidFill>
+        <a:latin typeface="+mn-lt"/>
+        <a:ea typeface="+mn-ea"/>
+        <a:cs typeface="+mn-cs"/>
+      </a:defRPr>
+    </a:lvl4pPr>
+    <a:lvl5pPr marL="1828800" algn="l" defTabSz="914400" rtl="0" eaLnBrk="1" latinLnBrk="0" hangingPunct="1">
+      <a:defRPr sz="1200" kern="1200">
+        <a:solidFill>
+          <a:schemeClr val="tx1"/>
+        </a:solidFill>
+        <a:latin typeface="+mn-lt"/>
+        <a:ea typeface="+mn-ea"/>
+        <a:cs typeface="+mn-cs"/>
+      </a:defRPr>
+    </a:lvl5pPr>
+    <a:lvl6pPr marL="2286000" algn="l" defTabSz="914400" rtl="0" eaLnBrk="1" latinLnBrk="0" hangingPunct="1">
+      <a:defRPr sz="1200" kern="1200">
+        <a:solidFill>
+          <a:schemeClr val="tx1"/>
+        </a:solidFill>
+        <a:latin typeface="+mn-lt"/>
+        <a:ea typeface="+mn-ea"/>
+        <a:cs typeface="+mn-cs"/>
+      </a:defRPr>
+    </a:lvl6pPr>
+    <a:lvl7pPr marL="2743200" algn="l" defTabSz="914400" rtl="0" eaLnBrk="1" latinLnBrk="0" hangingPunct="1">
+      <a:defRPr sz="1200" kern="1200">
+        <a:solidFill>
+          <a:schemeClr val="tx1"/>
+        </a:solidFill>
+        <a:latin typeface="+mn-lt"/>
+        <a:ea typeface="+mn-ea"/>
+        <a:cs typeface="+mn-cs"/>
+      </a:defRPr>
+    </a:lvl7pPr>
+    <a:lvl8pPr marL="3200400" algn="l" defTabSz="914400" rtl="0" eaLnBrk="1" latinLnBrk="0" hangingPunct="1">
+      <a:defRPr sz="1200" kern="1200">
+        <a:solidFill>
+          <a:schemeClr val="tx1"/>
+        </a:solidFill>
+        <a:latin typeface="+mn-lt"/>
+        <a:ea typeface="+mn-ea"/>
+        <a:cs typeface="+mn-cs"/>
+      </a:defRPr>
+    </a:lvl8pPr>
+    <a:lvl9pPr marL="3657600" algn="l" defTabSz="914400" rtl="0" eaLnBrk="1" latinLnBrk="0" hangingPunct="1">
+      <a:defRPr sz="1200" kern="1200">
+        <a:solidFill>
+          <a:schemeClr val="tx1"/>
+        </a:solidFill>
+        <a:latin typeface="+mn-lt"/>
+        <a:ea typeface="+mn-ea"/>
+        <a:cs typeface="+mn-cs"/>
+      </a:defRPr>
+    </a:lvl9pPr>
+  </p:notesStyle>
+</p:notesMaster>
+</file>
+
+<file path=ppt/notesSlides/notesSlide1.xml><?xml version="1.0" encoding="utf-8"?>
+<p:notes xmlns:a="http://schemas.openxmlformats.org/drawingml/2006/main" xmlns:r="http://schemas.openxmlformats.org/officeDocument/2006/relationships" xmlns:p="http://schemas.openxmlformats.org/presentationml/2006/main">
+  <p:cSld>
+    <p:spTree>
+      <p:nvGrpSpPr>
+        <p:cNvPr id="1" name=""/>
+        <p:cNvGrpSpPr/>
+        <p:nvPr/>
+      </p:nvGrpSpPr>
+      <p:grpSpPr>
+        <a:xfrm>
+          <a:off x="0" y="0"/>
+          <a:ext cx="0" cy="0"/>
+          <a:chOff x="0" y="0"/>
+          <a:chExt cx="0" cy="0"/>
+        </a:xfrm>
+      </p:grpSpPr>
+      <p:sp>
+        <p:nvSpPr>
+          <p:cNvPr id="2" name="Образ слайда 1"/>
+          <p:cNvSpPr>
+            <a:spLocks noGrp="1" noRot="1" noChangeAspect="1"/>
+          </p:cNvSpPr>
+          <p:nvPr>
+            <p:ph type="sldImg"/>
+          </p:nvPr>
+        </p:nvSpPr>
+        <p:spPr/>
+      </p:sp>
+      <p:sp>
+        <p:nvSpPr>
+          <p:cNvPr id="3" name="Заметки 2"/>
+          <p:cNvSpPr>
+            <a:spLocks noGrp="1"/>
+          </p:cNvSpPr>
+          <p:nvPr>
+            <p:ph type="body" idx="1"/>
+          </p:nvPr>
+        </p:nvSpPr>
+        <p:spPr/>
+        <p:txBody>
+          <a:bodyPr/>
+          <a:lstStyle/>
+          <a:p>
+            <a:r>
+              <a:rPr lang="ru-RU" dirty="0" smtClean="0"/>
+              <a:t>Больше точек отказа, т.к. сложнее протокол взаимодействия</a:t>
+            </a:r>
+            <a:endParaRPr lang="ru-RU" dirty="0"/>
+          </a:p>
+        </p:txBody>
+      </p:sp>
+      <p:sp>
+        <p:nvSpPr>
+          <p:cNvPr id="4" name="Номер слайда 3"/>
+          <p:cNvSpPr>
+            <a:spLocks noGrp="1"/>
+          </p:cNvSpPr>
+          <p:nvPr>
+            <p:ph type="sldNum" sz="quarter" idx="10"/>
+          </p:nvPr>
+        </p:nvSpPr>
+        <p:spPr/>
+        <p:txBody>
+          <a:bodyPr/>
+          <a:lstStyle/>
+          <a:p>
+            <a:fld id="{178952C0-3E1F-49A2-A869-ED810EA2C686}" type="slidenum">
+              <a:rPr lang="ru-RU" smtClean="0"/>
+              <a:t>3</a:t>
+            </a:fld>
+            <a:endParaRPr lang="ru-RU"/>
+          </a:p>
+        </p:txBody>
+      </p:sp>
+    </p:spTree>
+    <p:extLst>
+      <p:ext uri="{BB962C8B-B14F-4D97-AF65-F5344CB8AC3E}">
+        <p14:creationId xmlns:p14="http://schemas.microsoft.com/office/powerpoint/2010/main" val="841943391"/>
+      </p:ext>
+    </p:extLst>
+  </p:cSld>
+  <p:clrMapOvr>
+    <a:masterClrMapping/>
+  </p:clrMapOvr>
+</p:notes>
 </file>
 
 <file path=ppt/slideLayouts/slideLayout1.xml><?xml version="1.0" encoding="utf-8"?>
@@ -339,7 +780,7 @@
           <a:p>
             <a:fld id="{57E389D1-C2F8-40B4-B845-801280EA792C}" type="datetimeFigureOut">
               <a:rPr lang="ru-RU" smtClean="0"/>
-              <a:t>07.10.2015</a:t>
+              <a:t>11.10.2015</a:t>
             </a:fld>
             <a:endParaRPr lang="ru-RU"/>
           </a:p>
@@ -509,7 +950,7 @@
           <a:p>
             <a:fld id="{57E389D1-C2F8-40B4-B845-801280EA792C}" type="datetimeFigureOut">
               <a:rPr lang="ru-RU" smtClean="0"/>
-              <a:t>07.10.2015</a:t>
+              <a:t>11.10.2015</a:t>
             </a:fld>
             <a:endParaRPr lang="ru-RU"/>
           </a:p>
@@ -689,7 +1130,7 @@
           <a:p>
             <a:fld id="{57E389D1-C2F8-40B4-B845-801280EA792C}" type="datetimeFigureOut">
               <a:rPr lang="ru-RU" smtClean="0"/>
-              <a:t>07.10.2015</a:t>
+              <a:t>11.10.2015</a:t>
             </a:fld>
             <a:endParaRPr lang="ru-RU"/>
           </a:p>
@@ -859,7 +1300,7 @@
           <a:p>
             <a:fld id="{57E389D1-C2F8-40B4-B845-801280EA792C}" type="datetimeFigureOut">
               <a:rPr lang="ru-RU" smtClean="0"/>
-              <a:t>07.10.2015</a:t>
+              <a:t>11.10.2015</a:t>
             </a:fld>
             <a:endParaRPr lang="ru-RU"/>
           </a:p>
@@ -1105,7 +1546,7 @@
           <a:p>
             <a:fld id="{57E389D1-C2F8-40B4-B845-801280EA792C}" type="datetimeFigureOut">
               <a:rPr lang="ru-RU" smtClean="0"/>
-              <a:t>07.10.2015</a:t>
+              <a:t>11.10.2015</a:t>
             </a:fld>
             <a:endParaRPr lang="ru-RU"/>
           </a:p>
@@ -1393,7 +1834,7 @@
           <a:p>
             <a:fld id="{57E389D1-C2F8-40B4-B845-801280EA792C}" type="datetimeFigureOut">
               <a:rPr lang="ru-RU" smtClean="0"/>
-              <a:t>07.10.2015</a:t>
+              <a:t>11.10.2015</a:t>
             </a:fld>
             <a:endParaRPr lang="ru-RU"/>
           </a:p>
@@ -1815,7 +2256,7 @@
           <a:p>
             <a:fld id="{57E389D1-C2F8-40B4-B845-801280EA792C}" type="datetimeFigureOut">
               <a:rPr lang="ru-RU" smtClean="0"/>
-              <a:t>07.10.2015</a:t>
+              <a:t>11.10.2015</a:t>
             </a:fld>
             <a:endParaRPr lang="ru-RU"/>
           </a:p>
@@ -1933,7 +2374,7 @@
           <a:p>
             <a:fld id="{57E389D1-C2F8-40B4-B845-801280EA792C}" type="datetimeFigureOut">
               <a:rPr lang="ru-RU" smtClean="0"/>
-              <a:t>07.10.2015</a:t>
+              <a:t>11.10.2015</a:t>
             </a:fld>
             <a:endParaRPr lang="ru-RU"/>
           </a:p>
@@ -2028,7 +2469,7 @@
           <a:p>
             <a:fld id="{57E389D1-C2F8-40B4-B845-801280EA792C}" type="datetimeFigureOut">
               <a:rPr lang="ru-RU" smtClean="0"/>
-              <a:t>07.10.2015</a:t>
+              <a:t>11.10.2015</a:t>
             </a:fld>
             <a:endParaRPr lang="ru-RU"/>
           </a:p>
@@ -2305,7 +2746,7 @@
           <a:p>
             <a:fld id="{57E389D1-C2F8-40B4-B845-801280EA792C}" type="datetimeFigureOut">
               <a:rPr lang="ru-RU" smtClean="0"/>
-              <a:t>07.10.2015</a:t>
+              <a:t>11.10.2015</a:t>
             </a:fld>
             <a:endParaRPr lang="ru-RU"/>
           </a:p>
@@ -2558,7 +2999,7 @@
           <a:p>
             <a:fld id="{57E389D1-C2F8-40B4-B845-801280EA792C}" type="datetimeFigureOut">
               <a:rPr lang="ru-RU" smtClean="0"/>
-              <a:t>07.10.2015</a:t>
+              <a:t>11.10.2015</a:t>
             </a:fld>
             <a:endParaRPr lang="ru-RU"/>
           </a:p>
@@ -2771,7 +3212,7 @@
           <a:p>
             <a:fld id="{57E389D1-C2F8-40B4-B845-801280EA792C}" type="datetimeFigureOut">
               <a:rPr lang="ru-RU" smtClean="0"/>
-              <a:t>07.10.2015</a:t>
+              <a:t>11.10.2015</a:t>
             </a:fld>
             <a:endParaRPr lang="ru-RU"/>
           </a:p>
@@ -3261,81 +3702,84 @@
         <p:spPr/>
         <p:txBody>
           <a:bodyPr>
-            <a:normAutofit fontScale="85000" lnSpcReduction="20000"/>
+            <a:normAutofit fontScale="92500" lnSpcReduction="10000"/>
           </a:bodyPr>
           <a:lstStyle/>
           <a:p>
-            <a:r>
-              <a:rPr lang="en-US" dirty="0" smtClean="0"/>
-              <a:t>Interaction Protocol</a:t>
-            </a:r>
-          </a:p>
-          <a:p>
-            <a:pPr lvl="1"/>
-            <a:r>
-              <a:rPr lang="en-US" dirty="0" smtClean="0"/>
-              <a:t>REST</a:t>
-            </a:r>
-          </a:p>
-          <a:p>
-            <a:pPr lvl="1"/>
-            <a:r>
-              <a:rPr lang="en-US" dirty="0" smtClean="0"/>
-              <a:t>Messaging </a:t>
-            </a:r>
-          </a:p>
-          <a:p>
-            <a:pPr lvl="2"/>
-            <a:r>
-              <a:rPr lang="en-US" dirty="0" smtClean="0"/>
-              <a:t>JMS</a:t>
-            </a:r>
-          </a:p>
-          <a:p>
-            <a:r>
-              <a:rPr lang="en-US" dirty="0" smtClean="0"/>
-              <a:t>Compatibility</a:t>
-            </a:r>
-          </a:p>
-          <a:p>
-            <a:pPr lvl="1"/>
-            <a:r>
-              <a:rPr lang="en-US" dirty="0" smtClean="0"/>
-              <a:t>Trying to keep</a:t>
-            </a:r>
-          </a:p>
-          <a:p>
-            <a:pPr lvl="1"/>
-            <a:r>
-              <a:rPr lang="en-US" dirty="0" smtClean="0"/>
-              <a:t>Versioning system (different)</a:t>
-            </a:r>
-          </a:p>
-          <a:p>
-            <a:r>
-              <a:rPr lang="en-US" dirty="0" smtClean="0"/>
-              <a:t>Documentation</a:t>
-            </a:r>
-          </a:p>
-          <a:p>
-            <a:pPr lvl="1"/>
-            <a:r>
-              <a:rPr lang="en-US" dirty="0" smtClean="0"/>
-              <a:t>Should be thorough (word)</a:t>
-            </a:r>
-          </a:p>
-          <a:p>
-            <a:r>
-              <a:rPr lang="en-US" dirty="0" smtClean="0"/>
-              <a:t>Stateless</a:t>
-            </a:r>
-          </a:p>
-          <a:p>
-            <a:r>
-              <a:rPr lang="en-US" dirty="0" smtClean="0"/>
-              <a:t>Decentralized Data</a:t>
+            <a:pPr>
+              <a:lnSpc>
+                <a:spcPct val="150000"/>
+              </a:lnSpc>
+            </a:pPr>
+            <a:r>
+              <a:rPr lang="ru-RU" dirty="0"/>
+              <a:t>Децентрализованные </a:t>
+            </a:r>
+            <a:r>
+              <a:rPr lang="ru-RU" dirty="0" smtClean="0"/>
+              <a:t>данные</a:t>
             </a:r>
             <a:endParaRPr lang="ru-RU" dirty="0"/>
+          </a:p>
+          <a:p>
+            <a:pPr>
+              <a:lnSpc>
+                <a:spcPct val="150000"/>
+              </a:lnSpc>
+            </a:pPr>
+            <a:r>
+              <a:rPr lang="ru-RU" dirty="0"/>
+              <a:t>Децентрализованное управление </a:t>
+            </a:r>
+            <a:endParaRPr lang="en-US" dirty="0" smtClean="0"/>
+          </a:p>
+          <a:p>
+            <a:pPr>
+              <a:lnSpc>
+                <a:spcPct val="150000"/>
+              </a:lnSpc>
+            </a:pPr>
+            <a:r>
+              <a:rPr lang="ru-RU" dirty="0" smtClean="0"/>
+              <a:t>Протокол взаимодействия</a:t>
+            </a:r>
+            <a:endParaRPr lang="en-US" dirty="0" smtClean="0"/>
+          </a:p>
+          <a:p>
+            <a:pPr>
+              <a:lnSpc>
+                <a:spcPct val="150000"/>
+              </a:lnSpc>
+            </a:pPr>
+            <a:r>
+              <a:rPr lang="ru-RU" dirty="0" smtClean="0"/>
+              <a:t>Совместимость</a:t>
+            </a:r>
+            <a:endParaRPr lang="en-US" dirty="0" smtClean="0"/>
+          </a:p>
+          <a:p>
+            <a:pPr>
+              <a:lnSpc>
+                <a:spcPct val="150000"/>
+              </a:lnSpc>
+            </a:pPr>
+            <a:r>
+              <a:rPr lang="ru-RU" dirty="0" smtClean="0"/>
+              <a:t>Документация</a:t>
+            </a:r>
+            <a:endParaRPr lang="en-US" dirty="0" smtClean="0"/>
+          </a:p>
+          <a:p>
+            <a:pPr>
+              <a:lnSpc>
+                <a:spcPct val="150000"/>
+              </a:lnSpc>
+            </a:pPr>
+            <a:r>
+              <a:rPr lang="ru-RU" dirty="0" smtClean="0"/>
+              <a:t>Проектирование под отказ</a:t>
+            </a:r>
+            <a:endParaRPr lang="en-US" dirty="0" smtClean="0"/>
           </a:p>
         </p:txBody>
       </p:sp>
@@ -3388,10 +3832,20 @@
         </p:nvSpPr>
         <p:spPr/>
         <p:txBody>
-          <a:bodyPr/>
-          <a:lstStyle/>
-          <a:p>
-            <a:endParaRPr lang="ru-RU"/>
+          <a:bodyPr>
+            <a:normAutofit/>
+          </a:bodyPr>
+          <a:lstStyle/>
+          <a:p>
+            <a:r>
+              <a:rPr lang="en-US" u="sng" dirty="0"/>
+              <a:t>Decentralized </a:t>
+            </a:r>
+            <a:r>
+              <a:rPr lang="en-US" u="sng" dirty="0" smtClean="0"/>
+              <a:t>Governance</a:t>
+            </a:r>
+            <a:endParaRPr lang="ru-RU" dirty="0"/>
           </a:p>
         </p:txBody>
       </p:sp>
@@ -3414,83 +3868,46 @@
               <a:buNone/>
             </a:pPr>
             <a:r>
-              <a:rPr lang="en-US" u="sng" dirty="0"/>
-              <a:t>Decentralized </a:t>
-            </a:r>
-            <a:r>
-              <a:rPr lang="en-US" u="sng" dirty="0" smtClean="0"/>
-              <a:t>Governance</a:t>
-            </a:r>
-          </a:p>
-          <a:p>
-            <a:pPr marL="0" indent="0">
-              <a:buNone/>
+              <a:rPr lang="ru-RU" u="sng" dirty="0" smtClean="0"/>
+              <a:t>Децентрализованное управление</a:t>
+            </a:r>
+            <a:endParaRPr lang="en-US" u="sng" dirty="0" smtClean="0"/>
+          </a:p>
+          <a:p>
+            <a:r>
+              <a:rPr lang="ru-RU" dirty="0" smtClean="0"/>
+              <a:t>Разные технологии для разных целей</a:t>
+            </a:r>
+          </a:p>
+          <a:p>
+            <a:pPr lvl="1"/>
+            <a:r>
+              <a:rPr lang="ru-RU" dirty="0" smtClean="0"/>
+              <a:t>Фреймворки</a:t>
+            </a:r>
+          </a:p>
+          <a:p>
+            <a:pPr lvl="1"/>
+            <a:r>
+              <a:rPr lang="ru-RU" dirty="0" smtClean="0"/>
+              <a:t>Сервера приложений</a:t>
+            </a:r>
+            <a:endParaRPr lang="en-US" dirty="0" smtClean="0"/>
+          </a:p>
+          <a:p>
+            <a:r>
+              <a:rPr lang="ru-RU" dirty="0" smtClean="0"/>
+              <a:t>Но единая платформа</a:t>
+            </a:r>
+          </a:p>
+          <a:p>
+            <a:pPr lvl="1">
+              <a:buFontTx/>
+              <a:buChar char="-"/>
             </a:pPr>
             <a:r>
-              <a:rPr lang="en-US" dirty="0" smtClean="0"/>
-              <a:t> - Different technologies for different purposes</a:t>
-            </a:r>
-          </a:p>
-          <a:p>
-            <a:pPr marL="0" indent="0">
-              <a:buNone/>
-            </a:pPr>
-            <a:r>
-              <a:rPr lang="en-US" dirty="0"/>
-              <a:t>	</a:t>
-            </a:r>
-            <a:r>
-              <a:rPr lang="en-US" dirty="0" smtClean="0"/>
-              <a:t>- Different </a:t>
-            </a:r>
-            <a:r>
-              <a:rPr lang="en-US" dirty="0" smtClean="0"/>
-              <a:t>Frameworks/Storages</a:t>
-            </a:r>
-          </a:p>
-          <a:p>
-            <a:pPr marL="0" indent="0">
-              <a:buNone/>
-            </a:pPr>
-            <a:r>
-              <a:rPr lang="en-US" dirty="0" smtClean="0"/>
-              <a:t>		- polyglot persistence</a:t>
-            </a:r>
-            <a:endParaRPr lang="en-US" dirty="0" smtClean="0"/>
-          </a:p>
-          <a:p>
-            <a:pPr marL="0" indent="0">
-              <a:buNone/>
-            </a:pPr>
-            <a:r>
-              <a:rPr lang="en-US" dirty="0"/>
-              <a:t>	</a:t>
-            </a:r>
-            <a:r>
-              <a:rPr lang="en-US" dirty="0" smtClean="0"/>
-              <a:t>	- Mongo/</a:t>
-            </a:r>
-            <a:r>
-              <a:rPr lang="en-US" dirty="0" err="1" smtClean="0"/>
-              <a:t>Postgres</a:t>
-            </a:r>
-            <a:r>
-              <a:rPr lang="en-US" dirty="0" smtClean="0"/>
-              <a:t>/</a:t>
-            </a:r>
-            <a:r>
-              <a:rPr lang="en-US" dirty="0" err="1" smtClean="0"/>
-              <a:t>Lucene</a:t>
-            </a:r>
-            <a:endParaRPr lang="en-US" dirty="0" smtClean="0"/>
-          </a:p>
-          <a:p>
-            <a:pPr marL="0" indent="0">
-              <a:buNone/>
-            </a:pPr>
-            <a:r>
-              <a:rPr lang="en-US" dirty="0" smtClean="0"/>
-              <a:t>- But still have one platform/standards/libs</a:t>
+              <a:rPr lang="ru-RU" dirty="0" smtClean="0"/>
+              <a:t>Система сборки</a:t>
             </a:r>
             <a:endParaRPr lang="ru-RU" dirty="0"/>
           </a:p>
@@ -3506,6 +3923,13 @@
   <p:clrMapOvr>
     <a:masterClrMapping/>
   </p:clrMapOvr>
+  <p:timing>
+    <p:tnLst>
+      <p:par>
+        <p:cTn id="1" dur="indefinite" restart="never" nodeType="tmRoot"/>
+      </p:par>
+    </p:tnLst>
+  </p:timing>
 </p:sld>
 </file>
 
@@ -3538,12 +3962,18 @@
         </p:nvSpPr>
         <p:spPr/>
         <p:txBody>
-          <a:bodyPr/>
-          <a:lstStyle/>
-          <a:p>
-            <a:r>
-              <a:rPr lang="en-US" dirty="0" smtClean="0"/>
-              <a:t>Design</a:t>
+          <a:bodyPr>
+            <a:normAutofit/>
+          </a:bodyPr>
+          <a:lstStyle/>
+          <a:p>
+            <a:r>
+              <a:rPr lang="en-US" u="sng" dirty="0"/>
+              <a:t>Decentralized </a:t>
+            </a:r>
+            <a:r>
+              <a:rPr lang="en-US" u="sng" dirty="0" smtClean="0"/>
+              <a:t>Data</a:t>
             </a:r>
             <a:endParaRPr lang="ru-RU" dirty="0"/>
           </a:p>
@@ -3568,18 +3998,68 @@
               <a:buNone/>
             </a:pPr>
             <a:r>
-              <a:rPr lang="en-US" u="sng" dirty="0"/>
-              <a:t>Decentralized Data</a:t>
-            </a:r>
-            <a:endParaRPr lang="ru-RU" u="sng" dirty="0"/>
-          </a:p>
-          <a:p>
-            <a:endParaRPr lang="en-US" dirty="0" smtClean="0"/>
-          </a:p>
-          <a:p>
-            <a:r>
-              <a:rPr lang="en-US" dirty="0" smtClean="0"/>
-              <a:t>No access to DB of 3rd application</a:t>
+              <a:rPr lang="ru-RU" dirty="0"/>
+              <a:t>Децентрализованные данные </a:t>
+            </a:r>
+            <a:endParaRPr lang="ru-RU" dirty="0" smtClean="0"/>
+          </a:p>
+          <a:p>
+            <a:r>
+              <a:rPr lang="ru-RU" dirty="0" smtClean="0"/>
+              <a:t>Разные </a:t>
+            </a:r>
+            <a:r>
+              <a:rPr lang="ru-RU" dirty="0"/>
+              <a:t>хранилища данных</a:t>
+            </a:r>
+            <a:endParaRPr lang="en-US" dirty="0"/>
+          </a:p>
+          <a:p>
+            <a:pPr marL="0" indent="0">
+              <a:buNone/>
+            </a:pPr>
+            <a:r>
+              <a:rPr lang="en-US" dirty="0"/>
+              <a:t>		- polyglot persistence</a:t>
+            </a:r>
+          </a:p>
+          <a:p>
+            <a:pPr marL="0" indent="0">
+              <a:buNone/>
+            </a:pPr>
+            <a:r>
+              <a:rPr lang="en-US" dirty="0"/>
+              <a:t>		- Mongo/</a:t>
+            </a:r>
+            <a:r>
+              <a:rPr lang="en-US" dirty="0" err="1"/>
+              <a:t>Postgres</a:t>
+            </a:r>
+            <a:r>
+              <a:rPr lang="en-US" dirty="0"/>
+              <a:t>/</a:t>
+            </a:r>
+            <a:r>
+              <a:rPr lang="en-US" dirty="0" err="1"/>
+              <a:t>Lucene</a:t>
+            </a:r>
+            <a:endParaRPr lang="en-US" dirty="0"/>
+          </a:p>
+          <a:p>
+            <a:r>
+              <a:rPr lang="ru-RU" dirty="0" smtClean="0"/>
+              <a:t>Нет доступа к хранилищам других сервисов</a:t>
+            </a:r>
+          </a:p>
+          <a:p>
+            <a:pPr lvl="1"/>
+            <a:endParaRPr lang="ru-RU" dirty="0"/>
+          </a:p>
+          <a:p>
+            <a:pPr lvl="3"/>
+            <a:r>
+              <a:rPr lang="ru-RU" dirty="0" smtClean="0"/>
+              <a:t>Изображение здесь</a:t>
             </a:r>
             <a:endParaRPr lang="ru-RU" dirty="0"/>
           </a:p>
@@ -3595,6 +4075,13 @@
   <p:clrMapOvr>
     <a:masterClrMapping/>
   </p:clrMapOvr>
+  <p:timing>
+    <p:tnLst>
+      <p:par>
+        <p:cTn id="1" dur="indefinite" restart="never" nodeType="tmRoot"/>
+      </p:par>
+    </p:tnLst>
+  </p:timing>
 </p:sld>
 </file>
 
@@ -3630,7 +4117,15 @@
           <a:bodyPr/>
           <a:lstStyle/>
           <a:p>
-            <a:endParaRPr lang="ru-RU"/>
+            <a:r>
+              <a:rPr lang="en-US" dirty="0" err="1" smtClean="0"/>
+              <a:t>Microservices</a:t>
+            </a:r>
+            <a:r>
+              <a:rPr lang="en-US" dirty="0" smtClean="0"/>
+              <a:t> Design</a:t>
+            </a:r>
+            <a:endParaRPr lang="ru-RU" dirty="0"/>
           </a:p>
         </p:txBody>
       </p:sp>
@@ -3647,140 +4142,131 @@
         <p:spPr/>
         <p:txBody>
           <a:bodyPr>
-            <a:normAutofit fontScale="92500" lnSpcReduction="10000"/>
+            <a:normAutofit fontScale="92500" lnSpcReduction="20000"/>
           </a:bodyPr>
           <a:lstStyle/>
           <a:p>
             <a:r>
-              <a:rPr lang="ru-RU" u="sng" dirty="0" err="1"/>
-              <a:t>Design</a:t>
-            </a:r>
-            <a:r>
-              <a:rPr lang="ru-RU" u="sng" dirty="0"/>
-              <a:t> </a:t>
-            </a:r>
-            <a:r>
-              <a:rPr lang="ru-RU" u="sng" dirty="0" err="1"/>
-              <a:t>for</a:t>
-            </a:r>
-            <a:r>
-              <a:rPr lang="ru-RU" u="sng" dirty="0"/>
-              <a:t> </a:t>
-            </a:r>
-            <a:r>
-              <a:rPr lang="ru-RU" u="sng" dirty="0" err="1"/>
-              <a:t>failure</a:t>
-            </a:r>
-            <a:r>
-              <a:rPr lang="ru-RU" u="sng" dirty="0"/>
-              <a:t> | Проектирование под </a:t>
-            </a:r>
-            <a:r>
-              <a:rPr lang="ru-RU" u="sng" dirty="0" smtClean="0"/>
-              <a:t>отказ</a:t>
-            </a:r>
-            <a:endParaRPr lang="en-US" u="sng" dirty="0" smtClean="0"/>
+              <a:rPr lang="ru-RU" dirty="0"/>
+              <a:t>Протокол взаимодействия</a:t>
+            </a:r>
+            <a:endParaRPr lang="en-US" dirty="0"/>
           </a:p>
           <a:p>
             <a:pPr lvl="1"/>
             <a:r>
-              <a:rPr lang="en-US" u="sng" dirty="0" smtClean="0"/>
-              <a:t>Detect</a:t>
+              <a:rPr lang="en-US" dirty="0"/>
+              <a:t>REST</a:t>
+            </a:r>
+          </a:p>
+          <a:p>
+            <a:pPr lvl="1"/>
+            <a:r>
+              <a:rPr lang="en-US" dirty="0"/>
+              <a:t>Messaging </a:t>
             </a:r>
           </a:p>
           <a:p>
             <a:pPr lvl="2"/>
             <a:r>
-              <a:rPr lang="en-US" u="sng" dirty="0" smtClean="0"/>
-              <a:t>Monitoring</a:t>
-            </a:r>
-          </a:p>
-          <a:p>
-            <a:pPr lvl="3"/>
-            <a:r>
-              <a:rPr lang="en-US" u="sng" dirty="0" smtClean="0"/>
-              <a:t>Logs monitoring near </a:t>
-            </a:r>
-            <a:r>
-              <a:rPr lang="en-US" u="sng" dirty="0" smtClean="0"/>
-              <a:t>real-time (</a:t>
-            </a:r>
-            <a:r>
-              <a:rPr lang="en-US" u="sng" dirty="0" err="1" smtClean="0"/>
-              <a:t>splunk</a:t>
-            </a:r>
-            <a:r>
-              <a:rPr lang="en-US" u="sng" dirty="0" smtClean="0"/>
+              <a:rPr lang="en-US" dirty="0"/>
+              <a:t>JMS</a:t>
+            </a:r>
+          </a:p>
+          <a:p>
+            <a:r>
+              <a:rPr lang="ru-RU" dirty="0"/>
+              <a:t>Совместимость (</a:t>
+            </a:r>
+            <a:r>
+              <a:rPr lang="en-US" dirty="0"/>
+              <a:t>Compatibility</a:t>
+            </a:r>
+            <a:r>
+              <a:rPr lang="ru-RU" dirty="0"/>
               <a:t>)</a:t>
             </a:r>
-          </a:p>
-          <a:p>
-            <a:pPr lvl="2"/>
-            <a:r>
-              <a:rPr lang="en-US" u="sng" dirty="0" smtClean="0"/>
-              <a:t>Extensive Logging</a:t>
-            </a:r>
-          </a:p>
-          <a:p>
-            <a:pPr lvl="2"/>
-            <a:r>
-              <a:rPr lang="en-US" u="sng" dirty="0" smtClean="0"/>
-              <a:t>Defensive Programming</a:t>
-            </a:r>
+            <a:endParaRPr lang="en-US" dirty="0"/>
           </a:p>
           <a:p>
             <a:pPr lvl="1"/>
             <a:r>
-              <a:rPr lang="en-US" u="sng" dirty="0" smtClean="0"/>
-              <a:t>Overcome</a:t>
-            </a:r>
-          </a:p>
-          <a:p>
-            <a:pPr lvl="2"/>
-            <a:r>
-              <a:rPr lang="en-US" u="sng" dirty="0" smtClean="0"/>
-              <a:t>Manual: monitoring emails</a:t>
-            </a:r>
-            <a:endParaRPr lang="en-US" u="sng" dirty="0" smtClean="0"/>
-          </a:p>
-          <a:p>
-            <a:pPr lvl="2"/>
-            <a:r>
-              <a:rPr lang="en-US" u="sng" dirty="0" smtClean="0"/>
-              <a:t>Automatic</a:t>
-            </a:r>
-          </a:p>
-          <a:p>
-            <a:pPr lvl="3"/>
-            <a:r>
-              <a:rPr lang="en-US" u="sng" dirty="0" smtClean="0"/>
-              <a:t>High Availability (Load balancing)</a:t>
-            </a:r>
-          </a:p>
-          <a:p>
-            <a:pPr lvl="3"/>
-            <a:r>
-              <a:rPr lang="en-US" u="sng" dirty="0" smtClean="0"/>
-              <a:t>Automatic retry</a:t>
-            </a:r>
-            <a:endParaRPr lang="en-US" u="sng" dirty="0" smtClean="0"/>
+              <a:rPr lang="ru-RU" dirty="0"/>
+              <a:t>Максимально возможная поддержка</a:t>
+            </a:r>
+            <a:endParaRPr lang="en-US" dirty="0"/>
           </a:p>
           <a:p>
             <a:pPr lvl="1"/>
-            <a:endParaRPr lang="ru-RU" u="sng" dirty="0"/>
+            <a:r>
+              <a:rPr lang="ru-RU" dirty="0"/>
+              <a:t>Система </a:t>
+            </a:r>
+            <a:r>
+              <a:rPr lang="ru-RU" dirty="0" err="1"/>
+              <a:t>версионирования</a:t>
+            </a:r>
+            <a:r>
+              <a:rPr lang="ru-RU" dirty="0"/>
+              <a:t> (</a:t>
+            </a:r>
+            <a:r>
+              <a:rPr lang="en-US" dirty="0"/>
+              <a:t>X.Y.Z)</a:t>
+            </a:r>
+          </a:p>
+          <a:p>
+            <a:r>
+              <a:rPr lang="ru-RU" dirty="0"/>
+              <a:t>Документация</a:t>
+            </a:r>
+            <a:endParaRPr lang="en-US" dirty="0"/>
+          </a:p>
+          <a:p>
+            <a:pPr lvl="1"/>
+            <a:r>
+              <a:rPr lang="ru-RU" dirty="0"/>
+              <a:t>Должна быть исчерпывающей</a:t>
+            </a:r>
+            <a:endParaRPr lang="en-US" dirty="0"/>
+          </a:p>
+          <a:p>
+            <a:r>
+              <a:rPr lang="ru-RU" dirty="0"/>
+              <a:t>Без состояния (</a:t>
+            </a:r>
+            <a:r>
+              <a:rPr lang="en-US" dirty="0"/>
+              <a:t>Stateless</a:t>
+            </a:r>
+            <a:r>
+              <a:rPr lang="ru-RU" dirty="0"/>
+              <a:t>)</a:t>
+            </a:r>
+            <a:endParaRPr lang="en-US" dirty="0"/>
+          </a:p>
+          <a:p>
+            <a:endParaRPr lang="ru-RU" dirty="0"/>
           </a:p>
         </p:txBody>
       </p:sp>
     </p:spTree>
     <p:extLst>
       <p:ext uri="{BB962C8B-B14F-4D97-AF65-F5344CB8AC3E}">
-        <p14:creationId xmlns:p14="http://schemas.microsoft.com/office/powerpoint/2010/main" val="555567851"/>
+        <p14:creationId xmlns:p14="http://schemas.microsoft.com/office/powerpoint/2010/main" val="596141011"/>
       </p:ext>
     </p:extLst>
   </p:cSld>
   <p:clrMapOvr>
     <a:masterClrMapping/>
   </p:clrMapOvr>
+  <p:timing>
+    <p:tnLst>
+      <p:par>
+        <p:cTn id="1" dur="indefinite" restart="never" nodeType="tmRoot"/>
+      </p:par>
+    </p:tnLst>
+  </p:timing>
 </p:sld>
 </file>
 
@@ -3817,8 +4303,24 @@
           <a:lstStyle/>
           <a:p>
             <a:r>
-              <a:rPr lang="en-US" dirty="0" smtClean="0"/>
-              <a:t>Design: Client-oriented</a:t>
+              <a:rPr lang="ru-RU" u="sng" dirty="0" err="1"/>
+              <a:t>Design</a:t>
+            </a:r>
+            <a:r>
+              <a:rPr lang="ru-RU" u="sng" dirty="0"/>
+              <a:t> </a:t>
+            </a:r>
+            <a:r>
+              <a:rPr lang="ru-RU" u="sng" dirty="0" err="1"/>
+              <a:t>for</a:t>
+            </a:r>
+            <a:r>
+              <a:rPr lang="ru-RU" u="sng" dirty="0"/>
+              <a:t> </a:t>
+            </a:r>
+            <a:r>
+              <a:rPr lang="ru-RU" u="sng" dirty="0" err="1"/>
+              <a:t>failure</a:t>
             </a:r>
             <a:endParaRPr lang="ru-RU" dirty="0"/>
           </a:p>
@@ -3836,40 +4338,161 @@
         </p:nvSpPr>
         <p:spPr/>
         <p:txBody>
-          <a:bodyPr/>
-          <a:lstStyle/>
-          <a:p>
-            <a:r>
-              <a:rPr lang="en-US" dirty="0" smtClean="0"/>
-              <a:t>Helper client libs</a:t>
-            </a:r>
+          <a:bodyPr>
+            <a:normAutofit fontScale="77500" lnSpcReduction="20000"/>
+          </a:bodyPr>
+          <a:lstStyle/>
+          <a:p>
+            <a:pPr marL="0" indent="0">
+              <a:buNone/>
+            </a:pPr>
+            <a:r>
+              <a:rPr lang="ru-RU" sz="4100" u="sng" dirty="0" smtClean="0"/>
+              <a:t>Проектирование </a:t>
+            </a:r>
+            <a:r>
+              <a:rPr lang="ru-RU" sz="4100" u="sng" dirty="0"/>
+              <a:t>под </a:t>
+            </a:r>
+            <a:r>
+              <a:rPr lang="ru-RU" sz="4100" u="sng" dirty="0" smtClean="0"/>
+              <a:t>отказ</a:t>
+            </a:r>
+            <a:endParaRPr lang="en-US" sz="4100" u="sng" dirty="0" smtClean="0"/>
+          </a:p>
+          <a:p>
+            <a:r>
+              <a:rPr lang="ru-RU" sz="3400" u="sng" dirty="0" smtClean="0"/>
+              <a:t>Найти отказ</a:t>
+            </a:r>
+            <a:endParaRPr lang="en-US" sz="3400" u="sng" dirty="0" smtClean="0"/>
           </a:p>
           <a:p>
             <a:pPr lvl="1"/>
             <a:r>
-              <a:rPr lang="en-US" dirty="0" smtClean="0"/>
-              <a:t>Rup-rest example</a:t>
-            </a:r>
-          </a:p>
-          <a:p>
-            <a:r>
-              <a:rPr lang="en-US" dirty="0" smtClean="0"/>
-              <a:t>Steward API</a:t>
-            </a:r>
-            <a:endParaRPr lang="ru-RU" dirty="0"/>
+              <a:rPr lang="ru-RU" sz="3000" dirty="0" smtClean="0"/>
+              <a:t>Мониторинг</a:t>
+            </a:r>
+            <a:endParaRPr lang="en-US" sz="3000" dirty="0" smtClean="0"/>
+          </a:p>
+          <a:p>
+            <a:pPr lvl="2"/>
+            <a:r>
+              <a:rPr lang="ru-RU" sz="2600" dirty="0" smtClean="0"/>
+              <a:t>В почти реальном времени</a:t>
+            </a:r>
+            <a:r>
+              <a:rPr lang="en-US" sz="2600" dirty="0" smtClean="0"/>
+              <a:t> </a:t>
+            </a:r>
+            <a:r>
+              <a:rPr lang="en-US" sz="2600" dirty="0" smtClean="0"/>
+              <a:t>(</a:t>
+            </a:r>
+            <a:r>
+              <a:rPr lang="en-US" sz="2600" dirty="0" err="1" smtClean="0"/>
+              <a:t>splunk</a:t>
+            </a:r>
+            <a:r>
+              <a:rPr lang="en-US" sz="2600" dirty="0" smtClean="0"/>
+              <a:t>)</a:t>
+            </a:r>
+          </a:p>
+          <a:p>
+            <a:pPr lvl="1"/>
+            <a:r>
+              <a:rPr lang="ru-RU" sz="3000" dirty="0" smtClean="0"/>
+              <a:t>Исчерпывающее </a:t>
+            </a:r>
+            <a:r>
+              <a:rPr lang="ru-RU" sz="3000" dirty="0" err="1" smtClean="0"/>
+              <a:t>логгирование</a:t>
+            </a:r>
+            <a:endParaRPr lang="en-US" sz="3000" dirty="0" smtClean="0"/>
+          </a:p>
+          <a:p>
+            <a:pPr lvl="1"/>
+            <a:r>
+              <a:rPr lang="ru-RU" sz="3000" dirty="0" smtClean="0"/>
+              <a:t>Защитное программирование</a:t>
+            </a:r>
+            <a:endParaRPr lang="en-US" sz="3000" dirty="0" smtClean="0"/>
+          </a:p>
+          <a:p>
+            <a:r>
+              <a:rPr lang="ru-RU" sz="3400" u="sng" dirty="0" smtClean="0"/>
+              <a:t>Исправление</a:t>
+            </a:r>
+            <a:endParaRPr lang="en-US" sz="3400" u="sng" dirty="0" smtClean="0"/>
+          </a:p>
+          <a:p>
+            <a:pPr lvl="1"/>
+            <a:r>
+              <a:rPr lang="ru-RU" sz="3000" dirty="0" smtClean="0"/>
+              <a:t>Ручное</a:t>
+            </a:r>
+          </a:p>
+          <a:p>
+            <a:pPr lvl="2"/>
+            <a:r>
+              <a:rPr lang="ru-RU" sz="2600" dirty="0" smtClean="0"/>
+              <a:t>Мониторинг </a:t>
+            </a:r>
+            <a:r>
+              <a:rPr lang="en-US" sz="2600" dirty="0" smtClean="0"/>
+              <a:t>email</a:t>
+            </a:r>
+            <a:endParaRPr lang="en-US" sz="2600" dirty="0" smtClean="0"/>
+          </a:p>
+          <a:p>
+            <a:pPr lvl="1"/>
+            <a:r>
+              <a:rPr lang="ru-RU" sz="3000" dirty="0" smtClean="0"/>
+              <a:t>Автоматическое</a:t>
+            </a:r>
+            <a:endParaRPr lang="en-US" sz="3000" dirty="0" smtClean="0"/>
+          </a:p>
+          <a:p>
+            <a:pPr lvl="2"/>
+            <a:r>
+              <a:rPr lang="en-US" sz="2600" dirty="0" smtClean="0"/>
+              <a:t>High Availability (Load balancing)</a:t>
+            </a:r>
+          </a:p>
+          <a:p>
+            <a:pPr lvl="2"/>
+            <a:r>
+              <a:rPr lang="ru-RU" sz="2600" dirty="0" smtClean="0"/>
+              <a:t>Автоматическая повторная попытка (</a:t>
+            </a:r>
+            <a:r>
+              <a:rPr lang="en-US" sz="2600" dirty="0" smtClean="0"/>
+              <a:t>Redelivery)</a:t>
+            </a:r>
+            <a:endParaRPr lang="en-US" sz="2600" dirty="0" smtClean="0"/>
+          </a:p>
+          <a:p>
+            <a:endParaRPr lang="ru-RU" sz="3400" u="sng" dirty="0"/>
           </a:p>
         </p:txBody>
       </p:sp>
     </p:spTree>
     <p:extLst>
       <p:ext uri="{BB962C8B-B14F-4D97-AF65-F5344CB8AC3E}">
-        <p14:creationId xmlns:p14="http://schemas.microsoft.com/office/powerpoint/2010/main" val="1995439128"/>
+        <p14:creationId xmlns:p14="http://schemas.microsoft.com/office/powerpoint/2010/main" val="555567851"/>
       </p:ext>
     </p:extLst>
   </p:cSld>
   <p:clrMapOvr>
     <a:masterClrMapping/>
   </p:clrMapOvr>
+  <p:timing>
+    <p:tnLst>
+      <p:par>
+        <p:cTn id="1" dur="indefinite" restart="never" nodeType="tmRoot"/>
+      </p:par>
+    </p:tnLst>
+  </p:timing>
 </p:sld>
 </file>
 
@@ -3907,7 +4530,7 @@
           <a:p>
             <a:r>
               <a:rPr lang="en-US" dirty="0" smtClean="0"/>
-              <a:t>Performance</a:t>
+              <a:t>Design: Performance</a:t>
             </a:r>
             <a:endParaRPr lang="ru-RU" dirty="0"/>
           </a:p>
@@ -3928,30 +4551,90 @@
           <a:bodyPr/>
           <a:lstStyle/>
           <a:p>
+            <a:pPr marL="0" indent="0">
+              <a:buNone/>
+            </a:pPr>
             <a:r>
               <a:rPr lang="en-US" dirty="0" smtClean="0"/>
-              <a:t>2 kind of services</a:t>
-            </a:r>
+              <a:t>2 </a:t>
+            </a:r>
+            <a:r>
+              <a:rPr lang="ru-RU" dirty="0" smtClean="0"/>
+              <a:t>Типа взаимодействия</a:t>
+            </a:r>
+            <a:endParaRPr lang="en-US" dirty="0" smtClean="0"/>
           </a:p>
           <a:p>
             <a:pPr lvl="1"/>
             <a:r>
-              <a:rPr lang="en-US" dirty="0" err="1" smtClean="0"/>
-              <a:t>Async</a:t>
-            </a:r>
-            <a:r>
-              <a:rPr lang="en-US" dirty="0" smtClean="0"/>
-              <a:t> (usually CUD in CRUD)</a:t>
-            </a:r>
-            <a:endParaRPr lang="en-US" dirty="0" smtClean="0"/>
+              <a:rPr lang="ru-RU" sz="4000" dirty="0" smtClean="0"/>
+              <a:t>Асинхронное</a:t>
+            </a:r>
+            <a:r>
+              <a:rPr lang="en-US" sz="4000" dirty="0" smtClean="0"/>
+              <a:t> </a:t>
+            </a:r>
+            <a:endParaRPr lang="ru-RU" sz="4000" dirty="0" smtClean="0"/>
+          </a:p>
+          <a:p>
+            <a:pPr lvl="2"/>
+            <a:r>
+              <a:rPr lang="ru-RU" sz="3600" dirty="0" smtClean="0"/>
+              <a:t>обычно</a:t>
+            </a:r>
+            <a:r>
+              <a:rPr lang="en-US" sz="3600" dirty="0" smtClean="0"/>
+              <a:t> </a:t>
+            </a:r>
+            <a:r>
+              <a:rPr lang="en-US" sz="3600" dirty="0" smtClean="0"/>
+              <a:t>CUD </a:t>
+            </a:r>
+            <a:r>
+              <a:rPr lang="ru-RU" sz="3600" dirty="0" smtClean="0"/>
+              <a:t>в</a:t>
+            </a:r>
+            <a:r>
+              <a:rPr lang="en-US" sz="3600" dirty="0" smtClean="0"/>
+              <a:t> CRUD</a:t>
+            </a:r>
+            <a:endParaRPr lang="en-US" sz="3600" dirty="0" smtClean="0"/>
           </a:p>
           <a:p>
             <a:pPr lvl="1"/>
             <a:r>
-              <a:rPr lang="en-US" dirty="0" smtClean="0"/>
-              <a:t>Sync (usually R in CRUD)</a:t>
-            </a:r>
-            <a:endParaRPr lang="en-US" dirty="0" smtClean="0"/>
+              <a:rPr lang="ru-RU" sz="4000" dirty="0" smtClean="0"/>
+              <a:t>Синхронное</a:t>
+            </a:r>
+            <a:r>
+              <a:rPr lang="en-US" sz="4000" dirty="0" smtClean="0"/>
+              <a:t> </a:t>
+            </a:r>
+            <a:endParaRPr lang="ru-RU" sz="4000" dirty="0" smtClean="0"/>
+          </a:p>
+          <a:p>
+            <a:pPr lvl="2"/>
+            <a:r>
+              <a:rPr lang="ru-RU" sz="3600" dirty="0" smtClean="0"/>
+              <a:t>обычно</a:t>
+            </a:r>
+            <a:r>
+              <a:rPr lang="en-US" sz="3600" dirty="0" smtClean="0"/>
+              <a:t> </a:t>
+            </a:r>
+            <a:r>
+              <a:rPr lang="en-US" sz="3600" dirty="0" smtClean="0"/>
+              <a:t>R </a:t>
+            </a:r>
+            <a:r>
+              <a:rPr lang="ru-RU" sz="3600" dirty="0" smtClean="0"/>
+              <a:t>в</a:t>
+            </a:r>
+            <a:r>
+              <a:rPr lang="en-US" sz="3600" dirty="0" smtClean="0"/>
+              <a:t> CRUD</a:t>
+            </a:r>
+            <a:endParaRPr lang="en-US" sz="3600" dirty="0" smtClean="0"/>
           </a:p>
           <a:p>
             <a:endParaRPr lang="ru-RU" dirty="0"/>
@@ -3968,6 +4651,13 @@
   <p:clrMapOvr>
     <a:masterClrMapping/>
   </p:clrMapOvr>
+  <p:timing>
+    <p:tnLst>
+      <p:par>
+        <p:cTn id="1" dur="indefinite" restart="never" nodeType="tmRoot"/>
+      </p:par>
+    </p:tnLst>
+  </p:timing>
 </p:sld>
 </file>
 
@@ -4004,8 +4694,8 @@
           <a:lstStyle/>
           <a:p>
             <a:r>
-              <a:rPr lang="en-US" dirty="0" smtClean="0"/>
-              <a:t>Sync</a:t>
+              <a:rPr lang="ru-RU" dirty="0" smtClean="0"/>
+              <a:t>Синхронное</a:t>
             </a:r>
             <a:endParaRPr lang="ru-RU" dirty="0"/>
           </a:p>
@@ -4023,27 +4713,29 @@
         </p:nvSpPr>
         <p:spPr/>
         <p:txBody>
-          <a:bodyPr/>
-          <a:lstStyle/>
-          <a:p>
-            <a:r>
-              <a:rPr lang="en-US" dirty="0" smtClean="0"/>
-              <a:t>As fast as </a:t>
-            </a:r>
-            <a:r>
-              <a:rPr lang="en-US" dirty="0" smtClean="0"/>
-              <a:t>possible</a:t>
-            </a:r>
+          <a:bodyPr>
+            <a:normAutofit lnSpcReduction="10000"/>
+          </a:bodyPr>
+          <a:lstStyle/>
+          <a:p>
+            <a:r>
+              <a:rPr lang="ru-RU" dirty="0" smtClean="0"/>
+              <a:t>Максимально быстро</a:t>
+            </a:r>
+            <a:endParaRPr lang="en-US" dirty="0" smtClean="0"/>
           </a:p>
           <a:p>
             <a:pPr lvl="1"/>
             <a:r>
-              <a:rPr lang="en-US" dirty="0" smtClean="0"/>
-              <a:t>Everything that do not require user attention/participation, made </a:t>
-            </a:r>
-            <a:r>
-              <a:rPr lang="en-US" dirty="0" err="1" smtClean="0"/>
-              <a:t>async</a:t>
+              <a:rPr lang="ru-RU" dirty="0" smtClean="0"/>
+              <a:t>Все что требует внимания пользователя</a:t>
+            </a:r>
+          </a:p>
+          <a:p>
+            <a:pPr lvl="2"/>
+            <a:r>
+              <a:rPr lang="ru-RU" dirty="0" smtClean="0"/>
+              <a:t>Иначе асинхронное</a:t>
             </a:r>
             <a:endParaRPr lang="en-US" dirty="0" smtClean="0"/>
           </a:p>
@@ -4052,29 +4744,132 @@
               <a:buNone/>
             </a:pPr>
             <a:r>
+              <a:rPr lang="ru-RU" sz="2400" i="1" dirty="0" smtClean="0"/>
+              <a:t>Сохранение заказа </a:t>
+            </a:r>
+            <a:r>
               <a:rPr lang="en-US" sz="2400" i="1" dirty="0" smtClean="0"/>
-              <a:t>Store order(s) -&gt; Charge Money (s) -&gt; Create License (a)</a:t>
+              <a:t>(</a:t>
+            </a:r>
+            <a:r>
+              <a:rPr lang="ru-RU" sz="2400" i="1" dirty="0" err="1" smtClean="0"/>
+              <a:t>синх</a:t>
+            </a:r>
+            <a:r>
+              <a:rPr lang="en-US" sz="2400" i="1" dirty="0" smtClean="0"/>
+              <a:t>) </a:t>
+            </a:r>
+            <a:endParaRPr lang="ru-RU" sz="2400" i="1" dirty="0" smtClean="0"/>
+          </a:p>
+          <a:p>
+            <a:pPr marL="457200" lvl="1" indent="0">
+              <a:buNone/>
+            </a:pPr>
+            <a:r>
+              <a:rPr lang="ru-RU" sz="2400" i="1" dirty="0"/>
+              <a:t>	</a:t>
+            </a:r>
+            <a:r>
+              <a:rPr lang="en-US" sz="2400" i="1" dirty="0" smtClean="0"/>
+              <a:t>-&gt; </a:t>
+            </a:r>
+            <a:r>
+              <a:rPr lang="ru-RU" sz="2400" i="1" dirty="0" smtClean="0"/>
+              <a:t>Снятие денег</a:t>
+            </a:r>
+            <a:r>
+              <a:rPr lang="en-US" sz="2400" i="1" dirty="0" smtClean="0"/>
+              <a:t> (</a:t>
+            </a:r>
+            <a:r>
+              <a:rPr lang="ru-RU" sz="2400" i="1" dirty="0" err="1" smtClean="0"/>
+              <a:t>синх</a:t>
+            </a:r>
+            <a:r>
+              <a:rPr lang="en-US" sz="2400" i="1" dirty="0" smtClean="0"/>
+              <a:t>) </a:t>
+            </a:r>
+            <a:endParaRPr lang="ru-RU" sz="2400" i="1" dirty="0" smtClean="0"/>
+          </a:p>
+          <a:p>
+            <a:pPr marL="457200" lvl="1" indent="0">
+              <a:buNone/>
+            </a:pPr>
+            <a:r>
+              <a:rPr lang="ru-RU" sz="2400" i="1" dirty="0"/>
+              <a:t>	</a:t>
+            </a:r>
+            <a:r>
+              <a:rPr lang="ru-RU" sz="2400" i="1" dirty="0" smtClean="0"/>
+              <a:t>	</a:t>
+            </a:r>
+            <a:r>
+              <a:rPr lang="en-US" sz="2400" i="1" dirty="0" smtClean="0"/>
+              <a:t>-&gt; </a:t>
+            </a:r>
+            <a:r>
+              <a:rPr lang="ru-RU" sz="2400" i="1" dirty="0" smtClean="0"/>
+              <a:t>Создание лицензии во </a:t>
+            </a:r>
+          </a:p>
+          <a:p>
+            <a:pPr marL="457200" lvl="1" indent="0">
+              <a:buNone/>
+            </a:pPr>
+            <a:r>
+              <a:rPr lang="ru-RU" sz="2400" i="1" dirty="0"/>
+              <a:t>	</a:t>
+            </a:r>
+            <a:r>
+              <a:rPr lang="ru-RU" sz="2400" i="1" dirty="0" smtClean="0"/>
+              <a:t>			</a:t>
+            </a:r>
+            <a:r>
+              <a:rPr lang="ru-RU" sz="2400" i="1" dirty="0" smtClean="0"/>
+              <a:t>внешнем приложении</a:t>
+            </a:r>
+            <a:r>
+              <a:rPr lang="en-US" sz="2400" i="1" dirty="0" smtClean="0"/>
+              <a:t> (</a:t>
+            </a:r>
+            <a:r>
+              <a:rPr lang="ru-RU" sz="2400" i="1" dirty="0" err="1" smtClean="0"/>
+              <a:t>асинх</a:t>
+            </a:r>
+            <a:r>
+              <a:rPr lang="en-US" sz="2400" i="1" dirty="0" smtClean="0"/>
+              <a:t>)</a:t>
             </a:r>
             <a:endParaRPr lang="en-US" sz="2400" i="1" dirty="0" smtClean="0"/>
           </a:p>
           <a:p>
             <a:r>
+              <a:rPr lang="ru-RU" dirty="0" smtClean="0"/>
+              <a:t>Использовать кэш</a:t>
+            </a:r>
+            <a:endParaRPr lang="en-US" dirty="0" smtClean="0"/>
+          </a:p>
+          <a:p>
+            <a:pPr lvl="1"/>
+            <a:r>
+              <a:rPr lang="ru-RU" dirty="0" err="1" smtClean="0"/>
+              <a:t>Внутрипроцессный</a:t>
+            </a:r>
+            <a:r>
+              <a:rPr lang="ru-RU" dirty="0" smtClean="0"/>
+              <a:t> кэш </a:t>
+            </a:r>
+            <a:r>
               <a:rPr lang="en-US" dirty="0" smtClean="0"/>
-              <a:t>Cache retrieval</a:t>
-            </a:r>
-          </a:p>
-          <a:p>
-            <a:pPr lvl="1"/>
-            <a:r>
-              <a:rPr lang="en-US" dirty="0" smtClean="0"/>
-              <a:t>Guava for small caches</a:t>
-            </a:r>
+              <a:t>Guava</a:t>
+            </a:r>
+            <a:endParaRPr lang="en-US" dirty="0" smtClean="0"/>
           </a:p>
           <a:p>
             <a:pPr lvl="2"/>
             <a:r>
-              <a:rPr lang="en-US" dirty="0"/>
-              <a:t>Eliminate process interaction</a:t>
+              <a:rPr lang="ru-RU" dirty="0" smtClean="0"/>
+              <a:t>Для небольших данных</a:t>
             </a:r>
             <a:endParaRPr lang="ru-RU" dirty="0"/>
           </a:p>
@@ -4094,6 +4889,13 @@
   <p:clrMapOvr>
     <a:masterClrMapping/>
   </p:clrMapOvr>
+  <p:timing>
+    <p:tnLst>
+      <p:par>
+        <p:cTn id="1" dur="indefinite" restart="never" nodeType="tmRoot"/>
+      </p:par>
+    </p:tnLst>
+  </p:timing>
 </p:sld>
 </file>
 
@@ -4130,8 +4932,8 @@
           <a:lstStyle/>
           <a:p>
             <a:r>
-              <a:rPr lang="en-US" dirty="0" err="1" smtClean="0"/>
-              <a:t>Async</a:t>
+              <a:rPr lang="ru-RU" dirty="0" smtClean="0"/>
+              <a:t>Асинхронное</a:t>
             </a:r>
             <a:endParaRPr lang="ru-RU" dirty="0"/>
           </a:p>
@@ -4155,48 +4957,61 @@
           <a:lstStyle/>
           <a:p>
             <a:r>
+              <a:rPr lang="ru-RU" dirty="0" smtClean="0"/>
+              <a:t>Отложенная обработка</a:t>
+            </a:r>
+            <a:endParaRPr lang="en-US" dirty="0" smtClean="0"/>
+          </a:p>
+          <a:p>
+            <a:pPr lvl="1"/>
+            <a:r>
+              <a:rPr lang="ru-RU" dirty="0" smtClean="0"/>
+              <a:t>Возвращаем </a:t>
+            </a:r>
+            <a:r>
               <a:rPr lang="en-US" dirty="0" smtClean="0"/>
-              <a:t>Deferred Processing</a:t>
-            </a:r>
+              <a:t>ID, </a:t>
+            </a:r>
+            <a:r>
+              <a:rPr lang="ru-RU" dirty="0" smtClean="0"/>
+              <a:t>работа в фоне</a:t>
+            </a:r>
+            <a:endParaRPr lang="en-US" dirty="0" smtClean="0"/>
+          </a:p>
+          <a:p>
+            <a:pPr lvl="2"/>
+            <a:r>
+              <a:rPr lang="ru-RU" dirty="0" smtClean="0"/>
+              <a:t>Нужно хранилище</a:t>
+            </a:r>
+            <a:endParaRPr lang="en-US" dirty="0" smtClean="0"/>
+          </a:p>
+          <a:p>
+            <a:pPr lvl="2"/>
+            <a:r>
+              <a:rPr lang="ru-RU" dirty="0" smtClean="0"/>
+              <a:t>Хранение входных и выходных данных</a:t>
+            </a:r>
+          </a:p>
+          <a:p>
+            <a:pPr lvl="3"/>
+            <a:r>
+              <a:rPr lang="ru-RU" dirty="0" err="1" smtClean="0"/>
+              <a:t>Дупликаты</a:t>
+            </a:r>
+            <a:r>
+              <a:rPr lang="ru-RU" dirty="0" smtClean="0"/>
+              <a:t>, но необходимы для диагностики</a:t>
+            </a:r>
+            <a:endParaRPr lang="en-US" dirty="0" smtClean="0"/>
           </a:p>
           <a:p>
             <a:pPr lvl="1"/>
             <a:r>
-              <a:rPr lang="en-US" dirty="0" smtClean="0"/>
-              <a:t>Approach </a:t>
-            </a:r>
-            <a:r>
-              <a:rPr lang="en-US" dirty="0" smtClean="0"/>
-              <a:t>with storing id, making work in background</a:t>
-            </a:r>
-          </a:p>
-          <a:p>
-            <a:pPr lvl="2"/>
-            <a:r>
-              <a:rPr lang="en-US" dirty="0" smtClean="0"/>
-              <a:t>Need a storage</a:t>
-            </a:r>
-          </a:p>
-          <a:p>
-            <a:pPr lvl="2"/>
-            <a:r>
-              <a:rPr lang="en-US" dirty="0" smtClean="0"/>
-              <a:t>Store data in, data out</a:t>
-            </a:r>
-          </a:p>
-          <a:p>
-            <a:pPr lvl="3"/>
-            <a:r>
-              <a:rPr lang="en-US" dirty="0" smtClean="0"/>
-              <a:t>Duplicates, but need for recovery</a:t>
-            </a:r>
-          </a:p>
-          <a:p>
-            <a:pPr lvl="1"/>
-            <a:r>
-              <a:rPr lang="en-US" dirty="0" smtClean="0"/>
-              <a:t>Provide a way to get a state</a:t>
-            </a:r>
+              <a:rPr lang="ru-RU" dirty="0" smtClean="0"/>
+              <a:t>Получение статуса</a:t>
+            </a:r>
+            <a:endParaRPr lang="en-US" dirty="0" smtClean="0"/>
           </a:p>
           <a:p>
             <a:pPr lvl="2"/>
@@ -4208,13 +5023,10 @@
           <a:p>
             <a:pPr lvl="2"/>
             <a:r>
-              <a:rPr lang="en-US" dirty="0" err="1" smtClean="0"/>
-              <a:t>Async</a:t>
-            </a:r>
-            <a:r>
-              <a:rPr lang="en-US" dirty="0" smtClean="0"/>
-              <a:t> Result message</a:t>
-            </a:r>
+              <a:rPr lang="ru-RU" dirty="0" smtClean="0"/>
+              <a:t>Асинхронное извещение по завершению обработки</a:t>
+            </a:r>
+            <a:endParaRPr lang="en-US" dirty="0" smtClean="0"/>
           </a:p>
           <a:p>
             <a:pPr lvl="1"/>
@@ -4232,6 +5044,13 @@
   <p:clrMapOvr>
     <a:masterClrMapping/>
   </p:clrMapOvr>
+  <p:timing>
+    <p:tnLst>
+      <p:par>
+        <p:cTn id="1" dur="indefinite" restart="never" nodeType="tmRoot"/>
+      </p:par>
+    </p:tnLst>
+  </p:timing>
 </p:sld>
 </file>
 
@@ -4268,8 +5087,12 @@
           <a:lstStyle/>
           <a:p>
             <a:r>
+              <a:rPr lang="ru-RU" dirty="0" smtClean="0"/>
+              <a:t>Отказы (</a:t>
+            </a:r>
+            <a:r>
               <a:rPr lang="en-US" dirty="0" smtClean="0"/>
-              <a:t>Failures</a:t>
+              <a:t>Failures)</a:t>
             </a:r>
             <a:endParaRPr lang="ru-RU" dirty="0"/>
           </a:p>
@@ -4293,66 +5116,102 @@
           <a:lstStyle/>
           <a:p>
             <a:r>
+              <a:rPr lang="ru-RU" dirty="0" smtClean="0"/>
+              <a:t>Быть готовым к отказу</a:t>
+            </a:r>
+            <a:endParaRPr lang="en-US" dirty="0" smtClean="0"/>
+          </a:p>
+          <a:p>
+            <a:r>
+              <a:rPr lang="ru-RU" dirty="0" smtClean="0"/>
+              <a:t>Быть готовым к восстановлению данных</a:t>
+            </a:r>
+            <a:endParaRPr lang="en-US" dirty="0" smtClean="0"/>
+          </a:p>
+          <a:p>
+            <a:r>
+              <a:rPr lang="ru-RU" dirty="0" smtClean="0"/>
+              <a:t>Найти точки отказа</a:t>
+            </a:r>
+            <a:endParaRPr lang="en-US" dirty="0" smtClean="0"/>
+          </a:p>
+          <a:p>
+            <a:pPr lvl="1"/>
+            <a:r>
+              <a:rPr lang="en-US" u="sng" dirty="0" smtClean="0"/>
+              <a:t>Show on our application</a:t>
+            </a:r>
+          </a:p>
+          <a:p>
+            <a:r>
+              <a:rPr lang="ru-RU" dirty="0" smtClean="0"/>
+              <a:t>Определить как восстанавливать данные</a:t>
+            </a:r>
+            <a:endParaRPr lang="en-US" dirty="0" smtClean="0"/>
+          </a:p>
+          <a:p>
+            <a:pPr lvl="1"/>
+            <a:r>
+              <a:rPr lang="ru-RU" dirty="0" smtClean="0"/>
+              <a:t>Синхронное</a:t>
+            </a:r>
+            <a:r>
               <a:rPr lang="en-US" dirty="0" smtClean="0"/>
-              <a:t>Be ready for failures</a:t>
-            </a:r>
-          </a:p>
-          <a:p>
+              <a:t>- </a:t>
+            </a:r>
+            <a:r>
+              <a:rPr lang="ru-RU" dirty="0" smtClean="0"/>
+              <a:t>на стороне клиента</a:t>
+            </a:r>
+            <a:endParaRPr lang="en-US" dirty="0" smtClean="0"/>
+          </a:p>
+          <a:p>
+            <a:pPr lvl="2"/>
+            <a:r>
+              <a:rPr lang="ru-RU" dirty="0" smtClean="0"/>
+              <a:t>ответственный</a:t>
+            </a:r>
             <a:r>
               <a:rPr lang="en-US" dirty="0" smtClean="0"/>
-              <a:t>Be ready to recover</a:t>
-            </a:r>
-          </a:p>
-          <a:p>
+              <a:t>: </a:t>
+            </a:r>
+            <a:r>
+              <a:rPr lang="ru-RU" dirty="0" smtClean="0"/>
+              <a:t>пользователь</a:t>
+            </a:r>
+            <a:endParaRPr lang="en-US" dirty="0" smtClean="0"/>
+          </a:p>
+          <a:p>
+            <a:pPr lvl="1"/>
+            <a:r>
+              <a:rPr lang="ru-RU" dirty="0" smtClean="0"/>
+              <a:t>Асинхронное</a:t>
+            </a:r>
             <a:r>
               <a:rPr lang="en-US" dirty="0" smtClean="0"/>
-              <a:t>Identify failure points</a:t>
-            </a:r>
-          </a:p>
-          <a:p>
-            <a:pPr lvl="1"/>
+              <a:t>- </a:t>
+            </a:r>
+            <a:r>
+              <a:rPr lang="ru-RU" dirty="0" smtClean="0"/>
+              <a:t>на стороне сервера</a:t>
+            </a:r>
+            <a:endParaRPr lang="en-US" dirty="0" smtClean="0"/>
+          </a:p>
+          <a:p>
+            <a:pPr lvl="2"/>
+            <a:r>
+              <a:rPr lang="ru-RU" dirty="0" smtClean="0"/>
+              <a:t>ответственный</a:t>
+            </a:r>
             <a:r>
               <a:rPr lang="en-US" dirty="0" smtClean="0"/>
-              <a:t>Show on our application</a:t>
-            </a:r>
-          </a:p>
-          <a:p>
-            <a:r>
-              <a:rPr lang="en-US" dirty="0" smtClean="0"/>
-              <a:t>Identify how to recover</a:t>
-            </a:r>
-          </a:p>
-          <a:p>
-            <a:pPr lvl="1"/>
-            <a:r>
-              <a:rPr lang="en-US" dirty="0" smtClean="0"/>
-              <a:t>Sync- client side recovery</a:t>
-            </a:r>
-          </a:p>
-          <a:p>
-            <a:pPr lvl="2"/>
-            <a:r>
-              <a:rPr lang="en-US" dirty="0" smtClean="0"/>
-              <a:t>Responsible: client</a:t>
-            </a:r>
-          </a:p>
-          <a:p>
-            <a:pPr lvl="1"/>
-            <a:r>
-              <a:rPr lang="en-US" dirty="0" err="1" smtClean="0"/>
-              <a:t>Async</a:t>
-            </a:r>
-            <a:r>
-              <a:rPr lang="en-US" dirty="0" smtClean="0"/>
-              <a:t>- server side recovery</a:t>
-            </a:r>
-          </a:p>
-          <a:p>
-            <a:pPr lvl="2"/>
-            <a:r>
-              <a:rPr lang="en-US" dirty="0" smtClean="0"/>
-              <a:t>Responsible: you</a:t>
-            </a:r>
+              <a:t>: </a:t>
+            </a:r>
+            <a:r>
+              <a:rPr lang="ru-RU" dirty="0" smtClean="0"/>
+              <a:t>разработчик</a:t>
+            </a:r>
+            <a:endParaRPr lang="en-US" dirty="0" smtClean="0"/>
           </a:p>
           <a:p>
             <a:pPr lvl="2"/>
@@ -4370,6 +5229,13 @@
   <p:clrMapOvr>
     <a:masterClrMapping/>
   </p:clrMapOvr>
+  <p:timing>
+    <p:tnLst>
+      <p:par>
+        <p:cTn id="1" dur="indefinite" restart="never" nodeType="tmRoot"/>
+      </p:par>
+    </p:tnLst>
+  </p:timing>
 </p:sld>
 </file>
 
@@ -4407,11 +5273,7 @@
           <a:p>
             <a:r>
               <a:rPr lang="en-US" dirty="0" smtClean="0"/>
-              <a:t>Failures: </a:t>
-            </a:r>
-            <a:r>
-              <a:rPr lang="en-US" dirty="0" err="1" smtClean="0"/>
-              <a:t>Async</a:t>
+              <a:t>Design: Client-oriented</a:t>
             </a:r>
             <a:endParaRPr lang="ru-RU" dirty="0"/>
           </a:p>
@@ -4434,13 +5296,20 @@
           <a:p>
             <a:r>
               <a:rPr lang="en-US" dirty="0" smtClean="0"/>
-              <a:t>Redelivery</a:t>
-            </a:r>
-          </a:p>
-          <a:p>
+              <a:t>Helper client libs</a:t>
+            </a:r>
+          </a:p>
+          <a:p>
+            <a:pPr lvl="1"/>
             <a:r>
               <a:rPr lang="en-US" dirty="0" smtClean="0"/>
-              <a:t>DLQ</a:t>
+              <a:t>Rup-rest example</a:t>
+            </a:r>
+          </a:p>
+          <a:p>
+            <a:r>
+              <a:rPr lang="en-US" dirty="0" smtClean="0"/>
+              <a:t>Steward API</a:t>
             </a:r>
             <a:endParaRPr lang="ru-RU" dirty="0"/>
           </a:p>
@@ -4449,13 +5318,20 @@
     </p:spTree>
     <p:extLst>
       <p:ext uri="{BB962C8B-B14F-4D97-AF65-F5344CB8AC3E}">
-        <p14:creationId xmlns:p14="http://schemas.microsoft.com/office/powerpoint/2010/main" val="3290812372"/>
+        <p14:creationId xmlns:p14="http://schemas.microsoft.com/office/powerpoint/2010/main" val="1995439128"/>
       </p:ext>
     </p:extLst>
   </p:cSld>
   <p:clrMapOvr>
     <a:masterClrMapping/>
   </p:clrMapOvr>
+  <p:timing>
+    <p:tnLst>
+      <p:par>
+        <p:cTn id="1" dur="indefinite" restart="never" nodeType="tmRoot"/>
+      </p:par>
+    </p:tnLst>
+  </p:timing>
 </p:sld>
 </file>
 
@@ -4838,6 +5714,13 @@
   <p:clrMapOvr>
     <a:masterClrMapping/>
   </p:clrMapOvr>
+  <p:timing>
+    <p:tnLst>
+      <p:par>
+        <p:cTn id="1" dur="indefinite" restart="never" nodeType="tmRoot"/>
+      </p:par>
+    </p:tnLst>
+  </p:timing>
 </p:sld>
 </file>
 
@@ -4860,7 +5743,7 @@
       </p:grpSpPr>
       <p:sp>
         <p:nvSpPr>
-          <p:cNvPr id="2" name="Title 1"/>
+          <p:cNvPr id="2" name="Заголовок 1"/>
           <p:cNvSpPr>
             <a:spLocks noGrp="1"/>
           </p:cNvSpPr>
@@ -4873,13 +5756,25 @@
           <a:bodyPr/>
           <a:lstStyle/>
           <a:p>
-            <a:endParaRPr lang="en-US" dirty="0"/>
-          </a:p>
-        </p:txBody>
-      </p:sp>
-      <p:sp>
-        <p:nvSpPr>
-          <p:cNvPr id="3" name="Content Placeholder 2"/>
+            <a:r>
+              <a:rPr lang="ru-RU" dirty="0" smtClean="0"/>
+              <a:t>Отказы</a:t>
+            </a:r>
+            <a:r>
+              <a:rPr lang="en-US" dirty="0" smtClean="0"/>
+              <a:t>: </a:t>
+            </a:r>
+            <a:r>
+              <a:rPr lang="ru-RU" dirty="0" smtClean="0"/>
+              <a:t>Асинхронное</a:t>
+            </a:r>
+            <a:endParaRPr lang="ru-RU" dirty="0"/>
+          </a:p>
+        </p:txBody>
+      </p:sp>
+      <p:sp>
+        <p:nvSpPr>
+          <p:cNvPr id="3" name="Объект 2"/>
           <p:cNvSpPr>
             <a:spLocks noGrp="1"/>
           </p:cNvSpPr>
@@ -4893,38 +5788,59 @@
           <a:lstStyle/>
           <a:p>
             <a:r>
+              <a:rPr lang="ru-RU" dirty="0" smtClean="0"/>
+              <a:t>Повторная доставка </a:t>
+            </a:r>
+            <a:r>
               <a:rPr lang="en-US" dirty="0" smtClean="0"/>
-              <a:t>Developers perform </a:t>
-            </a:r>
+              <a:t>(redelivery)</a:t>
+            </a:r>
+          </a:p>
+          <a:p>
+            <a:pPr lvl="1"/>
+            <a:r>
+              <a:rPr lang="ru-RU" dirty="0" smtClean="0"/>
+              <a:t>Автоматическая</a:t>
+            </a:r>
+          </a:p>
+          <a:p>
+            <a:pPr lvl="1"/>
+            <a:endParaRPr lang="en-US" dirty="0" smtClean="0"/>
+          </a:p>
+          <a:p>
             <a:r>
               <a:rPr lang="en-US" dirty="0" smtClean="0"/>
-              <a:t>Support</a:t>
-            </a:r>
-          </a:p>
-          <a:p>
-            <a:pPr lvl="1"/>
+              <a:t>DLQ</a:t>
+            </a:r>
+            <a:r>
+              <a:rPr lang="ru-RU" dirty="0" smtClean="0"/>
+              <a:t> (</a:t>
+            </a:r>
             <a:r>
               <a:rPr lang="en-US" dirty="0" smtClean="0"/>
-              <a:t>Helps to build tools to simplify support</a:t>
-            </a:r>
-            <a:r>
-              <a:rPr lang="en-US" dirty="0" smtClean="0"/>
-              <a:t> </a:t>
-            </a:r>
-            <a:endParaRPr lang="en-US" dirty="0"/>
+              <a:t>Dead Letter Queue)</a:t>
+            </a:r>
+            <a:endParaRPr lang="ru-RU" dirty="0"/>
           </a:p>
         </p:txBody>
       </p:sp>
     </p:spTree>
     <p:extLst>
       <p:ext uri="{BB962C8B-B14F-4D97-AF65-F5344CB8AC3E}">
-        <p14:creationId xmlns:p14="http://schemas.microsoft.com/office/powerpoint/2010/main" val="3122075378"/>
+        <p14:creationId xmlns:p14="http://schemas.microsoft.com/office/powerpoint/2010/main" val="3290812372"/>
       </p:ext>
     </p:extLst>
   </p:cSld>
   <p:clrMapOvr>
     <a:masterClrMapping/>
   </p:clrMapOvr>
+  <p:timing>
+    <p:tnLst>
+      <p:par>
+        <p:cTn id="1" dur="indefinite" restart="never" nodeType="tmRoot"/>
+      </p:par>
+    </p:tnLst>
+  </p:timing>
 </p:sld>
 </file>
 
@@ -4947,7 +5863,7 @@
       </p:grpSpPr>
       <p:sp>
         <p:nvSpPr>
-          <p:cNvPr id="2" name="Заголовок 1"/>
+          <p:cNvPr id="2" name="Title 1"/>
           <p:cNvSpPr>
             <a:spLocks noGrp="1"/>
           </p:cNvSpPr>
@@ -4960,13 +5876,13 @@
           <a:bodyPr/>
           <a:lstStyle/>
           <a:p>
-            <a:endParaRPr lang="ru-RU"/>
-          </a:p>
-        </p:txBody>
-      </p:sp>
-      <p:sp>
-        <p:nvSpPr>
-          <p:cNvPr id="3" name="Объект 2"/>
+            <a:endParaRPr lang="en-US" dirty="0"/>
+          </a:p>
+        </p:txBody>
+      </p:sp>
+      <p:sp>
+        <p:nvSpPr>
+          <p:cNvPr id="3" name="Content Placeholder 2"/>
           <p:cNvSpPr>
             <a:spLocks noGrp="1"/>
           </p:cNvSpPr>
@@ -4979,20 +5895,38 @@
           <a:bodyPr/>
           <a:lstStyle/>
           <a:p>
-            <a:endParaRPr lang="ru-RU"/>
+            <a:r>
+              <a:rPr lang="en-US" dirty="0" smtClean="0"/>
+              <a:t>Developers perform Support</a:t>
+            </a:r>
+          </a:p>
+          <a:p>
+            <a:pPr lvl="1"/>
+            <a:r>
+              <a:rPr lang="en-US" dirty="0" smtClean="0"/>
+              <a:t>Helps to build tools to simplify support </a:t>
+            </a:r>
+            <a:endParaRPr lang="en-US" dirty="0"/>
           </a:p>
         </p:txBody>
       </p:sp>
     </p:spTree>
     <p:extLst>
       <p:ext uri="{BB962C8B-B14F-4D97-AF65-F5344CB8AC3E}">
-        <p14:creationId xmlns:p14="http://schemas.microsoft.com/office/powerpoint/2010/main" val="1486434484"/>
+        <p14:creationId xmlns:p14="http://schemas.microsoft.com/office/powerpoint/2010/main" val="3122075378"/>
       </p:ext>
     </p:extLst>
   </p:cSld>
   <p:clrMapOvr>
     <a:masterClrMapping/>
   </p:clrMapOvr>
+  <p:timing>
+    <p:tnLst>
+      <p:par>
+        <p:cTn id="1" dur="indefinite" restart="never" nodeType="tmRoot"/>
+      </p:par>
+    </p:tnLst>
+  </p:timing>
 </p:sld>
 </file>
 
@@ -5029,279 +5963,31 @@
           <a:lstStyle/>
           <a:p>
             <a:r>
+              <a:rPr lang="en-US" dirty="0" err="1" smtClean="0"/>
+              <a:t>Microservices</a:t>
+            </a:r>
+            <a:r>
+              <a:rPr lang="en-US" dirty="0" smtClean="0"/>
+              <a:t> </a:t>
+            </a:r>
+            <a:r>
               <a:rPr lang="ru-RU" dirty="0" smtClean="0"/>
-              <a:t>Тип Архитектуры</a:t>
+              <a:t>За и Против</a:t>
             </a:r>
             <a:endParaRPr lang="ru-RU" dirty="0"/>
           </a:p>
         </p:txBody>
       </p:sp>
-      <p:pic>
-        <p:nvPicPr>
-          <p:cNvPr id="1027" name="Picture 3"/>
-          <p:cNvPicPr>
-            <a:picLocks noChangeAspect="1" noChangeArrowheads="1"/>
-          </p:cNvPicPr>
-          <p:nvPr/>
-        </p:nvPicPr>
-        <p:blipFill>
-          <a:blip r:embed="rId2">
-            <a:extLst>
-              <a:ext uri="{28A0092B-C50C-407E-A947-70E740481C1C}">
-                <a14:useLocalDpi xmlns:a14="http://schemas.microsoft.com/office/drawing/2010/main" val="0"/>
-              </a:ext>
-            </a:extLst>
-          </a:blip>
-          <a:srcRect/>
-          <a:stretch>
-            <a:fillRect/>
-          </a:stretch>
-        </p:blipFill>
-        <p:spPr bwMode="auto">
-          <a:xfrm>
-            <a:off x="1889696" y="2848863"/>
-            <a:ext cx="1440160" cy="1472164"/>
-          </a:xfrm>
-          <a:prstGeom prst="rect">
-            <a:avLst/>
-          </a:prstGeom>
-          <a:noFill/>
-          <a:ln>
-            <a:noFill/>
-          </a:ln>
-          <a:effectLst/>
-          <a:extLst>
-            <a:ext uri="{909E8E84-426E-40DD-AFC4-6F175D3DCCD1}">
-              <a14:hiddenFill xmlns:a14="http://schemas.microsoft.com/office/drawing/2010/main">
-                <a:solidFill>
-                  <a:schemeClr val="accent1"/>
-                </a:solidFill>
-              </a14:hiddenFill>
-            </a:ext>
-            <a:ext uri="{91240B29-F687-4F45-9708-019B960494DF}">
-              <a14:hiddenLine xmlns:a14="http://schemas.microsoft.com/office/drawing/2010/main" w="9525">
-                <a:solidFill>
-                  <a:schemeClr val="tx1"/>
-                </a:solidFill>
-                <a:miter lim="800000"/>
-                <a:headEnd/>
-                <a:tailEnd/>
-              </a14:hiddenLine>
-            </a:ext>
-            <a:ext uri="{AF507438-7753-43E0-B8FC-AC1667EBCBE1}">
-              <a14:hiddenEffects xmlns:a14="http://schemas.microsoft.com/office/drawing/2010/main">
-                <a:effectLst>
-                  <a:outerShdw dist="35921" dir="2700000" algn="ctr" rotWithShape="0">
-                    <a:schemeClr val="bg2"/>
-                  </a:outerShdw>
-                </a:effectLst>
-              </a14:hiddenEffects>
-            </a:ext>
-          </a:extLst>
-        </p:spPr>
-      </p:pic>
-      <p:pic>
-        <p:nvPicPr>
-          <p:cNvPr id="1028" name="Picture 4"/>
-          <p:cNvPicPr>
-            <a:picLocks noChangeAspect="1" noChangeArrowheads="1"/>
-          </p:cNvPicPr>
-          <p:nvPr/>
-        </p:nvPicPr>
-        <p:blipFill>
-          <a:blip r:embed="rId3">
-            <a:extLst>
-              <a:ext uri="{28A0092B-C50C-407E-A947-70E740481C1C}">
-                <a14:useLocalDpi xmlns:a14="http://schemas.microsoft.com/office/drawing/2010/main" val="0"/>
-              </a:ext>
-            </a:extLst>
-          </a:blip>
-          <a:srcRect/>
-          <a:stretch>
-            <a:fillRect/>
-          </a:stretch>
-        </p:blipFill>
-        <p:spPr bwMode="auto">
-          <a:xfrm>
-            <a:off x="5070296" y="2787295"/>
-            <a:ext cx="720080" cy="720080"/>
-          </a:xfrm>
-          <a:prstGeom prst="rect">
-            <a:avLst/>
-          </a:prstGeom>
-          <a:noFill/>
-          <a:ln>
-            <a:noFill/>
-          </a:ln>
-          <a:effectLst/>
-          <a:extLst>
-            <a:ext uri="{909E8E84-426E-40DD-AFC4-6F175D3DCCD1}">
-              <a14:hiddenFill xmlns:a14="http://schemas.microsoft.com/office/drawing/2010/main">
-                <a:solidFill>
-                  <a:schemeClr val="accent1"/>
-                </a:solidFill>
-              </a14:hiddenFill>
-            </a:ext>
-            <a:ext uri="{91240B29-F687-4F45-9708-019B960494DF}">
-              <a14:hiddenLine xmlns:a14="http://schemas.microsoft.com/office/drawing/2010/main" w="9525">
-                <a:solidFill>
-                  <a:schemeClr val="tx1"/>
-                </a:solidFill>
-                <a:miter lim="800000"/>
-                <a:headEnd/>
-                <a:tailEnd/>
-              </a14:hiddenLine>
-            </a:ext>
-            <a:ext uri="{AF507438-7753-43E0-B8FC-AC1667EBCBE1}">
-              <a14:hiddenEffects xmlns:a14="http://schemas.microsoft.com/office/drawing/2010/main">
-                <a:effectLst>
-                  <a:outerShdw dist="35921" dir="2700000" algn="ctr" rotWithShape="0">
-                    <a:schemeClr val="bg2"/>
-                  </a:outerShdw>
-                </a:effectLst>
-              </a14:hiddenEffects>
-            </a:ext>
-          </a:extLst>
-        </p:spPr>
-      </p:pic>
-      <p:pic>
-        <p:nvPicPr>
-          <p:cNvPr id="1029" name="Picture 5"/>
-          <p:cNvPicPr>
-            <a:picLocks noChangeAspect="1" noChangeArrowheads="1"/>
-          </p:cNvPicPr>
-          <p:nvPr/>
-        </p:nvPicPr>
-        <p:blipFill>
-          <a:blip r:embed="rId4">
-            <a:extLst>
-              <a:ext uri="{28A0092B-C50C-407E-A947-70E740481C1C}">
-                <a14:useLocalDpi xmlns:a14="http://schemas.microsoft.com/office/drawing/2010/main" val="0"/>
-              </a:ext>
-            </a:extLst>
-          </a:blip>
-          <a:srcRect/>
-          <a:stretch>
-            <a:fillRect/>
-          </a:stretch>
-        </p:blipFill>
-        <p:spPr bwMode="auto">
-          <a:xfrm>
-            <a:off x="6021620" y="2998388"/>
-            <a:ext cx="650556" cy="650556"/>
-          </a:xfrm>
-          <a:prstGeom prst="rect">
-            <a:avLst/>
-          </a:prstGeom>
-          <a:noFill/>
-          <a:ln>
-            <a:noFill/>
-          </a:ln>
-          <a:effectLst/>
-          <a:extLst>
-            <a:ext uri="{909E8E84-426E-40DD-AFC4-6F175D3DCCD1}">
-              <a14:hiddenFill xmlns:a14="http://schemas.microsoft.com/office/drawing/2010/main">
-                <a:solidFill>
-                  <a:schemeClr val="accent1"/>
-                </a:solidFill>
-              </a14:hiddenFill>
-            </a:ext>
-            <a:ext uri="{91240B29-F687-4F45-9708-019B960494DF}">
-              <a14:hiddenLine xmlns:a14="http://schemas.microsoft.com/office/drawing/2010/main" w="9525">
-                <a:solidFill>
-                  <a:schemeClr val="tx1"/>
-                </a:solidFill>
-                <a:miter lim="800000"/>
-                <a:headEnd/>
-                <a:tailEnd/>
-              </a14:hiddenLine>
-            </a:ext>
-            <a:ext uri="{AF507438-7753-43E0-B8FC-AC1667EBCBE1}">
-              <a14:hiddenEffects xmlns:a14="http://schemas.microsoft.com/office/drawing/2010/main">
-                <a:effectLst>
-                  <a:outerShdw dist="35921" dir="2700000" algn="ctr" rotWithShape="0">
-                    <a:schemeClr val="bg2"/>
-                  </a:outerShdw>
-                </a:effectLst>
-              </a14:hiddenEffects>
-            </a:ext>
-          </a:extLst>
-        </p:spPr>
-      </p:pic>
-      <p:pic>
-        <p:nvPicPr>
-          <p:cNvPr id="1030" name="Picture 6"/>
-          <p:cNvPicPr>
-            <a:picLocks noChangeAspect="1" noChangeArrowheads="1"/>
-          </p:cNvPicPr>
-          <p:nvPr/>
-        </p:nvPicPr>
-        <p:blipFill>
-          <a:blip r:embed="rId5">
-            <a:extLst>
-              <a:ext uri="{28A0092B-C50C-407E-A947-70E740481C1C}">
-                <a14:useLocalDpi xmlns:a14="http://schemas.microsoft.com/office/drawing/2010/main" val="0"/>
-              </a:ext>
-            </a:extLst>
-          </a:blip>
-          <a:srcRect/>
-          <a:stretch>
-            <a:fillRect/>
-          </a:stretch>
-        </p:blipFill>
-        <p:spPr bwMode="auto">
-          <a:xfrm>
-            <a:off x="5644861" y="3759787"/>
-            <a:ext cx="690040" cy="690040"/>
-          </a:xfrm>
-          <a:prstGeom prst="rect">
-            <a:avLst/>
-          </a:prstGeom>
-          <a:noFill/>
-          <a:ln>
-            <a:noFill/>
-          </a:ln>
-          <a:effectLst/>
-          <a:extLst>
-            <a:ext uri="{909E8E84-426E-40DD-AFC4-6F175D3DCCD1}">
-              <a14:hiddenFill xmlns:a14="http://schemas.microsoft.com/office/drawing/2010/main">
-                <a:solidFill>
-                  <a:schemeClr val="accent1"/>
-                </a:solidFill>
-              </a14:hiddenFill>
-            </a:ext>
-            <a:ext uri="{91240B29-F687-4F45-9708-019B960494DF}">
-              <a14:hiddenLine xmlns:a14="http://schemas.microsoft.com/office/drawing/2010/main" w="9525">
-                <a:solidFill>
-                  <a:schemeClr val="tx1"/>
-                </a:solidFill>
-                <a:miter lim="800000"/>
-                <a:headEnd/>
-                <a:tailEnd/>
-              </a14:hiddenLine>
-            </a:ext>
-            <a:ext uri="{AF507438-7753-43E0-B8FC-AC1667EBCBE1}">
-              <a14:hiddenEffects xmlns:a14="http://schemas.microsoft.com/office/drawing/2010/main">
-                <a:effectLst>
-                  <a:outerShdw dist="35921" dir="2700000" algn="ctr" rotWithShape="0">
-                    <a:schemeClr val="bg2"/>
-                  </a:outerShdw>
-                </a:effectLst>
-              </a14:hiddenEffects>
-            </a:ext>
-          </a:extLst>
-        </p:spPr>
-      </p:pic>
-      <p:sp>
-        <p:nvSpPr>
-          <p:cNvPr id="4" name="TextBox 3"/>
+      <p:sp>
+        <p:nvSpPr>
+          <p:cNvPr id="3" name="TextBox 2"/>
           <p:cNvSpPr txBox="1"/>
           <p:nvPr/>
         </p:nvSpPr>
         <p:spPr>
           <a:xfrm>
-            <a:off x="1313631" y="1807623"/>
-            <a:ext cx="2592289" cy="954107"/>
+            <a:off x="395536" y="1556792"/>
+            <a:ext cx="3816424" cy="4549835"/>
           </a:xfrm>
           <a:prstGeom prst="rect">
             <a:avLst/>
@@ -5314,25 +6000,95 @@
           </a:bodyPr>
           <a:lstStyle/>
           <a:p>
-            <a:pPr algn="ctr"/>
+            <a:pPr>
+              <a:lnSpc>
+                <a:spcPct val="150000"/>
+              </a:lnSpc>
+            </a:pPr>
             <a:r>
               <a:rPr lang="ru-RU" sz="2800" dirty="0" smtClean="0"/>
-              <a:t>Монолитное приложение</a:t>
-            </a:r>
+              <a:t>+ Протокол</a:t>
+            </a:r>
+          </a:p>
+          <a:p>
+            <a:pPr>
+              <a:lnSpc>
+                <a:spcPct val="150000"/>
+              </a:lnSpc>
+            </a:pPr>
+            <a:r>
+              <a:rPr lang="ru-RU" sz="2800" dirty="0" smtClean="0"/>
+              <a:t>+ Простота модуля</a:t>
+            </a:r>
+          </a:p>
+          <a:p>
+            <a:pPr>
+              <a:lnSpc>
+                <a:spcPct val="150000"/>
+              </a:lnSpc>
+            </a:pPr>
+            <a:r>
+              <a:rPr lang="ru-RU" sz="2800" dirty="0" smtClean="0"/>
+              <a:t>+ Скорость разработки</a:t>
+            </a:r>
+          </a:p>
+          <a:p>
+            <a:pPr>
+              <a:lnSpc>
+                <a:spcPct val="150000"/>
+              </a:lnSpc>
+            </a:pPr>
+            <a:r>
+              <a:rPr lang="ru-RU" sz="2800" dirty="0" smtClean="0"/>
+              <a:t>+ Независимость</a:t>
+            </a:r>
+          </a:p>
+          <a:p>
+            <a:pPr>
+              <a:lnSpc>
+                <a:spcPct val="150000"/>
+              </a:lnSpc>
+            </a:pPr>
+            <a:r>
+              <a:rPr lang="ru-RU" sz="2800" dirty="0"/>
+              <a:t> </a:t>
+            </a:r>
+            <a:r>
+              <a:rPr lang="ru-RU" sz="2800" dirty="0" smtClean="0"/>
+              <a:t>      команд</a:t>
+            </a:r>
+          </a:p>
+          <a:p>
+            <a:pPr>
+              <a:lnSpc>
+                <a:spcPct val="150000"/>
+              </a:lnSpc>
+            </a:pPr>
+            <a:r>
+              <a:rPr lang="ru-RU" sz="2800" dirty="0" smtClean="0"/>
+              <a:t>       технологий</a:t>
+            </a:r>
+          </a:p>
+          <a:p>
+            <a:pPr>
+              <a:lnSpc>
+                <a:spcPct val="150000"/>
+              </a:lnSpc>
+            </a:pPr>
             <a:endParaRPr lang="ru-RU" sz="2800" dirty="0"/>
           </a:p>
         </p:txBody>
       </p:sp>
       <p:sp>
         <p:nvSpPr>
-          <p:cNvPr id="10" name="TextBox 9"/>
+          <p:cNvPr id="11" name="TextBox 10"/>
           <p:cNvSpPr txBox="1"/>
           <p:nvPr/>
         </p:nvSpPr>
         <p:spPr>
           <a:xfrm>
-            <a:off x="4538581" y="1807621"/>
-            <a:ext cx="2902600" cy="954107"/>
+            <a:off x="4427984" y="1556792"/>
+            <a:ext cx="4464496" cy="3323987"/>
           </a:xfrm>
           <a:prstGeom prst="rect">
             <a:avLst/>
@@ -5345,129 +6101,62 @@
           </a:bodyPr>
           <a:lstStyle/>
           <a:p>
-            <a:pPr algn="ctr"/>
-            <a:r>
-              <a:rPr lang="ru-RU" sz="2800" dirty="0" err="1" smtClean="0"/>
-              <a:t>Микросервисное</a:t>
-            </a:r>
+            <a:pPr>
+              <a:lnSpc>
+                <a:spcPct val="150000"/>
+              </a:lnSpc>
+            </a:pPr>
             <a:r>
               <a:rPr lang="ru-RU" sz="2800" dirty="0" smtClean="0"/>
-              <a:t> </a:t>
-            </a:r>
-          </a:p>
-          <a:p>
-            <a:pPr algn="ctr"/>
+              <a:t>- Подверженность ошибкам</a:t>
+            </a:r>
+          </a:p>
+          <a:p>
+            <a:pPr>
+              <a:lnSpc>
+                <a:spcPct val="150000"/>
+              </a:lnSpc>
+            </a:pPr>
             <a:r>
               <a:rPr lang="ru-RU" sz="2800" dirty="0" smtClean="0"/>
-              <a:t>приложение</a:t>
+              <a:t>- </a:t>
+            </a:r>
+            <a:r>
+              <a:rPr lang="ru-RU" sz="2800" dirty="0" smtClean="0"/>
+              <a:t>Практики </a:t>
+            </a:r>
+            <a:r>
+              <a:rPr lang="en-US" sz="2800" dirty="0" err="1" smtClean="0"/>
+              <a:t>DevOps</a:t>
+            </a:r>
+            <a:endParaRPr lang="en-US" sz="2800" dirty="0" smtClean="0"/>
+          </a:p>
+          <a:p>
+            <a:pPr>
+              <a:lnSpc>
+                <a:spcPct val="150000"/>
+              </a:lnSpc>
+            </a:pPr>
+            <a:r>
+              <a:rPr lang="ru-RU" sz="2800" dirty="0" smtClean="0"/>
+              <a:t>- Сложность 	разработки</a:t>
+            </a:r>
+          </a:p>
+          <a:p>
+            <a:pPr lvl="1">
+              <a:lnSpc>
+                <a:spcPct val="150000"/>
+              </a:lnSpc>
+            </a:pPr>
+            <a:r>
+              <a:rPr lang="ru-RU" sz="2800" dirty="0"/>
+              <a:t>	</a:t>
+            </a:r>
+            <a:r>
+              <a:rPr lang="ru-RU" sz="2800" dirty="0" smtClean="0"/>
+              <a:t>системы</a:t>
             </a:r>
             <a:endParaRPr lang="ru-RU" sz="2800" dirty="0"/>
-          </a:p>
-        </p:txBody>
-      </p:sp>
-      <p:sp>
-        <p:nvSpPr>
-          <p:cNvPr id="3" name="TextBox 2"/>
-          <p:cNvSpPr txBox="1"/>
-          <p:nvPr/>
-        </p:nvSpPr>
-        <p:spPr>
-          <a:xfrm>
-            <a:off x="971600" y="4869160"/>
-            <a:ext cx="2423933" cy="2031325"/>
-          </a:xfrm>
-          <a:prstGeom prst="rect">
-            <a:avLst/>
-          </a:prstGeom>
-          <a:noFill/>
-        </p:spPr>
-        <p:txBody>
-          <a:bodyPr wrap="none" rtlCol="0">
-            <a:spAutoFit/>
-          </a:bodyPr>
-          <a:lstStyle/>
-          <a:p>
-            <a:r>
-              <a:rPr lang="ru-RU" dirty="0" smtClean="0"/>
-              <a:t>+ Протокол</a:t>
-            </a:r>
-          </a:p>
-          <a:p>
-            <a:r>
-              <a:rPr lang="ru-RU" dirty="0" smtClean="0"/>
-              <a:t>+ Простота модуля</a:t>
-            </a:r>
-          </a:p>
-          <a:p>
-            <a:r>
-              <a:rPr lang="ru-RU" dirty="0" smtClean="0"/>
-              <a:t>+ Скорость разработки</a:t>
-            </a:r>
-          </a:p>
-          <a:p>
-            <a:r>
-              <a:rPr lang="ru-RU" dirty="0" smtClean="0"/>
-              <a:t>+ Независимость</a:t>
-            </a:r>
-          </a:p>
-          <a:p>
-            <a:r>
-              <a:rPr lang="ru-RU" dirty="0"/>
-              <a:t> </a:t>
-            </a:r>
-            <a:r>
-              <a:rPr lang="ru-RU" dirty="0" smtClean="0"/>
-              <a:t>      команд</a:t>
-            </a:r>
-          </a:p>
-          <a:p>
-            <a:r>
-              <a:rPr lang="ru-RU" dirty="0" smtClean="0"/>
-              <a:t>       технологий</a:t>
-            </a:r>
-          </a:p>
-          <a:p>
-            <a:endParaRPr lang="ru-RU" dirty="0"/>
-          </a:p>
-        </p:txBody>
-      </p:sp>
-      <p:sp>
-        <p:nvSpPr>
-          <p:cNvPr id="11" name="TextBox 10"/>
-          <p:cNvSpPr txBox="1"/>
-          <p:nvPr/>
-        </p:nvSpPr>
-        <p:spPr>
-          <a:xfrm>
-            <a:off x="5063185" y="4853053"/>
-            <a:ext cx="2940933" cy="646331"/>
-          </a:xfrm>
-          <a:prstGeom prst="rect">
-            <a:avLst/>
-          </a:prstGeom>
-          <a:noFill/>
-        </p:spPr>
-        <p:txBody>
-          <a:bodyPr wrap="none" rtlCol="0">
-            <a:spAutoFit/>
-          </a:bodyPr>
-          <a:lstStyle/>
-          <a:p>
-            <a:r>
-              <a:rPr lang="ru-RU" dirty="0"/>
-              <a:t>-</a:t>
-            </a:r>
-            <a:r>
-              <a:rPr lang="ru-RU" dirty="0" smtClean="0"/>
-              <a:t> Сложность</a:t>
-            </a:r>
-          </a:p>
-          <a:p>
-            <a:r>
-              <a:rPr lang="ru-RU" dirty="0" smtClean="0"/>
-              <a:t>- Подверженность ошибкам</a:t>
-            </a:r>
-            <a:endParaRPr lang="ru-RU" dirty="0"/>
           </a:p>
         </p:txBody>
       </p:sp>
@@ -5481,6 +6170,13 @@
   <p:clrMapOvr>
     <a:masterClrMapping/>
   </p:clrMapOvr>
+  <p:timing>
+    <p:tnLst>
+      <p:par>
+        <p:cTn id="1" dur="indefinite" restart="never" nodeType="tmRoot"/>
+      </p:par>
+    </p:tnLst>
+  </p:timing>
 </p:sld>
 </file>
 
@@ -7006,6 +7702,166 @@
           </a:fontRef>
         </p:style>
       </p:cxnSp>
+      <p:sp>
+        <p:nvSpPr>
+          <p:cNvPr id="3" name="Блок-схема: магнитный диск 2"/>
+          <p:cNvSpPr/>
+          <p:nvPr/>
+        </p:nvSpPr>
+        <p:spPr>
+          <a:xfrm>
+            <a:off x="1211867" y="3080977"/>
+            <a:ext cx="914400" cy="960091"/>
+          </a:xfrm>
+          <a:prstGeom prst="flowChartMagneticDisk">
+            <a:avLst/>
+          </a:prstGeom>
+        </p:spPr>
+        <p:style>
+          <a:lnRef idx="2">
+            <a:schemeClr val="accent2">
+              <a:shade val="50000"/>
+            </a:schemeClr>
+          </a:lnRef>
+          <a:fillRef idx="1">
+            <a:schemeClr val="accent2"/>
+          </a:fillRef>
+          <a:effectRef idx="0">
+            <a:schemeClr val="accent2"/>
+          </a:effectRef>
+          <a:fontRef idx="minor">
+            <a:schemeClr val="lt1"/>
+          </a:fontRef>
+        </p:style>
+        <p:txBody>
+          <a:bodyPr rtlCol="0" anchor="ctr"/>
+          <a:lstStyle/>
+          <a:p>
+            <a:pPr algn="ctr"/>
+            <a:r>
+              <a:rPr lang="en-US" dirty="0" err="1" smtClean="0"/>
+              <a:t>PostgreSQL</a:t>
+            </a:r>
+            <a:endParaRPr lang="ru-RU" dirty="0"/>
+          </a:p>
+        </p:txBody>
+      </p:sp>
+      <p:sp>
+        <p:nvSpPr>
+          <p:cNvPr id="19" name="Блок-схема: магнитный диск 18"/>
+          <p:cNvSpPr/>
+          <p:nvPr/>
+        </p:nvSpPr>
+        <p:spPr>
+          <a:xfrm>
+            <a:off x="1211867" y="4231488"/>
+            <a:ext cx="914400" cy="960091"/>
+          </a:xfrm>
+          <a:prstGeom prst="flowChartMagneticDisk">
+            <a:avLst/>
+          </a:prstGeom>
+        </p:spPr>
+        <p:style>
+          <a:lnRef idx="2">
+            <a:schemeClr val="accent2">
+              <a:shade val="50000"/>
+            </a:schemeClr>
+          </a:lnRef>
+          <a:fillRef idx="1">
+            <a:schemeClr val="accent2"/>
+          </a:fillRef>
+          <a:effectRef idx="0">
+            <a:schemeClr val="accent2"/>
+          </a:effectRef>
+          <a:fontRef idx="minor">
+            <a:schemeClr val="lt1"/>
+          </a:fontRef>
+        </p:style>
+        <p:txBody>
+          <a:bodyPr rtlCol="0" anchor="ctr"/>
+          <a:lstStyle/>
+          <a:p>
+            <a:pPr algn="ctr"/>
+            <a:r>
+              <a:rPr lang="en-US" dirty="0" smtClean="0"/>
+              <a:t>Mongo</a:t>
+            </a:r>
+            <a:endParaRPr lang="ru-RU" dirty="0"/>
+          </a:p>
+        </p:txBody>
+      </p:sp>
+      <p:cxnSp>
+        <p:nvCxnSpPr>
+          <p:cNvPr id="12" name="Прямая со стрелкой 11"/>
+          <p:cNvCxnSpPr>
+            <a:stCxn id="8" idx="1"/>
+            <a:endCxn id="3" idx="4"/>
+          </p:cNvCxnSpPr>
+          <p:nvPr/>
+        </p:nvCxnSpPr>
+        <p:spPr>
+          <a:xfrm flipH="1">
+            <a:off x="2126267" y="3469627"/>
+            <a:ext cx="1351218" cy="91396"/>
+          </a:xfrm>
+          <a:prstGeom prst="straightConnector1">
+            <a:avLst/>
+          </a:prstGeom>
+          <a:ln>
+            <a:tailEnd type="arrow"/>
+          </a:ln>
+        </p:spPr>
+        <p:style>
+          <a:lnRef idx="1">
+            <a:schemeClr val="accent1"/>
+          </a:lnRef>
+          <a:fillRef idx="0">
+            <a:schemeClr val="accent1"/>
+          </a:fillRef>
+          <a:effectRef idx="0">
+            <a:schemeClr val="accent1"/>
+          </a:effectRef>
+          <a:fontRef idx="minor">
+            <a:schemeClr val="tx1"/>
+          </a:fontRef>
+        </p:style>
+      </p:cxnSp>
+      <p:cxnSp>
+        <p:nvCxnSpPr>
+          <p:cNvPr id="16" name="Прямая со стрелкой 15"/>
+          <p:cNvCxnSpPr>
+            <a:stCxn id="8" idx="1"/>
+            <a:endCxn id="19" idx="4"/>
+          </p:cNvCxnSpPr>
+          <p:nvPr/>
+        </p:nvCxnSpPr>
+        <p:spPr>
+          <a:xfrm flipH="1">
+            <a:off x="2126267" y="3469627"/>
+            <a:ext cx="1351218" cy="1241907"/>
+          </a:xfrm>
+          <a:prstGeom prst="straightConnector1">
+            <a:avLst/>
+          </a:prstGeom>
+          <a:ln>
+            <a:tailEnd type="arrow"/>
+          </a:ln>
+        </p:spPr>
+        <p:style>
+          <a:lnRef idx="1">
+            <a:schemeClr val="accent1"/>
+          </a:lnRef>
+          <a:fillRef idx="0">
+            <a:schemeClr val="accent1"/>
+          </a:fillRef>
+          <a:effectRef idx="0">
+            <a:schemeClr val="accent1"/>
+          </a:effectRef>
+          <a:fontRef idx="minor">
+            <a:schemeClr val="tx1"/>
+          </a:fontRef>
+        </p:style>
+      </p:cxnSp>
     </p:spTree>
     <p:extLst>
       <p:ext uri="{BB962C8B-B14F-4D97-AF65-F5344CB8AC3E}">
@@ -7016,6 +7872,13 @@
   <p:clrMapOvr>
     <a:masterClrMapping/>
   </p:clrMapOvr>
+  <p:timing>
+    <p:tnLst>
+      <p:par>
+        <p:cTn id="1" dur="indefinite" restart="never" nodeType="tmRoot"/>
+      </p:par>
+    </p:tnLst>
+  </p:timing>
 </p:sld>
 </file>
 
@@ -7051,7 +7914,19 @@
           <a:bodyPr/>
           <a:lstStyle/>
           <a:p>
-            <a:endParaRPr lang="ru-RU"/>
+            <a:r>
+              <a:rPr lang="ru-RU" u="sng" dirty="0" err="1"/>
+              <a:t>Business</a:t>
+            </a:r>
+            <a:r>
+              <a:rPr lang="ru-RU" u="sng" dirty="0"/>
+              <a:t> </a:t>
+            </a:r>
+            <a:r>
+              <a:rPr lang="ru-RU" u="sng" dirty="0" err="1"/>
+              <a:t>Capabilities</a:t>
+            </a:r>
+            <a:endParaRPr lang="ru-RU" dirty="0"/>
           </a:p>
         </p:txBody>
       </p:sp>
@@ -7074,20 +7949,12 @@
               <a:buNone/>
             </a:pPr>
             <a:r>
-              <a:rPr lang="ru-RU" u="sng" dirty="0" err="1"/>
-              <a:t>Business</a:t>
+              <a:rPr lang="ru-RU" u="sng" dirty="0" smtClean="0"/>
+              <a:t>Организация </a:t>
             </a:r>
             <a:r>
               <a:rPr lang="ru-RU" u="sng" dirty="0"/>
-              <a:t> </a:t>
-            </a:r>
-            <a:r>
-              <a:rPr lang="ru-RU" u="sng" dirty="0" err="1"/>
-              <a:t>Capabilities</a:t>
-            </a:r>
-            <a:r>
-              <a:rPr lang="ru-RU" u="sng" dirty="0"/>
-              <a:t> | Организация вокруг </a:t>
+              <a:t>вокруг </a:t>
             </a:r>
             <a:r>
               <a:rPr lang="ru-RU" u="sng" dirty="0" smtClean="0"/>
@@ -7173,6 +8040,13 @@
   <p:clrMapOvr>
     <a:masterClrMapping/>
   </p:clrMapOvr>
+  <p:timing>
+    <p:tnLst>
+      <p:par>
+        <p:cTn id="1" dur="indefinite" restart="never" nodeType="tmRoot"/>
+      </p:par>
+    </p:tnLst>
+  </p:timing>
 </p:sld>
 </file>
 
@@ -7229,43 +8103,32 @@
         <p:spPr/>
         <p:txBody>
           <a:bodyPr>
-            <a:normAutofit fontScale="92500" lnSpcReduction="20000"/>
+            <a:normAutofit/>
           </a:bodyPr>
           <a:lstStyle/>
           <a:p>
             <a:r>
-              <a:rPr lang="en-US" dirty="0" smtClean="0"/>
-              <a:t>Step </a:t>
-            </a:r>
-            <a:r>
-              <a:rPr lang="en-US" dirty="0"/>
-              <a:t>Away from </a:t>
-            </a:r>
-            <a:r>
-              <a:rPr lang="en-US" dirty="0" smtClean="0"/>
-              <a:t>infrastructure</a:t>
+              <a:rPr lang="ru-RU" dirty="0" smtClean="0"/>
+              <a:t>Абстрагироваться от инфраструктуры</a:t>
             </a:r>
             <a:endParaRPr lang="ru-RU" dirty="0" smtClean="0"/>
           </a:p>
           <a:p>
             <a:r>
-              <a:rPr lang="en-US" dirty="0"/>
-              <a:t>Align environment</a:t>
-            </a:r>
+              <a:rPr lang="ru-RU" dirty="0" smtClean="0"/>
+              <a:t>Выровнять инфраструктуру окружений</a:t>
+            </a:r>
+            <a:endParaRPr lang="en-US" dirty="0"/>
           </a:p>
           <a:p>
             <a:pPr lvl="1"/>
             <a:r>
-              <a:rPr lang="en-US" dirty="0"/>
-              <a:t>We have separate </a:t>
-            </a:r>
-            <a:r>
-              <a:rPr lang="en-US" dirty="0" smtClean="0"/>
-              <a:t>environments</a:t>
-            </a:r>
-            <a:r>
               <a:rPr lang="ru-RU" dirty="0" smtClean="0"/>
-              <a:t> (</a:t>
+              <a:t>Отдельные окружения </a:t>
+            </a:r>
+            <a:r>
+              <a:rPr lang="ru-RU" dirty="0" smtClean="0"/>
+              <a:t>(</a:t>
             </a:r>
             <a:r>
               <a:rPr lang="en-US" dirty="0" smtClean="0"/>
@@ -7275,8 +8138,8 @@
           </a:p>
           <a:p>
             <a:r>
-              <a:rPr lang="en-US" dirty="0" smtClean="0"/>
-              <a:t>Automation</a:t>
+              <a:rPr lang="ru-RU" dirty="0" smtClean="0"/>
+              <a:t>Автоматизация</a:t>
             </a:r>
             <a:endParaRPr lang="en-US" dirty="0" smtClean="0"/>
           </a:p>
@@ -7291,18 +8154,11 @@
             <a:pPr lvl="1"/>
             <a:r>
               <a:rPr lang="en-US" dirty="0" smtClean="0"/>
-              <a:t>Continuous Delivery (on the road to</a:t>
+              <a:t>One-button </a:t>
             </a:r>
             <a:r>
               <a:rPr lang="en-US" dirty="0" smtClean="0"/>
-              <a:t>…)</a:t>
-            </a:r>
-          </a:p>
-          <a:p>
-            <a:pPr lvl="1"/>
-            <a:r>
-              <a:rPr lang="en-US" dirty="0" smtClean="0"/>
-              <a:t>One-button Deployment</a:t>
+              <a:t>Deployment</a:t>
             </a:r>
           </a:p>
           <a:p>
@@ -7311,22 +8167,6 @@
               <a:rPr lang="en-US" dirty="0" smtClean="0"/>
               <a:t>Database Evolution</a:t>
             </a:r>
-          </a:p>
-          <a:p>
-            <a:pPr lvl="2"/>
-            <a:r>
-              <a:rPr lang="en-US" dirty="0" err="1" smtClean="0"/>
-              <a:t>Liquibase</a:t>
-            </a:r>
-            <a:endParaRPr lang="en-US" dirty="0" smtClean="0"/>
-          </a:p>
-          <a:p>
-            <a:pPr lvl="2"/>
-            <a:r>
-              <a:rPr lang="en-US" dirty="0" smtClean="0"/>
-              <a:t>Data migration</a:t>
-            </a:r>
-            <a:endParaRPr lang="en-US" dirty="0" smtClean="0"/>
           </a:p>
           <a:p>
             <a:pPr lvl="1"/>
@@ -7391,8 +8231,8 @@
           <a:lstStyle/>
           <a:p>
             <a:r>
-              <a:rPr lang="en-US" dirty="0" smtClean="0"/>
-              <a:t>Infrastructure</a:t>
+              <a:rPr lang="en-US" u="sng" dirty="0"/>
+              <a:t>Infrastructure Automation</a:t>
             </a:r>
             <a:endParaRPr lang="ru-RU" dirty="0"/>
           </a:p>
@@ -7411,7 +8251,7 @@
         <p:spPr/>
         <p:txBody>
           <a:bodyPr>
-            <a:normAutofit fontScale="92500" lnSpcReduction="20000"/>
+            <a:normAutofit fontScale="92500" lnSpcReduction="10000"/>
           </a:bodyPr>
           <a:lstStyle/>
           <a:p>
@@ -7419,12 +8259,12 @@
               <a:buNone/>
             </a:pPr>
             <a:r>
-              <a:rPr lang="en-US" u="sng" dirty="0"/>
-              <a:t>Infrastructure Automation | </a:t>
+              <a:rPr lang="ru-RU" u="sng" dirty="0" smtClean="0"/>
+              <a:t>Автоматизация </a:t>
             </a:r>
             <a:r>
               <a:rPr lang="ru-RU" u="sng" dirty="0"/>
-              <a:t>Автоматизация инфраструктуры</a:t>
+              <a:t>инфраструктуры</a:t>
             </a:r>
             <a:endParaRPr lang="en-US" u="sng" dirty="0" smtClean="0"/>
           </a:p>
@@ -7445,20 +8285,16 @@
           <a:p>
             <a:pPr lvl="2"/>
             <a:r>
+              <a:rPr lang="ru-RU" dirty="0" smtClean="0"/>
+              <a:t>Выделенное окружение разработчика</a:t>
+            </a:r>
+            <a:endParaRPr lang="en-US" dirty="0" smtClean="0"/>
+          </a:p>
+          <a:p>
+            <a:pPr lvl="1"/>
+            <a:r>
               <a:rPr lang="en-US" dirty="0" smtClean="0"/>
-              <a:t>Dedicated Shared Development Environment</a:t>
-            </a:r>
-            <a:endParaRPr lang="en-US" dirty="0" smtClean="0"/>
-          </a:p>
-          <a:p>
-            <a:pPr lvl="1"/>
-            <a:r>
-              <a:rPr lang="en-US" dirty="0" smtClean="0"/>
-              <a:t>Continuous Delivery (on the road to</a:t>
-            </a:r>
-            <a:r>
-              <a:rPr lang="en-US" dirty="0" smtClean="0"/>
-              <a:t>…)</a:t>
+              <a:t>Continuous Delivery (on the road to…)</a:t>
             </a:r>
           </a:p>
           <a:p>
@@ -7497,7 +8333,6 @@
               <a:rPr lang="en-US" dirty="0" smtClean="0"/>
               <a:t>Automated run</a:t>
             </a:r>
-            <a:endParaRPr lang="en-US" dirty="0" smtClean="0"/>
           </a:p>
           <a:p>
             <a:pPr lvl="2"/>
@@ -7505,15 +8340,13 @@
               <a:rPr lang="en-US" dirty="0" smtClean="0"/>
               <a:t>Data migration</a:t>
             </a:r>
-            <a:endParaRPr lang="en-US" dirty="0" smtClean="0"/>
           </a:p>
           <a:p>
             <a:pPr lvl="1"/>
             <a:r>
-              <a:rPr lang="en-US" smtClean="0"/>
+              <a:rPr lang="en-US" dirty="0" smtClean="0"/>
               <a:t>Chef</a:t>
             </a:r>
-            <a:endParaRPr lang="en-US" dirty="0" smtClean="0"/>
           </a:p>
         </p:txBody>
       </p:sp>
@@ -7820,4 +8653,289 @@
   <a:objectDefaults/>
   <a:extraClrSchemeLst/>
 </a:theme>
+</file>
+
+<file path=ppt/theme/theme2.xml><?xml version="1.0" encoding="utf-8"?>
+<a:theme xmlns:a="http://schemas.openxmlformats.org/drawingml/2006/main" name="Тема Office">
+  <a:themeElements>
+    <a:clrScheme name="Стандартная">
+      <a:dk1>
+        <a:sysClr val="windowText" lastClr="000000"/>
+      </a:dk1>
+      <a:lt1>
+        <a:sysClr val="window" lastClr="FFFFFF"/>
+      </a:lt1>
+      <a:dk2>
+        <a:srgbClr val="1F497D"/>
+      </a:dk2>
+      <a:lt2>
+        <a:srgbClr val="EEECE1"/>
+      </a:lt2>
+      <a:accent1>
+        <a:srgbClr val="4F81BD"/>
+      </a:accent1>
+      <a:accent2>
+        <a:srgbClr val="C0504D"/>
+      </a:accent2>
+      <a:accent3>
+        <a:srgbClr val="9BBB59"/>
+      </a:accent3>
+      <a:accent4>
+        <a:srgbClr val="8064A2"/>
+      </a:accent4>
+      <a:accent5>
+        <a:srgbClr val="4BACC6"/>
+      </a:accent5>
+      <a:accent6>
+        <a:srgbClr val="F79646"/>
+      </a:accent6>
+      <a:hlink>
+        <a:srgbClr val="0000FF"/>
+      </a:hlink>
+      <a:folHlink>
+        <a:srgbClr val="800080"/>
+      </a:folHlink>
+    </a:clrScheme>
+    <a:fontScheme name="Стандартная">
+      <a:majorFont>
+        <a:latin typeface="Calibri"/>
+        <a:ea typeface=""/>
+        <a:cs typeface=""/>
+        <a:font script="Jpan" typeface="ＭＳ Ｐゴシック"/>
+        <a:font script="Hang" typeface="맑은 고딕"/>
+        <a:font script="Hans" typeface="宋体"/>
+        <a:font script="Hant" typeface="新細明體"/>
+        <a:font script="Arab" typeface="Times New Roman"/>
+        <a:font script="Hebr" typeface="Times New Roman"/>
+        <a:font script="Thai" typeface="Angsana New"/>
+        <a:font script="Ethi" typeface="Nyala"/>
+        <a:font script="Beng" typeface="Vrinda"/>
+        <a:font script="Gujr" typeface="Shruti"/>
+        <a:font script="Khmr" typeface="MoolBoran"/>
+        <a:font script="Knda" typeface="Tunga"/>
+        <a:font script="Guru" typeface="Raavi"/>
+        <a:font script="Cans" typeface="Euphemia"/>
+        <a:font script="Cher" typeface="Plantagenet Cherokee"/>
+        <a:font script="Yiii" typeface="Microsoft Yi Baiti"/>
+        <a:font script="Tibt" typeface="Microsoft Himalaya"/>
+        <a:font script="Thaa" typeface="MV Boli"/>
+        <a:font script="Deva" typeface="Mangal"/>
+        <a:font script="Telu" typeface="Gautami"/>
+        <a:font script="Taml" typeface="Latha"/>
+        <a:font script="Syrc" typeface="Estrangelo Edessa"/>
+        <a:font script="Orya" typeface="Kalinga"/>
+        <a:font script="Mlym" typeface="Kartika"/>
+        <a:font script="Laoo" typeface="DokChampa"/>
+        <a:font script="Sinh" typeface="Iskoola Pota"/>
+        <a:font script="Mong" typeface="Mongolian Baiti"/>
+        <a:font script="Viet" typeface="Times New Roman"/>
+        <a:font script="Uigh" typeface="Microsoft Uighur"/>
+        <a:font script="Geor" typeface="Sylfaen"/>
+      </a:majorFont>
+      <a:minorFont>
+        <a:latin typeface="Calibri"/>
+        <a:ea typeface=""/>
+        <a:cs typeface=""/>
+        <a:font script="Jpan" typeface="ＭＳ Ｐゴシック"/>
+        <a:font script="Hang" typeface="맑은 고딕"/>
+        <a:font script="Hans" typeface="宋体"/>
+        <a:font script="Hant" typeface="新細明體"/>
+        <a:font script="Arab" typeface="Arial"/>
+        <a:font script="Hebr" typeface="Arial"/>
+        <a:font script="Thai" typeface="Cordia New"/>
+        <a:font script="Ethi" typeface="Nyala"/>
+        <a:font script="Beng" typeface="Vrinda"/>
+        <a:font script="Gujr" typeface="Shruti"/>
+        <a:font script="Khmr" typeface="DaunPenh"/>
+        <a:font script="Knda" typeface="Tunga"/>
+        <a:font script="Guru" typeface="Raavi"/>
+        <a:font script="Cans" typeface="Euphemia"/>
+        <a:font script="Cher" typeface="Plantagenet Cherokee"/>
+        <a:font script="Yiii" typeface="Microsoft Yi Baiti"/>
+        <a:font script="Tibt" typeface="Microsoft Himalaya"/>
+        <a:font script="Thaa" typeface="MV Boli"/>
+        <a:font script="Deva" typeface="Mangal"/>
+        <a:font script="Telu" typeface="Gautami"/>
+        <a:font script="Taml" typeface="Latha"/>
+        <a:font script="Syrc" typeface="Estrangelo Edessa"/>
+        <a:font script="Orya" typeface="Kalinga"/>
+        <a:font script="Mlym" typeface="Kartika"/>
+        <a:font script="Laoo" typeface="DokChampa"/>
+        <a:font script="Sinh" typeface="Iskoola Pota"/>
+        <a:font script="Mong" typeface="Mongolian Baiti"/>
+        <a:font script="Viet" typeface="Arial"/>
+        <a:font script="Uigh" typeface="Microsoft Uighur"/>
+        <a:font script="Geor" typeface="Sylfaen"/>
+      </a:minorFont>
+    </a:fontScheme>
+    <a:fmtScheme name="Стандартная">
+      <a:fillStyleLst>
+        <a:solidFill>
+          <a:schemeClr val="phClr"/>
+        </a:solidFill>
+        <a:gradFill rotWithShape="1">
+          <a:gsLst>
+            <a:gs pos="0">
+              <a:schemeClr val="phClr">
+                <a:tint val="50000"/>
+                <a:satMod val="300000"/>
+              </a:schemeClr>
+            </a:gs>
+            <a:gs pos="35000">
+              <a:schemeClr val="phClr">
+                <a:tint val="37000"/>
+                <a:satMod val="300000"/>
+              </a:schemeClr>
+            </a:gs>
+            <a:gs pos="100000">
+              <a:schemeClr val="phClr">
+                <a:tint val="15000"/>
+                <a:satMod val="350000"/>
+              </a:schemeClr>
+            </a:gs>
+          </a:gsLst>
+          <a:lin ang="16200000" scaled="1"/>
+        </a:gradFill>
+        <a:gradFill rotWithShape="1">
+          <a:gsLst>
+            <a:gs pos="0">
+              <a:schemeClr val="phClr">
+                <a:shade val="51000"/>
+                <a:satMod val="130000"/>
+              </a:schemeClr>
+            </a:gs>
+            <a:gs pos="80000">
+              <a:schemeClr val="phClr">
+                <a:shade val="93000"/>
+                <a:satMod val="130000"/>
+              </a:schemeClr>
+            </a:gs>
+            <a:gs pos="100000">
+              <a:schemeClr val="phClr">
+                <a:shade val="94000"/>
+                <a:satMod val="135000"/>
+              </a:schemeClr>
+            </a:gs>
+          </a:gsLst>
+          <a:lin ang="16200000" scaled="0"/>
+        </a:gradFill>
+      </a:fillStyleLst>
+      <a:lnStyleLst>
+        <a:ln w="9525" cap="flat" cmpd="sng" algn="ctr">
+          <a:solidFill>
+            <a:schemeClr val="phClr">
+              <a:shade val="95000"/>
+              <a:satMod val="105000"/>
+            </a:schemeClr>
+          </a:solidFill>
+          <a:prstDash val="solid"/>
+        </a:ln>
+        <a:ln w="25400" cap="flat" cmpd="sng" algn="ctr">
+          <a:solidFill>
+            <a:schemeClr val="phClr"/>
+          </a:solidFill>
+          <a:prstDash val="solid"/>
+        </a:ln>
+        <a:ln w="38100" cap="flat" cmpd="sng" algn="ctr">
+          <a:solidFill>
+            <a:schemeClr val="phClr"/>
+          </a:solidFill>
+          <a:prstDash val="solid"/>
+        </a:ln>
+      </a:lnStyleLst>
+      <a:effectStyleLst>
+        <a:effectStyle>
+          <a:effectLst>
+            <a:outerShdw blurRad="40000" dist="20000" dir="5400000" rotWithShape="0">
+              <a:srgbClr val="000000">
+                <a:alpha val="38000"/>
+              </a:srgbClr>
+            </a:outerShdw>
+          </a:effectLst>
+        </a:effectStyle>
+        <a:effectStyle>
+          <a:effectLst>
+            <a:outerShdw blurRad="40000" dist="23000" dir="5400000" rotWithShape="0">
+              <a:srgbClr val="000000">
+                <a:alpha val="35000"/>
+              </a:srgbClr>
+            </a:outerShdw>
+          </a:effectLst>
+        </a:effectStyle>
+        <a:effectStyle>
+          <a:effectLst>
+            <a:outerShdw blurRad="40000" dist="23000" dir="5400000" rotWithShape="0">
+              <a:srgbClr val="000000">
+                <a:alpha val="35000"/>
+              </a:srgbClr>
+            </a:outerShdw>
+          </a:effectLst>
+          <a:scene3d>
+            <a:camera prst="orthographicFront">
+              <a:rot lat="0" lon="0" rev="0"/>
+            </a:camera>
+            <a:lightRig rig="threePt" dir="t">
+              <a:rot lat="0" lon="0" rev="1200000"/>
+            </a:lightRig>
+          </a:scene3d>
+          <a:sp3d>
+            <a:bevelT w="63500" h="25400"/>
+          </a:sp3d>
+        </a:effectStyle>
+      </a:effectStyleLst>
+      <a:bgFillStyleLst>
+        <a:solidFill>
+          <a:schemeClr val="phClr"/>
+        </a:solidFill>
+        <a:gradFill rotWithShape="1">
+          <a:gsLst>
+            <a:gs pos="0">
+              <a:schemeClr val="phClr">
+                <a:tint val="40000"/>
+                <a:satMod val="350000"/>
+              </a:schemeClr>
+            </a:gs>
+            <a:gs pos="40000">
+              <a:schemeClr val="phClr">
+                <a:tint val="45000"/>
+                <a:shade val="99000"/>
+                <a:satMod val="350000"/>
+              </a:schemeClr>
+            </a:gs>
+            <a:gs pos="100000">
+              <a:schemeClr val="phClr">
+                <a:shade val="20000"/>
+                <a:satMod val="255000"/>
+              </a:schemeClr>
+            </a:gs>
+          </a:gsLst>
+          <a:path path="circle">
+            <a:fillToRect l="50000" t="-80000" r="50000" b="180000"/>
+          </a:path>
+        </a:gradFill>
+        <a:gradFill rotWithShape="1">
+          <a:gsLst>
+            <a:gs pos="0">
+              <a:schemeClr val="phClr">
+                <a:tint val="80000"/>
+                <a:satMod val="300000"/>
+              </a:schemeClr>
+            </a:gs>
+            <a:gs pos="100000">
+              <a:schemeClr val="phClr">
+                <a:shade val="30000"/>
+                <a:satMod val="200000"/>
+              </a:schemeClr>
+            </a:gs>
+          </a:gsLst>
+          <a:path path="circle">
+            <a:fillToRect l="50000" t="50000" r="50000" b="50000"/>
+          </a:path>
+        </a:gradFill>
+      </a:bgFillStyleLst>
+    </a:fmtScheme>
+  </a:themeElements>
+  <a:objectDefaults/>
+  <a:extraClrSchemeLst/>
+</a:theme>
 </file>
</xml_diff>

<commit_message>
Cleanup of CCC references
</commit_message>
<xml_diff>
--- a/Microservices.pptx
+++ b/Microservices.pptx
@@ -155,7 +155,7 @@
   </p:defaultTextStyle>
   <p:extLst>
     <p:ext uri="{EFAFB233-063F-42B5-8137-9DF3F51BA10A}">
-      <p15:sldGuideLst xmlns:p15="http://schemas.microsoft.com/office/powerpoint/2012/main" xmlns="">
+      <p15:sldGuideLst xmlns:p15="http://schemas.microsoft.com/office/powerpoint/2012/main">
         <p15:guide id="1" orient="horz" pos="373">
           <p15:clr>
             <a:srgbClr val="A4A3A4"/>
@@ -241,7 +241,41 @@
             <a:srgbClr val="A4A3A4"/>
           </p15:clr>
         </p15:guide>
+        <p15:guide id="18" orient="horz" pos="1167">
+          <p15:clr>
+            <a:srgbClr val="A4A3A4"/>
+          </p15:clr>
+        </p15:guide>
+        <p15:guide id="19" pos="2962">
+          <p15:clr>
+            <a:srgbClr val="A4A3A4"/>
+          </p15:clr>
+        </p15:guide>
+        <p15:guide id="20" pos="258">
+          <p15:clr>
+            <a:srgbClr val="A4A3A4"/>
+          </p15:clr>
+        </p15:guide>
+        <p15:guide id="21" pos="5446">
+          <p15:clr>
+            <a:srgbClr val="A4A3A4"/>
+          </p15:clr>
+        </p15:guide>
       </p15:sldGuideLst>
+    </p:ext>
+    <p:ext uri="{2D200454-40CA-4A62-9FC3-DE9A4176ACB9}">
+      <p15:notesGuideLst xmlns:p15="http://schemas.microsoft.com/office/powerpoint/2012/main">
+        <p15:guide id="1" orient="horz" pos="2880">
+          <p15:clr>
+            <a:srgbClr val="A4A3A4"/>
+          </p15:clr>
+        </p15:guide>
+        <p15:guide id="2" pos="2160">
+          <p15:clr>
+            <a:srgbClr val="A4A3A4"/>
+          </p15:clr>
+        </p15:guide>
+      </p15:notesGuideLst>
     </p:ext>
   </p:extLst>
 </p:presentation>
@@ -337,7 +371,7 @@
           <a:p>
             <a:fld id="{7F5E9BF7-95E4-A242-BA1D-05FDCF603BE6}" type="datetime1">
               <a:rPr lang="en-US" smtClean="0"/>
-              <a:t>10/29/2015</a:t>
+              <a:t>11/12/2015</a:t>
             </a:fld>
             <a:endParaRPr lang="en-US"/>
           </a:p>
@@ -503,7 +537,7 @@
           <a:p>
             <a:fld id="{165DBCB1-0306-AD41-9452-11E7C08D5C04}" type="datetime1">
               <a:rPr lang="en-US" smtClean="0"/>
-              <a:t>10/29/2015</a:t>
+              <a:t>11/12/2015</a:t>
             </a:fld>
             <a:endParaRPr lang="en-US"/>
           </a:p>
@@ -823,8 +857,20 @@
           </a:p>
           <a:p>
             <a:r>
+              <a:rPr lang="en-US" dirty="0" smtClean="0"/>
+              <a:t>C</a:t>
+            </a:r>
+            <a:r>
+              <a:rPr lang="ru-RU" dirty="0" err="1" smtClean="0"/>
+              <a:t>егодня</a:t>
+            </a:r>
+            <a:r>
               <a:rPr lang="ru-RU" dirty="0" smtClean="0"/>
-              <a:t>Меня зовут Виталий. И сегодня мы поговорим о таком</a:t>
+              <a:t> </a:t>
+            </a:r>
+            <a:r>
+              <a:rPr lang="ru-RU" dirty="0" smtClean="0"/>
+              <a:t>мы поговорим о таком</a:t>
             </a:r>
             <a:r>
               <a:rPr lang="ru-RU" baseline="0" dirty="0" smtClean="0"/>
@@ -5308,28 +5354,36 @@
               <a:t>Для заказчика </a:t>
             </a:r>
             <a:r>
-              <a:rPr lang="en-US" dirty="0" smtClean="0"/>
-              <a:t>Copyright</a:t>
+              <a:rPr lang="ru-RU" baseline="0" dirty="0" smtClean="0"/>
+              <a:t>наша </a:t>
+            </a:r>
+            <a:r>
+              <a:rPr lang="ru-RU" baseline="0" dirty="0" smtClean="0"/>
+              <a:t>команда разработала </a:t>
+            </a:r>
+            <a:r>
+              <a:rPr lang="ru-RU" baseline="0" dirty="0" smtClean="0"/>
+              <a:t>приложение</a:t>
             </a:r>
             <a:r>
               <a:rPr lang="en-US" baseline="0" dirty="0" smtClean="0"/>
-              <a:t> Clearance Center </a:t>
+              <a:t>, </a:t>
             </a:r>
             <a:r>
               <a:rPr lang="ru-RU" baseline="0" dirty="0" smtClean="0"/>
-              <a:t>наша команда разработала приложение которое называется </a:t>
-            </a:r>
-            <a:r>
-              <a:rPr lang="en-US" baseline="0" dirty="0" err="1" smtClean="0"/>
-              <a:t>Rightslink</a:t>
+              <a:t>назовем его </a:t>
             </a:r>
             <a:r>
               <a:rPr lang="en-US" baseline="0" dirty="0" smtClean="0"/>
-              <a:t> for Open Access (ROA</a:t>
+              <a:t>APP</a:t>
             </a:r>
             <a:r>
               <a:rPr lang="ru-RU" baseline="0" dirty="0" smtClean="0"/>
-              <a:t> сокращенно). Оно позволяет оплачивать публикацию авторами статей в журналах под открытыми лицензиями. И для корректной работы оно должно представлять достаточно широкий спектр функциональности:</a:t>
+              <a:t>. Для </a:t>
+            </a:r>
+            <a:r>
+              <a:rPr lang="ru-RU" baseline="0" dirty="0" smtClean="0"/>
+              <a:t>корректной работы оно должно представлять достаточно широкий спектр функциональности:</a:t>
             </a:r>
           </a:p>
           <a:p>
@@ -5379,7 +5433,15 @@
             </a:pPr>
             <a:r>
               <a:rPr lang="ru-RU" baseline="0" dirty="0" smtClean="0"/>
-              <a:t>И если бы РОА создавалось по монолитной архитектуре, то вся эта функциональность включалась бы в приложение в качестве кода или библиотек</a:t>
+              <a:t>И если бы </a:t>
+            </a:r>
+            <a:r>
+              <a:rPr lang="ru-RU" baseline="0" dirty="0" smtClean="0"/>
+              <a:t>оно создавалось </a:t>
+            </a:r>
+            <a:r>
+              <a:rPr lang="ru-RU" baseline="0" dirty="0" smtClean="0"/>
+              <a:t>по монолитной архитектуре, то вся эта функциональность включалась бы в приложение в качестве кода или библиотек</a:t>
             </a:r>
           </a:p>
           <a:p>
@@ -5745,8 +5807,12 @@
               <a:t> спектр услуг </a:t>
             </a:r>
             <a:r>
+              <a:rPr lang="ru-RU" baseline="0" dirty="0" smtClean="0"/>
+              <a:t>заказчика</a:t>
+            </a:r>
+            <a:r>
               <a:rPr lang="en-US" baseline="0" dirty="0" smtClean="0"/>
-              <a:t>Copyright Clearance Center </a:t>
+              <a:t> </a:t>
             </a:r>
             <a:r>
               <a:rPr lang="ru-RU" baseline="0" dirty="0" smtClean="0"/>
@@ -5842,7 +5908,19 @@
           <a:p>
             <a:r>
               <a:rPr lang="ru-RU" dirty="0" smtClean="0"/>
-              <a:t>Но вместо этого РОА как и другие приложения</a:t>
+              <a:t>Но вместо этого </a:t>
+            </a:r>
+            <a:r>
+              <a:rPr lang="en-US" dirty="0" smtClean="0"/>
+              <a:t>APP </a:t>
+            </a:r>
+            <a:r>
+              <a:rPr lang="ru-RU" dirty="0" smtClean="0"/>
+              <a:t>как </a:t>
+            </a:r>
+            <a:r>
+              <a:rPr lang="ru-RU" dirty="0" smtClean="0"/>
+              <a:t>и другие приложения</a:t>
             </a:r>
             <a:r>
               <a:rPr lang="ru-RU" baseline="0" dirty="0" smtClean="0"/>
@@ -12931,7 +13009,7 @@
           <a:p>
             <a:fld id="{BA1EE60E-2D75-4960-8A8D-4E97DBD789C3}" type="datetimeFigureOut">
               <a:rPr lang="ru-RU" smtClean="0"/>
-              <a:t>29.10.2015</a:t>
+              <a:t>12.11.2015</a:t>
             </a:fld>
             <a:endParaRPr lang="ru-RU"/>
           </a:p>
@@ -13799,7 +13877,7 @@
           <a:p>
             <a:fld id="{BA1EE60E-2D75-4960-8A8D-4E97DBD789C3}" type="datetimeFigureOut">
               <a:rPr lang="ru-RU" smtClean="0"/>
-              <a:t>29.10.2015</a:t>
+              <a:t>12.11.2015</a:t>
             </a:fld>
             <a:endParaRPr lang="ru-RU"/>
           </a:p>
@@ -14045,7 +14123,7 @@
           <a:p>
             <a:fld id="{BA1EE60E-2D75-4960-8A8D-4E97DBD789C3}" type="datetimeFigureOut">
               <a:rPr lang="ru-RU" smtClean="0"/>
-              <a:t>29.10.2015</a:t>
+              <a:t>12.11.2015</a:t>
             </a:fld>
             <a:endParaRPr lang="ru-RU"/>
           </a:p>
@@ -14333,7 +14411,7 @@
           <a:p>
             <a:fld id="{BA1EE60E-2D75-4960-8A8D-4E97DBD789C3}" type="datetimeFigureOut">
               <a:rPr lang="ru-RU" smtClean="0"/>
-              <a:t>29.10.2015</a:t>
+              <a:t>12.11.2015</a:t>
             </a:fld>
             <a:endParaRPr lang="ru-RU"/>
           </a:p>
@@ -14755,7 +14833,7 @@
           <a:p>
             <a:fld id="{BA1EE60E-2D75-4960-8A8D-4E97DBD789C3}" type="datetimeFigureOut">
               <a:rPr lang="ru-RU" smtClean="0"/>
-              <a:t>29.10.2015</a:t>
+              <a:t>12.11.2015</a:t>
             </a:fld>
             <a:endParaRPr lang="ru-RU"/>
           </a:p>
@@ -14873,7 +14951,7 @@
           <a:p>
             <a:fld id="{BA1EE60E-2D75-4960-8A8D-4E97DBD789C3}" type="datetimeFigureOut">
               <a:rPr lang="ru-RU" smtClean="0"/>
-              <a:t>29.10.2015</a:t>
+              <a:t>12.11.2015</a:t>
             </a:fld>
             <a:endParaRPr lang="ru-RU"/>
           </a:p>
@@ -14968,7 +15046,7 @@
           <a:p>
             <a:fld id="{BA1EE60E-2D75-4960-8A8D-4E97DBD789C3}" type="datetimeFigureOut">
               <a:rPr lang="ru-RU" smtClean="0"/>
-              <a:t>29.10.2015</a:t>
+              <a:t>12.11.2015</a:t>
             </a:fld>
             <a:endParaRPr lang="ru-RU"/>
           </a:p>
@@ -15245,7 +15323,7 @@
           <a:p>
             <a:fld id="{BA1EE60E-2D75-4960-8A8D-4E97DBD789C3}" type="datetimeFigureOut">
               <a:rPr lang="ru-RU" smtClean="0"/>
-              <a:t>29.10.2015</a:t>
+              <a:t>12.11.2015</a:t>
             </a:fld>
             <a:endParaRPr lang="ru-RU"/>
           </a:p>
@@ -15498,7 +15576,7 @@
           <a:p>
             <a:fld id="{BA1EE60E-2D75-4960-8A8D-4E97DBD789C3}" type="datetimeFigureOut">
               <a:rPr lang="ru-RU" smtClean="0"/>
-              <a:t>29.10.2015</a:t>
+              <a:t>12.11.2015</a:t>
             </a:fld>
             <a:endParaRPr lang="ru-RU"/>
           </a:p>
@@ -15668,7 +15746,7 @@
           <a:p>
             <a:fld id="{BA1EE60E-2D75-4960-8A8D-4E97DBD789C3}" type="datetimeFigureOut">
               <a:rPr lang="ru-RU" smtClean="0"/>
-              <a:t>29.10.2015</a:t>
+              <a:t>12.11.2015</a:t>
             </a:fld>
             <a:endParaRPr lang="ru-RU"/>
           </a:p>
@@ -15848,7 +15926,7 @@
           <a:p>
             <a:fld id="{BA1EE60E-2D75-4960-8A8D-4E97DBD789C3}" type="datetimeFigureOut">
               <a:rPr lang="ru-RU" smtClean="0"/>
-              <a:t>29.10.2015</a:t>
+              <a:t>12.11.2015</a:t>
             </a:fld>
             <a:endParaRPr lang="ru-RU"/>
           </a:p>
@@ -21372,7 +21450,7 @@
           <a:p>
             <a:fld id="{BA1EE60E-2D75-4960-8A8D-4E97DBD789C3}" type="datetimeFigureOut">
               <a:rPr lang="ru-RU" smtClean="0"/>
-              <a:t>29.10.2015</a:t>
+              <a:t>12.11.2015</a:t>
             </a:fld>
             <a:endParaRPr lang="ru-RU"/>
           </a:p>
@@ -47065,7 +47143,7 @@
             <a:pPr algn="ctr"/>
             <a:r>
               <a:rPr lang="en-US" sz="4000" dirty="0" smtClean="0"/>
-              <a:t>ROA</a:t>
+              <a:t>APP</a:t>
             </a:r>
             <a:endParaRPr lang="ru-RU" sz="4000" dirty="0"/>
           </a:p>
@@ -47347,63 +47425,9 @@
             <a:pPr algn="ctr"/>
             <a:r>
               <a:rPr lang="ru-RU" dirty="0" smtClean="0"/>
-              <a:t>Справочник Издателей</a:t>
+              <a:t>Справочник</a:t>
             </a:r>
             <a:endParaRPr lang="ru-RU" dirty="0"/>
-          </a:p>
-        </p:txBody>
-      </p:sp>
-      <p:sp>
-        <p:nvSpPr>
-          <p:cNvPr id="12" name="TextBox 11"/>
-          <p:cNvSpPr txBox="1"/>
-          <p:nvPr/>
-        </p:nvSpPr>
-        <p:spPr>
-          <a:xfrm>
-            <a:off x="2206773" y="5847950"/>
-            <a:ext cx="4669483" cy="584775"/>
-          </a:xfrm>
-          <a:prstGeom prst="rect">
-            <a:avLst/>
-          </a:prstGeom>
-          <a:noFill/>
-        </p:spPr>
-        <p:txBody>
-          <a:bodyPr wrap="none" rtlCol="0">
-            <a:spAutoFit/>
-          </a:bodyPr>
-          <a:lstStyle/>
-          <a:p>
-            <a:r>
-              <a:rPr lang="en-US" sz="3200" b="1" i="1" u="sng" dirty="0" err="1" smtClean="0"/>
-              <a:t>R</a:t>
-            </a:r>
-            <a:r>
-              <a:rPr lang="en-US" sz="3200" b="1" dirty="0" err="1" smtClean="0"/>
-              <a:t>ightslink</a:t>
-            </a:r>
-            <a:r>
-              <a:rPr lang="en-US" sz="3200" b="1" dirty="0" smtClean="0"/>
-              <a:t> for </a:t>
-            </a:r>
-            <a:r>
-              <a:rPr lang="en-US" sz="3200" b="1" i="1" u="sng" dirty="0" smtClean="0"/>
-              <a:t>O</a:t>
-            </a:r>
-            <a:r>
-              <a:rPr lang="en-US" sz="3200" b="1" dirty="0" smtClean="0"/>
-              <a:t>pen </a:t>
-            </a:r>
-            <a:r>
-              <a:rPr lang="en-US" sz="3200" b="1" i="1" u="sng" dirty="0" smtClean="0"/>
-              <a:t>A</a:t>
-            </a:r>
-            <a:r>
-              <a:rPr lang="en-US" sz="3200" b="1" dirty="0" smtClean="0"/>
-              <a:t>ccess</a:t>
-            </a:r>
-            <a:endParaRPr lang="ru-RU" sz="3200" b="1" dirty="0"/>
           </a:p>
         </p:txBody>
       </p:sp>
@@ -47842,7 +47866,11 @@
             <a:pPr algn="ctr"/>
             <a:r>
               <a:rPr lang="en-US" sz="4000" dirty="0" smtClean="0"/>
-              <a:t>copyright.com</a:t>
+              <a:t>company</a:t>
+            </a:r>
+            <a:r>
+              <a:rPr lang="en-US" sz="4000" dirty="0" smtClean="0"/>
+              <a:t>.com</a:t>
             </a:r>
             <a:endParaRPr lang="ru-RU" sz="4000" dirty="0"/>
           </a:p>
@@ -47936,7 +47964,7 @@
             <a:pPr algn="ctr"/>
             <a:r>
               <a:rPr lang="en-US" sz="4000" dirty="0" smtClean="0"/>
-              <a:t>ROA</a:t>
+              <a:t>APP</a:t>
             </a:r>
             <a:endParaRPr lang="ru-RU" sz="4000" dirty="0"/>
           </a:p>
@@ -48520,7 +48548,7 @@
             <a:pPr algn="ctr"/>
             <a:r>
               <a:rPr lang="en-US" dirty="0" smtClean="0"/>
-              <a:t>ROA</a:t>
+              <a:t>APP</a:t>
             </a:r>
             <a:endParaRPr lang="ru-RU" dirty="0"/>
           </a:p>
@@ -51559,15 +51587,6 @@
 </file>
 
 <file path=customXml/item1.xml><?xml version="1.0" encoding="utf-8"?>
-<p:properties xmlns:p="http://schemas.microsoft.com/office/2006/metadata/properties" xmlns:xsi="http://www.w3.org/2001/XMLSchema-instance" xmlns:pc="http://schemas.microsoft.com/office/infopath/2007/PartnerControls">
-  <documentManagement>
-    <PublishingExpirationDate xmlns="http://schemas.microsoft.com/sharepoint/v3" xsi:nil="true"/>
-    <PublishingStartDate xmlns="http://schemas.microsoft.com/sharepoint/v3" xsi:nil="true"/>
-  </documentManagement>
-</p:properties>
-</file>
-
-<file path=customXml/item2.xml><?xml version="1.0" encoding="utf-8"?>
 <?mso-contentType ?>
 <FormTemplates xmlns="http://schemas.microsoft.com/sharepoint/v3/contenttype/forms">
   <Display>DocumentLibraryForm</Display>
@@ -51576,7 +51595,7 @@
 </FormTemplates>
 </file>
 
-<file path=customXml/item3.xml><?xml version="1.0" encoding="utf-8"?>
+<file path=customXml/item2.xml><?xml version="1.0" encoding="utf-8"?>
 <ct:contentTypeSchema xmlns:ct="http://schemas.microsoft.com/office/2006/metadata/contentType" xmlns:ma="http://schemas.microsoft.com/office/2006/metadata/properties/metaAttributes" ct:_="" ma:_="" ma:contentTypeName="Document" ma:contentTypeID="0x010100B0E9A4A7D20EA84CAA39F80EA2A19865" ma:contentTypeVersion="1" ma:contentTypeDescription="Create a new document." ma:contentTypeScope="" ma:versionID="4ed0c655cf5595f31b06ef1418ca28bf">
   <xsd:schema xmlns:xsd="http://www.w3.org/2001/XMLSchema" xmlns:xs="http://www.w3.org/2001/XMLSchema" xmlns:p="http://schemas.microsoft.com/office/2006/metadata/properties" xmlns:ns1="http://schemas.microsoft.com/sharepoint/v3" targetNamespace="http://schemas.microsoft.com/office/2006/metadata/properties" ma:root="true" ma:fieldsID="4dcce58c87e9fcebab8021569449a8d0" ns1:_="">
     <xsd:import namespace="http://schemas.microsoft.com/sharepoint/v3"/>
@@ -51708,23 +51727,16 @@
 </ct:contentTypeSchema>
 </file>
 
-<file path=customXml/itemProps1.xml><?xml version="1.0" encoding="utf-8"?>
-<ds:datastoreItem xmlns:ds="http://schemas.openxmlformats.org/officeDocument/2006/customXml" ds:itemID="{D5E3C081-4081-47AD-A9A6-9F18F525DA1D}">
-  <ds:schemaRefs>
-    <ds:schemaRef ds:uri="http://schemas.microsoft.com/sharepoint/v3"/>
-    <ds:schemaRef ds:uri="http://purl.org/dc/dcmitype/"/>
-    <ds:schemaRef ds:uri="http://schemas.microsoft.com/office/2006/metadata/properties"/>
-    <ds:schemaRef ds:uri="http://purl.org/dc/terms/"/>
-    <ds:schemaRef ds:uri="http://purl.org/dc/elements/1.1/"/>
-    <ds:schemaRef ds:uri="http://schemas.openxmlformats.org/package/2006/metadata/core-properties"/>
-    <ds:schemaRef ds:uri="http://schemas.microsoft.com/office/2006/documentManagement/types"/>
-    <ds:schemaRef ds:uri="http://schemas.microsoft.com/office/infopath/2007/PartnerControls"/>
-    <ds:schemaRef ds:uri="http://www.w3.org/XML/1998/namespace"/>
-  </ds:schemaRefs>
-</ds:datastoreItem>
+<file path=customXml/item3.xml><?xml version="1.0" encoding="utf-8"?>
+<p:properties xmlns:p="http://schemas.microsoft.com/office/2006/metadata/properties" xmlns:xsi="http://www.w3.org/2001/XMLSchema-instance" xmlns:pc="http://schemas.microsoft.com/office/infopath/2007/PartnerControls">
+  <documentManagement>
+    <PublishingExpirationDate xmlns="http://schemas.microsoft.com/sharepoint/v3" xsi:nil="true"/>
+    <PublishingStartDate xmlns="http://schemas.microsoft.com/sharepoint/v3" xsi:nil="true"/>
+  </documentManagement>
+</p:properties>
 </file>
 
-<file path=customXml/itemProps2.xml><?xml version="1.0" encoding="utf-8"?>
+<file path=customXml/itemProps1.xml><?xml version="1.0" encoding="utf-8"?>
 <ds:datastoreItem xmlns:ds="http://schemas.openxmlformats.org/officeDocument/2006/customXml" ds:itemID="{14883F0F-DE57-4ECA-B9BB-F22E8C5B5D82}">
   <ds:schemaRefs>
     <ds:schemaRef ds:uri="http://schemas.microsoft.com/sharepoint/v3/contenttype/forms"/>
@@ -51732,7 +51744,7 @@
 </ds:datastoreItem>
 </file>
 
-<file path=customXml/itemProps3.xml><?xml version="1.0" encoding="utf-8"?>
+<file path=customXml/itemProps2.xml><?xml version="1.0" encoding="utf-8"?>
 <ds:datastoreItem xmlns:ds="http://schemas.openxmlformats.org/officeDocument/2006/customXml" ds:itemID="{C3A1A37E-F8E3-427A-BCE9-B1DDB8B96CDF}">
   <ds:schemaRefs>
     <ds:schemaRef ds:uri="http://schemas.microsoft.com/office/2006/metadata/contentType"/>
@@ -51748,4 +51760,20 @@
     <ds:schemaRef ds:uri="http://schemas.microsoft.com/internal/obd"/>
   </ds:schemaRefs>
 </ds:datastoreItem>
+</file>
+
+<file path=customXml/itemProps3.xml><?xml version="1.0" encoding="utf-8"?>
+<ds:datastoreItem xmlns:ds="http://schemas.openxmlformats.org/officeDocument/2006/customXml" ds:itemID="{D5E3C081-4081-47AD-A9A6-9F18F525DA1D}">
+  <ds:schemaRefs>
+    <ds:schemaRef ds:uri="http://schemas.microsoft.com/sharepoint/v3"/>
+    <ds:schemaRef ds:uri="http://purl.org/dc/dcmitype/"/>
+    <ds:schemaRef ds:uri="http://schemas.microsoft.com/office/2006/metadata/properties"/>
+    <ds:schemaRef ds:uri="http://purl.org/dc/terms/"/>
+    <ds:schemaRef ds:uri="http://purl.org/dc/elements/1.1/"/>
+    <ds:schemaRef ds:uri="http://schemas.openxmlformats.org/package/2006/metadata/core-properties"/>
+    <ds:schemaRef ds:uri="http://schemas.microsoft.com/office/2006/documentManagement/types"/>
+    <ds:schemaRef ds:uri="http://schemas.microsoft.com/office/infopath/2007/PartnerControls"/>
+    <ds:schemaRef ds:uri="http://www.w3.org/XML/1998/namespace"/>
+  </ds:schemaRefs>
+</ds:datastoreItem>
 </file>
</xml_diff>